<commit_message>
1. fix time window 2. add options for which terms to consider 3. fix error function
</commit_message>
<xml_diff>
--- a/docs/Presentation1.pptx
+++ b/docs/Presentation1.pptx
@@ -105,6 +105,11 @@
       </a:defRPr>
     </a:lvl9pPr>
   </p:defaultTextStyle>
+  <p:extLst>
+    <p:ext uri="{EFAFB233-063F-42B5-8137-9DF3F51BA10A}">
+      <p15:sldGuideLst xmlns:p15="http://schemas.microsoft.com/office/powerpoint/2012/main"/>
+    </p:ext>
+  </p:extLst>
 </p:presentation>
 </file>
 
@@ -113,90 +118,90 @@
   <pc:docChgLst>
     <pc:chgData name="Uriel Tayvah" userId="e3ede09ac1cb89e6" providerId="LiveId" clId="{142AE128-AE07-4F25-84F3-27F6614F055A}"/>
     <pc:docChg chg="undo custSel addSld modSld">
-      <pc:chgData name="Uriel Tayvah" userId="e3ede09ac1cb89e6" providerId="LiveId" clId="{142AE128-AE07-4F25-84F3-27F6614F055A}" dt="2020-01-08T21:19:21.459" v="269" actId="164"/>
+      <pc:chgData name="Uriel Tayvah" userId="e3ede09ac1cb89e6" providerId="LiveId" clId="{142AE128-AE07-4F25-84F3-27F6614F055A}" dt="2020-10-13T21:13:30.577" v="281" actId="164"/>
       <pc:docMkLst>
         <pc:docMk/>
       </pc:docMkLst>
-      <pc:sldChg chg="addSp delSp modSp">
-        <pc:chgData name="Uriel Tayvah" userId="e3ede09ac1cb89e6" providerId="LiveId" clId="{142AE128-AE07-4F25-84F3-27F6614F055A}" dt="2020-01-08T18:56:20.429" v="181" actId="164"/>
+      <pc:sldChg chg="addSp delSp modSp mod">
+        <pc:chgData name="Uriel Tayvah" userId="e3ede09ac1cb89e6" providerId="LiveId" clId="{142AE128-AE07-4F25-84F3-27F6614F055A}" dt="2020-10-13T21:13:30.577" v="281" actId="164"/>
         <pc:sldMkLst>
           <pc:docMk/>
           <pc:sldMk cId="639913114" sldId="256"/>
         </pc:sldMkLst>
-        <pc:spChg chg="mod">
-          <ac:chgData name="Uriel Tayvah" userId="e3ede09ac1cb89e6" providerId="LiveId" clId="{142AE128-AE07-4F25-84F3-27F6614F055A}" dt="2020-01-08T18:56:20.429" v="181" actId="164"/>
+        <pc:spChg chg="mod topLvl">
+          <ac:chgData name="Uriel Tayvah" userId="e3ede09ac1cb89e6" providerId="LiveId" clId="{142AE128-AE07-4F25-84F3-27F6614F055A}" dt="2020-10-13T21:13:27.770" v="280" actId="165"/>
           <ac:spMkLst>
             <pc:docMk/>
             <pc:sldMk cId="639913114" sldId="256"/>
             <ac:spMk id="4" creationId="{97E3A5C0-31BB-4D11-BFE1-9C2F3A851A2A}"/>
           </ac:spMkLst>
         </pc:spChg>
-        <pc:spChg chg="mod">
-          <ac:chgData name="Uriel Tayvah" userId="e3ede09ac1cb89e6" providerId="LiveId" clId="{142AE128-AE07-4F25-84F3-27F6614F055A}" dt="2020-01-08T18:56:20.429" v="181" actId="164"/>
+        <pc:spChg chg="mod topLvl">
+          <ac:chgData name="Uriel Tayvah" userId="e3ede09ac1cb89e6" providerId="LiveId" clId="{142AE128-AE07-4F25-84F3-27F6614F055A}" dt="2020-10-13T21:13:27.770" v="280" actId="165"/>
           <ac:spMkLst>
             <pc:docMk/>
             <pc:sldMk cId="639913114" sldId="256"/>
             <ac:spMk id="5" creationId="{36544E4B-80A5-41A0-838E-9A316D978AB2}"/>
           </ac:spMkLst>
         </pc:spChg>
-        <pc:spChg chg="mod">
-          <ac:chgData name="Uriel Tayvah" userId="e3ede09ac1cb89e6" providerId="LiveId" clId="{142AE128-AE07-4F25-84F3-27F6614F055A}" dt="2020-01-08T18:56:20.429" v="181" actId="164"/>
+        <pc:spChg chg="mod topLvl">
+          <ac:chgData name="Uriel Tayvah" userId="e3ede09ac1cb89e6" providerId="LiveId" clId="{142AE128-AE07-4F25-84F3-27F6614F055A}" dt="2020-10-13T21:13:27.770" v="280" actId="165"/>
           <ac:spMkLst>
             <pc:docMk/>
             <pc:sldMk cId="639913114" sldId="256"/>
             <ac:spMk id="6" creationId="{572F0A15-A837-48EC-9F9C-4CB5FD7C0166}"/>
           </ac:spMkLst>
         </pc:spChg>
-        <pc:spChg chg="mod">
-          <ac:chgData name="Uriel Tayvah" userId="e3ede09ac1cb89e6" providerId="LiveId" clId="{142AE128-AE07-4F25-84F3-27F6614F055A}" dt="2020-01-08T18:56:20.429" v="181" actId="164"/>
+        <pc:spChg chg="mod topLvl">
+          <ac:chgData name="Uriel Tayvah" userId="e3ede09ac1cb89e6" providerId="LiveId" clId="{142AE128-AE07-4F25-84F3-27F6614F055A}" dt="2020-10-13T21:13:27.770" v="280" actId="165"/>
           <ac:spMkLst>
             <pc:docMk/>
             <pc:sldMk cId="639913114" sldId="256"/>
             <ac:spMk id="7" creationId="{956B3F29-A46E-4491-84CA-9C3BCD9380C8}"/>
           </ac:spMkLst>
         </pc:spChg>
-        <pc:spChg chg="mod">
-          <ac:chgData name="Uriel Tayvah" userId="e3ede09ac1cb89e6" providerId="LiveId" clId="{142AE128-AE07-4F25-84F3-27F6614F055A}" dt="2020-01-08T18:56:20.429" v="181" actId="164"/>
+        <pc:spChg chg="mod topLvl">
+          <ac:chgData name="Uriel Tayvah" userId="e3ede09ac1cb89e6" providerId="LiveId" clId="{142AE128-AE07-4F25-84F3-27F6614F055A}" dt="2020-10-13T21:13:27.770" v="280" actId="165"/>
           <ac:spMkLst>
             <pc:docMk/>
             <pc:sldMk cId="639913114" sldId="256"/>
             <ac:spMk id="8" creationId="{1C8FC3D2-1D8C-49F7-87DB-DE9627330E5F}"/>
           </ac:spMkLst>
         </pc:spChg>
-        <pc:spChg chg="add mod">
-          <ac:chgData name="Uriel Tayvah" userId="e3ede09ac1cb89e6" providerId="LiveId" clId="{142AE128-AE07-4F25-84F3-27F6614F055A}" dt="2020-01-08T18:56:20.429" v="181" actId="164"/>
+        <pc:spChg chg="add mod topLvl">
+          <ac:chgData name="Uriel Tayvah" userId="e3ede09ac1cb89e6" providerId="LiveId" clId="{142AE128-AE07-4F25-84F3-27F6614F055A}" dt="2020-10-13T21:13:27.770" v="280" actId="165"/>
           <ac:spMkLst>
             <pc:docMk/>
             <pc:sldMk cId="639913114" sldId="256"/>
             <ac:spMk id="9" creationId="{7DCBFC50-93D5-403E-9C81-797E6BC92707}"/>
           </ac:spMkLst>
         </pc:spChg>
-        <pc:spChg chg="add mod">
-          <ac:chgData name="Uriel Tayvah" userId="e3ede09ac1cb89e6" providerId="LiveId" clId="{142AE128-AE07-4F25-84F3-27F6614F055A}" dt="2020-01-08T18:56:20.429" v="181" actId="164"/>
+        <pc:spChg chg="add mod topLvl">
+          <ac:chgData name="Uriel Tayvah" userId="e3ede09ac1cb89e6" providerId="LiveId" clId="{142AE128-AE07-4F25-84F3-27F6614F055A}" dt="2020-10-13T21:13:27.770" v="280" actId="165"/>
           <ac:spMkLst>
             <pc:docMk/>
             <pc:sldMk cId="639913114" sldId="256"/>
             <ac:spMk id="10" creationId="{CA94E341-17E6-4D55-B366-B090E56195C3}"/>
           </ac:spMkLst>
         </pc:spChg>
-        <pc:spChg chg="add mod">
-          <ac:chgData name="Uriel Tayvah" userId="e3ede09ac1cb89e6" providerId="LiveId" clId="{142AE128-AE07-4F25-84F3-27F6614F055A}" dt="2020-01-08T18:56:20.429" v="181" actId="164"/>
+        <pc:spChg chg="add mod topLvl">
+          <ac:chgData name="Uriel Tayvah" userId="e3ede09ac1cb89e6" providerId="LiveId" clId="{142AE128-AE07-4F25-84F3-27F6614F055A}" dt="2020-10-13T21:13:27.770" v="280" actId="165"/>
           <ac:spMkLst>
             <pc:docMk/>
             <pc:sldMk cId="639913114" sldId="256"/>
             <ac:spMk id="11" creationId="{E4334701-4B6E-4AB5-A6A7-4BE0DF22B291}"/>
           </ac:spMkLst>
         </pc:spChg>
-        <pc:spChg chg="add del mod">
-          <ac:chgData name="Uriel Tayvah" userId="e3ede09ac1cb89e6" providerId="LiveId" clId="{142AE128-AE07-4F25-84F3-27F6614F055A}" dt="2020-01-08T18:56:20.429" v="181" actId="164"/>
+        <pc:spChg chg="add del mod topLvl">
+          <ac:chgData name="Uriel Tayvah" userId="e3ede09ac1cb89e6" providerId="LiveId" clId="{142AE128-AE07-4F25-84F3-27F6614F055A}" dt="2020-10-13T21:13:27.770" v="280" actId="165"/>
           <ac:spMkLst>
             <pc:docMk/>
             <pc:sldMk cId="639913114" sldId="256"/>
             <ac:spMk id="12" creationId="{2532A29E-D6CA-40C2-8105-3E5B88A6B868}"/>
           </ac:spMkLst>
         </pc:spChg>
-        <pc:spChg chg="add del mod">
-          <ac:chgData name="Uriel Tayvah" userId="e3ede09ac1cb89e6" providerId="LiveId" clId="{142AE128-AE07-4F25-84F3-27F6614F055A}" dt="2020-01-08T18:56:20.429" v="181" actId="164"/>
+        <pc:spChg chg="add del mod topLvl">
+          <ac:chgData name="Uriel Tayvah" userId="e3ede09ac1cb89e6" providerId="LiveId" clId="{142AE128-AE07-4F25-84F3-27F6614F055A}" dt="2020-10-13T21:13:27.770" v="280" actId="165"/>
           <ac:spMkLst>
             <pc:docMk/>
             <pc:sldMk cId="639913114" sldId="256"/>
@@ -211,46 +216,70 @@
             <ac:spMk id="14" creationId="{949F58FB-6EE2-4100-9E2A-E41850C4BD07}"/>
           </ac:spMkLst>
         </pc:spChg>
-        <pc:spChg chg="add del mod">
-          <ac:chgData name="Uriel Tayvah" userId="e3ede09ac1cb89e6" providerId="LiveId" clId="{142AE128-AE07-4F25-84F3-27F6614F055A}" dt="2020-01-08T18:56:20.429" v="181" actId="164"/>
+        <pc:spChg chg="add del mod topLvl">
+          <ac:chgData name="Uriel Tayvah" userId="e3ede09ac1cb89e6" providerId="LiveId" clId="{142AE128-AE07-4F25-84F3-27F6614F055A}" dt="2020-10-13T21:13:27.770" v="280" actId="165"/>
           <ac:spMkLst>
             <pc:docMk/>
             <pc:sldMk cId="639913114" sldId="256"/>
             <ac:spMk id="15" creationId="{8E701008-4152-4FB2-B30B-CF2A2A0423C0}"/>
           </ac:spMkLst>
         </pc:spChg>
-        <pc:spChg chg="add del mod">
-          <ac:chgData name="Uriel Tayvah" userId="e3ede09ac1cb89e6" providerId="LiveId" clId="{142AE128-AE07-4F25-84F3-27F6614F055A}" dt="2020-01-08T18:56:20.429" v="181" actId="164"/>
+        <pc:spChg chg="add del mod topLvl">
+          <ac:chgData name="Uriel Tayvah" userId="e3ede09ac1cb89e6" providerId="LiveId" clId="{142AE128-AE07-4F25-84F3-27F6614F055A}" dt="2020-10-13T21:13:27.770" v="280" actId="165"/>
           <ac:spMkLst>
             <pc:docMk/>
             <pc:sldMk cId="639913114" sldId="256"/>
             <ac:spMk id="16" creationId="{D0B86ABE-845B-496F-B5D7-84F41B640A03}"/>
           </ac:spMkLst>
         </pc:spChg>
-        <pc:spChg chg="add del mod">
-          <ac:chgData name="Uriel Tayvah" userId="e3ede09ac1cb89e6" providerId="LiveId" clId="{142AE128-AE07-4F25-84F3-27F6614F055A}" dt="2020-01-08T18:56:20.429" v="181" actId="164"/>
+        <pc:spChg chg="add del mod topLvl">
+          <ac:chgData name="Uriel Tayvah" userId="e3ede09ac1cb89e6" providerId="LiveId" clId="{142AE128-AE07-4F25-84F3-27F6614F055A}" dt="2020-10-13T21:13:27.770" v="280" actId="165"/>
           <ac:spMkLst>
             <pc:docMk/>
             <pc:sldMk cId="639913114" sldId="256"/>
             <ac:spMk id="17" creationId="{FBD0523F-8CC4-4205-9068-3A1C66128002}"/>
           </ac:spMkLst>
         </pc:spChg>
-        <pc:spChg chg="add del mod">
-          <ac:chgData name="Uriel Tayvah" userId="e3ede09ac1cb89e6" providerId="LiveId" clId="{142AE128-AE07-4F25-84F3-27F6614F055A}" dt="2020-01-08T18:56:20.429" v="181" actId="164"/>
+        <pc:spChg chg="add del mod topLvl">
+          <ac:chgData name="Uriel Tayvah" userId="e3ede09ac1cb89e6" providerId="LiveId" clId="{142AE128-AE07-4F25-84F3-27F6614F055A}" dt="2020-10-13T21:13:27.770" v="280" actId="165"/>
           <ac:spMkLst>
             <pc:docMk/>
             <pc:sldMk cId="639913114" sldId="256"/>
             <ac:spMk id="18" creationId="{451011EC-A35F-4253-B649-DBF2B9EA89D0}"/>
           </ac:spMkLst>
         </pc:spChg>
-        <pc:spChg chg="add del mod">
-          <ac:chgData name="Uriel Tayvah" userId="e3ede09ac1cb89e6" providerId="LiveId" clId="{142AE128-AE07-4F25-84F3-27F6614F055A}" dt="2020-01-08T18:56:20.429" v="181" actId="164"/>
+        <pc:spChg chg="add del mod topLvl">
+          <ac:chgData name="Uriel Tayvah" userId="e3ede09ac1cb89e6" providerId="LiveId" clId="{142AE128-AE07-4F25-84F3-27F6614F055A}" dt="2020-10-13T21:13:27.770" v="280" actId="165"/>
           <ac:spMkLst>
             <pc:docMk/>
             <pc:sldMk cId="639913114" sldId="256"/>
             <ac:spMk id="19" creationId="{4DEF8E66-BDD8-4BC3-8F1C-D4C45251D8F0}"/>
           </ac:spMkLst>
         </pc:spChg>
+        <pc:grpChg chg="add del mod">
+          <ac:chgData name="Uriel Tayvah" userId="e3ede09ac1cb89e6" providerId="LiveId" clId="{142AE128-AE07-4F25-84F3-27F6614F055A}" dt="2020-10-13T21:13:30.577" v="281" actId="164"/>
+          <ac:grpSpMkLst>
+            <pc:docMk/>
+            <pc:sldMk cId="639913114" sldId="256"/>
+            <ac:grpSpMk id="2" creationId="{94D6302E-795F-4023-8E3F-FE331064D6B2}"/>
+          </ac:grpSpMkLst>
+        </pc:grpChg>
+        <pc:grpChg chg="add del mod">
+          <ac:chgData name="Uriel Tayvah" userId="e3ede09ac1cb89e6" providerId="LiveId" clId="{142AE128-AE07-4F25-84F3-27F6614F055A}" dt="2020-10-13T21:13:30.577" v="281" actId="164"/>
+          <ac:grpSpMkLst>
+            <pc:docMk/>
+            <pc:sldMk cId="639913114" sldId="256"/>
+            <ac:grpSpMk id="3" creationId="{9A1A09A4-AF6D-4B73-815D-1D538A5D1EB7}"/>
+          </ac:grpSpMkLst>
+        </pc:grpChg>
+        <pc:grpChg chg="add mod">
+          <ac:chgData name="Uriel Tayvah" userId="e3ede09ac1cb89e6" providerId="LiveId" clId="{142AE128-AE07-4F25-84F3-27F6614F055A}" dt="2020-10-13T21:13:30.577" v="281" actId="164"/>
+          <ac:grpSpMkLst>
+            <pc:docMk/>
+            <pc:sldMk cId="639913114" sldId="256"/>
+            <ac:grpSpMk id="14" creationId="{E2092536-A4CC-4CBA-9D41-8B72F3C63405}"/>
+          </ac:grpSpMkLst>
+        </pc:grpChg>
         <pc:grpChg chg="add mod">
           <ac:chgData name="Uriel Tayvah" userId="e3ede09ac1cb89e6" providerId="LiveId" clId="{142AE128-AE07-4F25-84F3-27F6614F055A}" dt="2020-01-08T18:56:15.991" v="179" actId="164"/>
           <ac:grpSpMkLst>
@@ -259,8 +288,8 @@
             <ac:grpSpMk id="22" creationId="{AD246C21-5DD0-4518-91BD-D43BB19A1BD5}"/>
           </ac:grpSpMkLst>
         </pc:grpChg>
-        <pc:grpChg chg="add mod">
-          <ac:chgData name="Uriel Tayvah" userId="e3ede09ac1cb89e6" providerId="LiveId" clId="{142AE128-AE07-4F25-84F3-27F6614F055A}" dt="2020-01-08T18:56:20.429" v="181" actId="164"/>
+        <pc:grpChg chg="add del mod">
+          <ac:chgData name="Uriel Tayvah" userId="e3ede09ac1cb89e6" providerId="LiveId" clId="{142AE128-AE07-4F25-84F3-27F6614F055A}" dt="2020-10-13T21:13:07.350" v="270" actId="165"/>
           <ac:grpSpMkLst>
             <pc:docMk/>
             <pc:sldMk cId="639913114" sldId="256"/>
@@ -515,7 +544,7 @@
           <a:p>
             <a:fld id="{BE759B4D-F71E-4192-B51B-523C2443230A}" type="datetimeFigureOut">
               <a:rPr lang="en-US" smtClean="0"/>
-              <a:t>1/8/2020</a:t>
+              <a:t>10/13/2020</a:t>
             </a:fld>
             <a:endParaRPr lang="en-US"/>
           </a:p>
@@ -713,7 +742,7 @@
           <a:p>
             <a:fld id="{BE759B4D-F71E-4192-B51B-523C2443230A}" type="datetimeFigureOut">
               <a:rPr lang="en-US" smtClean="0"/>
-              <a:t>1/8/2020</a:t>
+              <a:t>10/13/2020</a:t>
             </a:fld>
             <a:endParaRPr lang="en-US"/>
           </a:p>
@@ -921,7 +950,7 @@
           <a:p>
             <a:fld id="{BE759B4D-F71E-4192-B51B-523C2443230A}" type="datetimeFigureOut">
               <a:rPr lang="en-US" smtClean="0"/>
-              <a:t>1/8/2020</a:t>
+              <a:t>10/13/2020</a:t>
             </a:fld>
             <a:endParaRPr lang="en-US"/>
           </a:p>
@@ -1119,7 +1148,7 @@
           <a:p>
             <a:fld id="{BE759B4D-F71E-4192-B51B-523C2443230A}" type="datetimeFigureOut">
               <a:rPr lang="en-US" smtClean="0"/>
-              <a:t>1/8/2020</a:t>
+              <a:t>10/13/2020</a:t>
             </a:fld>
             <a:endParaRPr lang="en-US"/>
           </a:p>
@@ -1394,7 +1423,7 @@
           <a:p>
             <a:fld id="{BE759B4D-F71E-4192-B51B-523C2443230A}" type="datetimeFigureOut">
               <a:rPr lang="en-US" smtClean="0"/>
-              <a:t>1/8/2020</a:t>
+              <a:t>10/13/2020</a:t>
             </a:fld>
             <a:endParaRPr lang="en-US"/>
           </a:p>
@@ -1659,7 +1688,7 @@
           <a:p>
             <a:fld id="{BE759B4D-F71E-4192-B51B-523C2443230A}" type="datetimeFigureOut">
               <a:rPr lang="en-US" smtClean="0"/>
-              <a:t>1/8/2020</a:t>
+              <a:t>10/13/2020</a:t>
             </a:fld>
             <a:endParaRPr lang="en-US"/>
           </a:p>
@@ -2071,7 +2100,7 @@
           <a:p>
             <a:fld id="{BE759B4D-F71E-4192-B51B-523C2443230A}" type="datetimeFigureOut">
               <a:rPr lang="en-US" smtClean="0"/>
-              <a:t>1/8/2020</a:t>
+              <a:t>10/13/2020</a:t>
             </a:fld>
             <a:endParaRPr lang="en-US"/>
           </a:p>
@@ -2212,7 +2241,7 @@
           <a:p>
             <a:fld id="{BE759B4D-F71E-4192-B51B-523C2443230A}" type="datetimeFigureOut">
               <a:rPr lang="en-US" smtClean="0"/>
-              <a:t>1/8/2020</a:t>
+              <a:t>10/13/2020</a:t>
             </a:fld>
             <a:endParaRPr lang="en-US"/>
           </a:p>
@@ -2325,7 +2354,7 @@
           <a:p>
             <a:fld id="{BE759B4D-F71E-4192-B51B-523C2443230A}" type="datetimeFigureOut">
               <a:rPr lang="en-US" smtClean="0"/>
-              <a:t>1/8/2020</a:t>
+              <a:t>10/13/2020</a:t>
             </a:fld>
             <a:endParaRPr lang="en-US"/>
           </a:p>
@@ -2636,7 +2665,7 @@
           <a:p>
             <a:fld id="{BE759B4D-F71E-4192-B51B-523C2443230A}" type="datetimeFigureOut">
               <a:rPr lang="en-US" smtClean="0"/>
-              <a:t>1/8/2020</a:t>
+              <a:t>10/13/2020</a:t>
             </a:fld>
             <a:endParaRPr lang="en-US"/>
           </a:p>
@@ -2924,7 +2953,7 @@
           <a:p>
             <a:fld id="{BE759B4D-F71E-4192-B51B-523C2443230A}" type="datetimeFigureOut">
               <a:rPr lang="en-US" smtClean="0"/>
-              <a:t>1/8/2020</a:t>
+              <a:t>10/13/2020</a:t>
             </a:fld>
             <a:endParaRPr lang="en-US"/>
           </a:p>
@@ -3165,7 +3194,7 @@
           <a:p>
             <a:fld id="{BE759B4D-F71E-4192-B51B-523C2443230A}" type="datetimeFigureOut">
               <a:rPr lang="en-US" smtClean="0"/>
-              <a:t>1/8/2020</a:t>
+              <a:t>10/13/2020</a:t>
             </a:fld>
             <a:endParaRPr lang="en-US"/>
           </a:p>
@@ -3584,10 +3613,10 @@
       </p:grpSpPr>
       <p:grpSp>
         <p:nvGrpSpPr>
-          <p:cNvPr id="23" name="Group 22">
+          <p:cNvPr id="14" name="Group 13">
             <a:extLst>
               <a:ext uri="{FF2B5EF4-FFF2-40B4-BE49-F238E27FC236}">
-                <a16:creationId xmlns:a16="http://schemas.microsoft.com/office/drawing/2014/main" id="{0FAED14D-0B9B-48A9-B6C1-DCF9BD461EF7}"/>
+                <a16:creationId xmlns:a16="http://schemas.microsoft.com/office/drawing/2014/main" id="{E2092536-A4CC-4CBA-9D41-8B72F3C63405}"/>
               </a:ext>
             </a:extLst>
           </p:cNvPr>
@@ -3596,2138 +3625,2184 @@
         </p:nvGrpSpPr>
         <p:grpSpPr>
           <a:xfrm>
-            <a:off x="2208848" y="168832"/>
-            <a:ext cx="7576623" cy="5099498"/>
-            <a:chOff x="2208848" y="168832"/>
-            <a:chExt cx="7576623" cy="5099498"/>
+            <a:off x="2348144" y="585340"/>
+            <a:ext cx="7559622" cy="4674467"/>
+            <a:chOff x="2348144" y="585340"/>
+            <a:chExt cx="7559622" cy="4674467"/>
           </a:xfrm>
         </p:grpSpPr>
-        <p:sp>
-          <p:nvSpPr>
-            <p:cNvPr id="4" name="Freeform: Shape 3">
+        <p:grpSp>
+          <p:nvGrpSpPr>
+            <p:cNvPr id="2" name="Group 1">
               <a:extLst>
                 <a:ext uri="{FF2B5EF4-FFF2-40B4-BE49-F238E27FC236}">
-                  <a16:creationId xmlns:a16="http://schemas.microsoft.com/office/drawing/2014/main" id="{97E3A5C0-31BB-4D11-BFE1-9C2F3A851A2A}"/>
+                  <a16:creationId xmlns:a16="http://schemas.microsoft.com/office/drawing/2014/main" id="{94D6302E-795F-4023-8E3F-FE331064D6B2}"/>
                 </a:ext>
               </a:extLst>
             </p:cNvPr>
-            <p:cNvSpPr/>
+            <p:cNvGrpSpPr/>
             <p:nvPr/>
-          </p:nvSpPr>
-          <p:spPr>
-            <a:xfrm flipV="1">
-              <a:off x="2606264" y="397947"/>
-              <a:ext cx="1964563" cy="1820736"/>
+          </p:nvGrpSpPr>
+          <p:grpSpPr>
+            <a:xfrm>
+              <a:off x="2348144" y="2966773"/>
+              <a:ext cx="7559622" cy="2293034"/>
+              <a:chOff x="2225849" y="168832"/>
+              <a:chExt cx="7559622" cy="2293034"/>
             </a:xfrm>
-            <a:custGeom>
-              <a:avLst/>
-              <a:gdLst>
-                <a:gd name="connsiteX0" fmla="*/ 0 w 1937657"/>
-                <a:gd name="connsiteY0" fmla="*/ 689325 h 1781860"/>
-                <a:gd name="connsiteX1" fmla="*/ 667657 w 1937657"/>
-                <a:gd name="connsiteY1" fmla="*/ 790925 h 1781860"/>
-                <a:gd name="connsiteX2" fmla="*/ 936171 w 1937657"/>
-                <a:gd name="connsiteY2" fmla="*/ 21668 h 1781860"/>
-                <a:gd name="connsiteX3" fmla="*/ 1095828 w 1937657"/>
-                <a:gd name="connsiteY3" fmla="*/ 1777897 h 1781860"/>
-                <a:gd name="connsiteX4" fmla="*/ 1284514 w 1937657"/>
-                <a:gd name="connsiteY4" fmla="*/ 507897 h 1781860"/>
-                <a:gd name="connsiteX5" fmla="*/ 1487714 w 1937657"/>
-                <a:gd name="connsiteY5" fmla="*/ 790925 h 1781860"/>
-                <a:gd name="connsiteX6" fmla="*/ 1937657 w 1937657"/>
-                <a:gd name="connsiteY6" fmla="*/ 653040 h 1781860"/>
-                <a:gd name="connsiteX0" fmla="*/ 0 w 1928132"/>
-                <a:gd name="connsiteY0" fmla="*/ 794496 h 1782256"/>
-                <a:gd name="connsiteX1" fmla="*/ 658132 w 1928132"/>
-                <a:gd name="connsiteY1" fmla="*/ 791321 h 1782256"/>
-                <a:gd name="connsiteX2" fmla="*/ 926646 w 1928132"/>
-                <a:gd name="connsiteY2" fmla="*/ 22064 h 1782256"/>
-                <a:gd name="connsiteX3" fmla="*/ 1086303 w 1928132"/>
-                <a:gd name="connsiteY3" fmla="*/ 1778293 h 1782256"/>
-                <a:gd name="connsiteX4" fmla="*/ 1274989 w 1928132"/>
-                <a:gd name="connsiteY4" fmla="*/ 508293 h 1782256"/>
-                <a:gd name="connsiteX5" fmla="*/ 1478189 w 1928132"/>
-                <a:gd name="connsiteY5" fmla="*/ 791321 h 1782256"/>
-                <a:gd name="connsiteX6" fmla="*/ 1928132 w 1928132"/>
-                <a:gd name="connsiteY6" fmla="*/ 653436 h 1782256"/>
-                <a:gd name="connsiteX0" fmla="*/ 0 w 1928132"/>
-                <a:gd name="connsiteY0" fmla="*/ 794496 h 1782256"/>
-                <a:gd name="connsiteX1" fmla="*/ 658132 w 1928132"/>
-                <a:gd name="connsiteY1" fmla="*/ 791321 h 1782256"/>
-                <a:gd name="connsiteX2" fmla="*/ 926646 w 1928132"/>
-                <a:gd name="connsiteY2" fmla="*/ 22064 h 1782256"/>
-                <a:gd name="connsiteX3" fmla="*/ 1086303 w 1928132"/>
-                <a:gd name="connsiteY3" fmla="*/ 1778293 h 1782256"/>
-                <a:gd name="connsiteX4" fmla="*/ 1274989 w 1928132"/>
-                <a:gd name="connsiteY4" fmla="*/ 508293 h 1782256"/>
-                <a:gd name="connsiteX5" fmla="*/ 1478189 w 1928132"/>
-                <a:gd name="connsiteY5" fmla="*/ 791321 h 1782256"/>
-                <a:gd name="connsiteX6" fmla="*/ 1928132 w 1928132"/>
-                <a:gd name="connsiteY6" fmla="*/ 653436 h 1782256"/>
-                <a:gd name="connsiteX0" fmla="*/ 0 w 1928132"/>
-                <a:gd name="connsiteY0" fmla="*/ 794496 h 1782256"/>
-                <a:gd name="connsiteX1" fmla="*/ 658132 w 1928132"/>
-                <a:gd name="connsiteY1" fmla="*/ 791321 h 1782256"/>
-                <a:gd name="connsiteX2" fmla="*/ 926646 w 1928132"/>
-                <a:gd name="connsiteY2" fmla="*/ 22064 h 1782256"/>
-                <a:gd name="connsiteX3" fmla="*/ 1086303 w 1928132"/>
-                <a:gd name="connsiteY3" fmla="*/ 1778293 h 1782256"/>
-                <a:gd name="connsiteX4" fmla="*/ 1274989 w 1928132"/>
-                <a:gd name="connsiteY4" fmla="*/ 508293 h 1782256"/>
-                <a:gd name="connsiteX5" fmla="*/ 1478189 w 1928132"/>
-                <a:gd name="connsiteY5" fmla="*/ 791321 h 1782256"/>
-                <a:gd name="connsiteX6" fmla="*/ 1928132 w 1928132"/>
-                <a:gd name="connsiteY6" fmla="*/ 653436 h 1782256"/>
-                <a:gd name="connsiteX0" fmla="*/ 0 w 1928132"/>
-                <a:gd name="connsiteY0" fmla="*/ 793349 h 1781109"/>
-                <a:gd name="connsiteX1" fmla="*/ 658132 w 1928132"/>
-                <a:gd name="connsiteY1" fmla="*/ 790174 h 1781109"/>
-                <a:gd name="connsiteX2" fmla="*/ 926646 w 1928132"/>
-                <a:gd name="connsiteY2" fmla="*/ 20917 h 1781109"/>
-                <a:gd name="connsiteX3" fmla="*/ 1086303 w 1928132"/>
-                <a:gd name="connsiteY3" fmla="*/ 1777146 h 1781109"/>
-                <a:gd name="connsiteX4" fmla="*/ 1274989 w 1928132"/>
-                <a:gd name="connsiteY4" fmla="*/ 507146 h 1781109"/>
-                <a:gd name="connsiteX5" fmla="*/ 1478189 w 1928132"/>
-                <a:gd name="connsiteY5" fmla="*/ 790174 h 1781109"/>
-                <a:gd name="connsiteX6" fmla="*/ 1928132 w 1928132"/>
-                <a:gd name="connsiteY6" fmla="*/ 652289 h 1781109"/>
-                <a:gd name="connsiteX0" fmla="*/ 0 w 1966232"/>
-                <a:gd name="connsiteY0" fmla="*/ 793349 h 1781109"/>
-                <a:gd name="connsiteX1" fmla="*/ 658132 w 1966232"/>
-                <a:gd name="connsiteY1" fmla="*/ 790174 h 1781109"/>
-                <a:gd name="connsiteX2" fmla="*/ 926646 w 1966232"/>
-                <a:gd name="connsiteY2" fmla="*/ 20917 h 1781109"/>
-                <a:gd name="connsiteX3" fmla="*/ 1086303 w 1966232"/>
-                <a:gd name="connsiteY3" fmla="*/ 1777146 h 1781109"/>
-                <a:gd name="connsiteX4" fmla="*/ 1274989 w 1966232"/>
-                <a:gd name="connsiteY4" fmla="*/ 507146 h 1781109"/>
-                <a:gd name="connsiteX5" fmla="*/ 1478189 w 1966232"/>
-                <a:gd name="connsiteY5" fmla="*/ 790174 h 1781109"/>
-                <a:gd name="connsiteX6" fmla="*/ 1966232 w 1966232"/>
-                <a:gd name="connsiteY6" fmla="*/ 823739 h 1781109"/>
-              </a:gdLst>
-              <a:ahLst/>
-              <a:cxnLst>
-                <a:cxn ang="0">
-                  <a:pos x="connsiteX0" y="connsiteY0"/>
-                </a:cxn>
-                <a:cxn ang="0">
-                  <a:pos x="connsiteX1" y="connsiteY1"/>
-                </a:cxn>
-                <a:cxn ang="0">
-                  <a:pos x="connsiteX2" y="connsiteY2"/>
-                </a:cxn>
-                <a:cxn ang="0">
-                  <a:pos x="connsiteX3" y="connsiteY3"/>
-                </a:cxn>
-                <a:cxn ang="0">
-                  <a:pos x="connsiteX4" y="connsiteY4"/>
-                </a:cxn>
-                <a:cxn ang="0">
-                  <a:pos x="connsiteX5" y="connsiteY5"/>
-                </a:cxn>
-                <a:cxn ang="0">
-                  <a:pos x="connsiteX6" y="connsiteY6"/>
-                </a:cxn>
-              </a:cxnLst>
-              <a:rect l="l" t="t" r="r" b="b"/>
-              <a:pathLst>
-                <a:path w="1966232" h="1781109">
-                  <a:moveTo>
-                    <a:pt x="0" y="793349"/>
-                  </a:moveTo>
-                  <a:cubicBezTo>
-                    <a:pt x="260576" y="795012"/>
-                    <a:pt x="489404" y="866526"/>
-                    <a:pt x="658132" y="790174"/>
-                  </a:cubicBezTo>
-                  <a:cubicBezTo>
-                    <a:pt x="826860" y="713822"/>
-                    <a:pt x="855284" y="-143578"/>
-                    <a:pt x="926646" y="20917"/>
-                  </a:cubicBezTo>
-                  <a:cubicBezTo>
-                    <a:pt x="998008" y="185412"/>
-                    <a:pt x="1028246" y="1696108"/>
-                    <a:pt x="1086303" y="1777146"/>
-                  </a:cubicBezTo>
-                  <a:cubicBezTo>
-                    <a:pt x="1144360" y="1858184"/>
-                    <a:pt x="1209675" y="671641"/>
-                    <a:pt x="1274989" y="507146"/>
-                  </a:cubicBezTo>
-                  <a:cubicBezTo>
-                    <a:pt x="1340303" y="342651"/>
-                    <a:pt x="1362982" y="737409"/>
-                    <a:pt x="1478189" y="790174"/>
-                  </a:cubicBezTo>
-                  <a:cubicBezTo>
-                    <a:pt x="1593396" y="842940"/>
-                    <a:pt x="1875518" y="808015"/>
-                    <a:pt x="1966232" y="823739"/>
-                  </a:cubicBezTo>
-                </a:path>
-              </a:pathLst>
-            </a:custGeom>
-            <a:noFill/>
-            <a:ln w="38100">
+          </p:grpSpPr>
+          <p:sp>
+            <p:nvSpPr>
+              <p:cNvPr id="4" name="Freeform: Shape 3">
+                <a:extLst>
+                  <a:ext uri="{FF2B5EF4-FFF2-40B4-BE49-F238E27FC236}">
+                    <a16:creationId xmlns:a16="http://schemas.microsoft.com/office/drawing/2014/main" id="{97E3A5C0-31BB-4D11-BFE1-9C2F3A851A2A}"/>
+                  </a:ext>
+                </a:extLst>
+              </p:cNvPr>
+              <p:cNvSpPr/>
+              <p:nvPr/>
+            </p:nvSpPr>
+            <p:spPr>
+              <a:xfrm flipV="1">
+                <a:off x="2606264" y="397947"/>
+                <a:ext cx="1964563" cy="1820736"/>
+              </a:xfrm>
+              <a:custGeom>
+                <a:avLst/>
+                <a:gdLst>
+                  <a:gd name="connsiteX0" fmla="*/ 0 w 1937657"/>
+                  <a:gd name="connsiteY0" fmla="*/ 689325 h 1781860"/>
+                  <a:gd name="connsiteX1" fmla="*/ 667657 w 1937657"/>
+                  <a:gd name="connsiteY1" fmla="*/ 790925 h 1781860"/>
+                  <a:gd name="connsiteX2" fmla="*/ 936171 w 1937657"/>
+                  <a:gd name="connsiteY2" fmla="*/ 21668 h 1781860"/>
+                  <a:gd name="connsiteX3" fmla="*/ 1095828 w 1937657"/>
+                  <a:gd name="connsiteY3" fmla="*/ 1777897 h 1781860"/>
+                  <a:gd name="connsiteX4" fmla="*/ 1284514 w 1937657"/>
+                  <a:gd name="connsiteY4" fmla="*/ 507897 h 1781860"/>
+                  <a:gd name="connsiteX5" fmla="*/ 1487714 w 1937657"/>
+                  <a:gd name="connsiteY5" fmla="*/ 790925 h 1781860"/>
+                  <a:gd name="connsiteX6" fmla="*/ 1937657 w 1937657"/>
+                  <a:gd name="connsiteY6" fmla="*/ 653040 h 1781860"/>
+                  <a:gd name="connsiteX0" fmla="*/ 0 w 1928132"/>
+                  <a:gd name="connsiteY0" fmla="*/ 794496 h 1782256"/>
+                  <a:gd name="connsiteX1" fmla="*/ 658132 w 1928132"/>
+                  <a:gd name="connsiteY1" fmla="*/ 791321 h 1782256"/>
+                  <a:gd name="connsiteX2" fmla="*/ 926646 w 1928132"/>
+                  <a:gd name="connsiteY2" fmla="*/ 22064 h 1782256"/>
+                  <a:gd name="connsiteX3" fmla="*/ 1086303 w 1928132"/>
+                  <a:gd name="connsiteY3" fmla="*/ 1778293 h 1782256"/>
+                  <a:gd name="connsiteX4" fmla="*/ 1274989 w 1928132"/>
+                  <a:gd name="connsiteY4" fmla="*/ 508293 h 1782256"/>
+                  <a:gd name="connsiteX5" fmla="*/ 1478189 w 1928132"/>
+                  <a:gd name="connsiteY5" fmla="*/ 791321 h 1782256"/>
+                  <a:gd name="connsiteX6" fmla="*/ 1928132 w 1928132"/>
+                  <a:gd name="connsiteY6" fmla="*/ 653436 h 1782256"/>
+                  <a:gd name="connsiteX0" fmla="*/ 0 w 1928132"/>
+                  <a:gd name="connsiteY0" fmla="*/ 794496 h 1782256"/>
+                  <a:gd name="connsiteX1" fmla="*/ 658132 w 1928132"/>
+                  <a:gd name="connsiteY1" fmla="*/ 791321 h 1782256"/>
+                  <a:gd name="connsiteX2" fmla="*/ 926646 w 1928132"/>
+                  <a:gd name="connsiteY2" fmla="*/ 22064 h 1782256"/>
+                  <a:gd name="connsiteX3" fmla="*/ 1086303 w 1928132"/>
+                  <a:gd name="connsiteY3" fmla="*/ 1778293 h 1782256"/>
+                  <a:gd name="connsiteX4" fmla="*/ 1274989 w 1928132"/>
+                  <a:gd name="connsiteY4" fmla="*/ 508293 h 1782256"/>
+                  <a:gd name="connsiteX5" fmla="*/ 1478189 w 1928132"/>
+                  <a:gd name="connsiteY5" fmla="*/ 791321 h 1782256"/>
+                  <a:gd name="connsiteX6" fmla="*/ 1928132 w 1928132"/>
+                  <a:gd name="connsiteY6" fmla="*/ 653436 h 1782256"/>
+                  <a:gd name="connsiteX0" fmla="*/ 0 w 1928132"/>
+                  <a:gd name="connsiteY0" fmla="*/ 794496 h 1782256"/>
+                  <a:gd name="connsiteX1" fmla="*/ 658132 w 1928132"/>
+                  <a:gd name="connsiteY1" fmla="*/ 791321 h 1782256"/>
+                  <a:gd name="connsiteX2" fmla="*/ 926646 w 1928132"/>
+                  <a:gd name="connsiteY2" fmla="*/ 22064 h 1782256"/>
+                  <a:gd name="connsiteX3" fmla="*/ 1086303 w 1928132"/>
+                  <a:gd name="connsiteY3" fmla="*/ 1778293 h 1782256"/>
+                  <a:gd name="connsiteX4" fmla="*/ 1274989 w 1928132"/>
+                  <a:gd name="connsiteY4" fmla="*/ 508293 h 1782256"/>
+                  <a:gd name="connsiteX5" fmla="*/ 1478189 w 1928132"/>
+                  <a:gd name="connsiteY5" fmla="*/ 791321 h 1782256"/>
+                  <a:gd name="connsiteX6" fmla="*/ 1928132 w 1928132"/>
+                  <a:gd name="connsiteY6" fmla="*/ 653436 h 1782256"/>
+                  <a:gd name="connsiteX0" fmla="*/ 0 w 1928132"/>
+                  <a:gd name="connsiteY0" fmla="*/ 793349 h 1781109"/>
+                  <a:gd name="connsiteX1" fmla="*/ 658132 w 1928132"/>
+                  <a:gd name="connsiteY1" fmla="*/ 790174 h 1781109"/>
+                  <a:gd name="connsiteX2" fmla="*/ 926646 w 1928132"/>
+                  <a:gd name="connsiteY2" fmla="*/ 20917 h 1781109"/>
+                  <a:gd name="connsiteX3" fmla="*/ 1086303 w 1928132"/>
+                  <a:gd name="connsiteY3" fmla="*/ 1777146 h 1781109"/>
+                  <a:gd name="connsiteX4" fmla="*/ 1274989 w 1928132"/>
+                  <a:gd name="connsiteY4" fmla="*/ 507146 h 1781109"/>
+                  <a:gd name="connsiteX5" fmla="*/ 1478189 w 1928132"/>
+                  <a:gd name="connsiteY5" fmla="*/ 790174 h 1781109"/>
+                  <a:gd name="connsiteX6" fmla="*/ 1928132 w 1928132"/>
+                  <a:gd name="connsiteY6" fmla="*/ 652289 h 1781109"/>
+                  <a:gd name="connsiteX0" fmla="*/ 0 w 1966232"/>
+                  <a:gd name="connsiteY0" fmla="*/ 793349 h 1781109"/>
+                  <a:gd name="connsiteX1" fmla="*/ 658132 w 1966232"/>
+                  <a:gd name="connsiteY1" fmla="*/ 790174 h 1781109"/>
+                  <a:gd name="connsiteX2" fmla="*/ 926646 w 1966232"/>
+                  <a:gd name="connsiteY2" fmla="*/ 20917 h 1781109"/>
+                  <a:gd name="connsiteX3" fmla="*/ 1086303 w 1966232"/>
+                  <a:gd name="connsiteY3" fmla="*/ 1777146 h 1781109"/>
+                  <a:gd name="connsiteX4" fmla="*/ 1274989 w 1966232"/>
+                  <a:gd name="connsiteY4" fmla="*/ 507146 h 1781109"/>
+                  <a:gd name="connsiteX5" fmla="*/ 1478189 w 1966232"/>
+                  <a:gd name="connsiteY5" fmla="*/ 790174 h 1781109"/>
+                  <a:gd name="connsiteX6" fmla="*/ 1966232 w 1966232"/>
+                  <a:gd name="connsiteY6" fmla="*/ 823739 h 1781109"/>
+                </a:gdLst>
+                <a:ahLst/>
+                <a:cxnLst>
+                  <a:cxn ang="0">
+                    <a:pos x="connsiteX0" y="connsiteY0"/>
+                  </a:cxn>
+                  <a:cxn ang="0">
+                    <a:pos x="connsiteX1" y="connsiteY1"/>
+                  </a:cxn>
+                  <a:cxn ang="0">
+                    <a:pos x="connsiteX2" y="connsiteY2"/>
+                  </a:cxn>
+                  <a:cxn ang="0">
+                    <a:pos x="connsiteX3" y="connsiteY3"/>
+                  </a:cxn>
+                  <a:cxn ang="0">
+                    <a:pos x="connsiteX4" y="connsiteY4"/>
+                  </a:cxn>
+                  <a:cxn ang="0">
+                    <a:pos x="connsiteX5" y="connsiteY5"/>
+                  </a:cxn>
+                  <a:cxn ang="0">
+                    <a:pos x="connsiteX6" y="connsiteY6"/>
+                  </a:cxn>
+                </a:cxnLst>
+                <a:rect l="l" t="t" r="r" b="b"/>
+                <a:pathLst>
+                  <a:path w="1966232" h="1781109">
+                    <a:moveTo>
+                      <a:pt x="0" y="793349"/>
+                    </a:moveTo>
+                    <a:cubicBezTo>
+                      <a:pt x="260576" y="795012"/>
+                      <a:pt x="489404" y="866526"/>
+                      <a:pt x="658132" y="790174"/>
+                    </a:cubicBezTo>
+                    <a:cubicBezTo>
+                      <a:pt x="826860" y="713822"/>
+                      <a:pt x="855284" y="-143578"/>
+                      <a:pt x="926646" y="20917"/>
+                    </a:cubicBezTo>
+                    <a:cubicBezTo>
+                      <a:pt x="998008" y="185412"/>
+                      <a:pt x="1028246" y="1696108"/>
+                      <a:pt x="1086303" y="1777146"/>
+                    </a:cubicBezTo>
+                    <a:cubicBezTo>
+                      <a:pt x="1144360" y="1858184"/>
+                      <a:pt x="1209675" y="671641"/>
+                      <a:pt x="1274989" y="507146"/>
+                    </a:cubicBezTo>
+                    <a:cubicBezTo>
+                      <a:pt x="1340303" y="342651"/>
+                      <a:pt x="1362982" y="737409"/>
+                      <a:pt x="1478189" y="790174"/>
+                    </a:cubicBezTo>
+                    <a:cubicBezTo>
+                      <a:pt x="1593396" y="842940"/>
+                      <a:pt x="1875518" y="808015"/>
+                      <a:pt x="1966232" y="823739"/>
+                    </a:cubicBezTo>
+                  </a:path>
+                </a:pathLst>
+              </a:custGeom>
+              <a:noFill/>
+              <a:ln w="38100">
+                <a:solidFill>
+                  <a:schemeClr val="tx1"/>
+                </a:solidFill>
+              </a:ln>
+            </p:spPr>
+            <p:style>
+              <a:lnRef idx="2">
+                <a:schemeClr val="accent1">
+                  <a:shade val="50000"/>
+                </a:schemeClr>
+              </a:lnRef>
+              <a:fillRef idx="1">
+                <a:schemeClr val="accent1"/>
+              </a:fillRef>
+              <a:effectRef idx="0">
+                <a:schemeClr val="accent1"/>
+              </a:effectRef>
+              <a:fontRef idx="minor">
+                <a:schemeClr val="lt1"/>
+              </a:fontRef>
+            </p:style>
+            <p:txBody>
+              <a:bodyPr rtlCol="0" anchor="ctr"/>
+              <a:lstStyle/>
+              <a:p>
+                <a:pPr algn="ctr"/>
+                <a:endParaRPr lang="en-US"/>
+              </a:p>
+            </p:txBody>
+          </p:sp>
+          <mc:AlternateContent xmlns:mc="http://schemas.openxmlformats.org/markup-compatibility/2006">
+            <mc:Choice xmlns:a14="http://schemas.microsoft.com/office/drawing/2010/main" Requires="a14">
+              <p:sp>
+                <p:nvSpPr>
+                  <p:cNvPr id="5" name="Rectangle 4">
+                    <a:extLst>
+                      <a:ext uri="{FF2B5EF4-FFF2-40B4-BE49-F238E27FC236}">
+                        <a16:creationId xmlns:a16="http://schemas.microsoft.com/office/drawing/2014/main" id="{36544E4B-80A5-41A0-838E-9A316D978AB2}"/>
+                      </a:ext>
+                    </a:extLst>
+                  </p:cNvPr>
+                  <p:cNvSpPr/>
+                  <p:nvPr/>
+                </p:nvSpPr>
+                <p:spPr>
+                  <a:xfrm>
+                    <a:off x="4846321" y="168832"/>
+                    <a:ext cx="358725" cy="2293034"/>
+                  </a:xfrm>
+                  <a:prstGeom prst="rect">
+                    <a:avLst/>
+                  </a:prstGeom>
+                  <a:solidFill>
+                    <a:schemeClr val="accent4">
+                      <a:lumMod val="40000"/>
+                      <a:lumOff val="60000"/>
+                    </a:schemeClr>
+                  </a:solidFill>
+                  <a:ln w="19050">
+                    <a:solidFill>
+                      <a:schemeClr val="tx1"/>
+                    </a:solidFill>
+                  </a:ln>
+                </p:spPr>
+                <p:style>
+                  <a:lnRef idx="2">
+                    <a:schemeClr val="accent1">
+                      <a:shade val="50000"/>
+                    </a:schemeClr>
+                  </a:lnRef>
+                  <a:fillRef idx="1">
+                    <a:schemeClr val="accent1"/>
+                  </a:fillRef>
+                  <a:effectRef idx="0">
+                    <a:schemeClr val="accent1"/>
+                  </a:effectRef>
+                  <a:fontRef idx="minor">
+                    <a:schemeClr val="lt1"/>
+                  </a:fontRef>
+                </p:style>
+                <p:txBody>
+                  <a:bodyPr rtlCol="0" anchor="ctr"/>
+                  <a:lstStyle/>
+                  <a:p>
+                    <a:pPr algn="ctr"/>
+                    <a14:m>
+                      <m:oMathPara xmlns:m="http://schemas.openxmlformats.org/officeDocument/2006/math">
+                        <m:oMathParaPr>
+                          <m:jc m:val="centerGroup"/>
+                        </m:oMathParaPr>
+                        <m:oMath xmlns:m="http://schemas.openxmlformats.org/officeDocument/2006/math">
+                          <m:sSub>
+                            <m:sSubPr>
+                              <m:ctrlPr>
+                                <a:rPr lang="en-US" b="0" i="1" smtClean="0">
+                                  <a:solidFill>
+                                    <a:schemeClr val="tx1"/>
+                                  </a:solidFill>
+                                  <a:latin typeface="Cambria Math" panose="02040503050406030204" pitchFamily="18" charset="0"/>
+                                </a:rPr>
+                              </m:ctrlPr>
+                            </m:sSubPr>
+                            <m:e>
+                              <m:r>
+                                <a:rPr lang="en-US" b="0" i="1" smtClean="0">
+                                  <a:solidFill>
+                                    <a:schemeClr val="tx1"/>
+                                  </a:solidFill>
+                                  <a:latin typeface="Cambria Math" panose="02040503050406030204" pitchFamily="18" charset="0"/>
+                                </a:rPr>
+                                <m:t>𝑛</m:t>
+                              </m:r>
+                            </m:e>
+                            <m:sub>
+                              <m:r>
+                                <a:rPr lang="en-US" b="0" i="1" smtClean="0">
+                                  <a:solidFill>
+                                    <a:schemeClr val="tx1"/>
+                                  </a:solidFill>
+                                  <a:latin typeface="Cambria Math" panose="02040503050406030204" pitchFamily="18" charset="0"/>
+                                </a:rPr>
+                                <m:t>1</m:t>
+                              </m:r>
+                            </m:sub>
+                          </m:sSub>
+                        </m:oMath>
+                      </m:oMathPara>
+                    </a14:m>
+                    <a:endParaRPr lang="en-US" dirty="0"/>
+                  </a:p>
+                </p:txBody>
+              </p:sp>
+            </mc:Choice>
+            <mc:Fallback>
+              <p:sp>
+                <p:nvSpPr>
+                  <p:cNvPr id="5" name="Rectangle 4">
+                    <a:extLst>
+                      <a:ext uri="{FF2B5EF4-FFF2-40B4-BE49-F238E27FC236}">
+                        <a16:creationId xmlns:a16="http://schemas.microsoft.com/office/drawing/2014/main" id="{36544E4B-80A5-41A0-838E-9A316D978AB2}"/>
+                      </a:ext>
+                    </a:extLst>
+                  </p:cNvPr>
+                  <p:cNvSpPr>
+                    <a:spLocks noRot="1" noChangeAspect="1" noMove="1" noResize="1" noEditPoints="1" noAdjustHandles="1" noChangeArrowheads="1" noChangeShapeType="1" noTextEdit="1"/>
+                  </p:cNvSpPr>
+                  <p:nvPr/>
+                </p:nvSpPr>
+                <p:spPr>
+                  <a:xfrm>
+                    <a:off x="4846321" y="168832"/>
+                    <a:ext cx="358725" cy="2293034"/>
+                  </a:xfrm>
+                  <a:prstGeom prst="rect">
+                    <a:avLst/>
+                  </a:prstGeom>
+                  <a:blipFill>
+                    <a:blip r:embed="rId2"/>
+                    <a:stretch>
+                      <a:fillRect l="-6452"/>
+                    </a:stretch>
+                  </a:blipFill>
+                  <a:ln w="19050">
+                    <a:solidFill>
+                      <a:schemeClr val="tx1"/>
+                    </a:solidFill>
+                  </a:ln>
+                </p:spPr>
+                <p:txBody>
+                  <a:bodyPr/>
+                  <a:lstStyle/>
+                  <a:p>
+                    <a:r>
+                      <a:rPr lang="en-US">
+                        <a:noFill/>
+                      </a:rPr>
+                      <a:t> </a:t>
+                    </a:r>
+                  </a:p>
+                </p:txBody>
+              </p:sp>
+            </mc:Fallback>
+          </mc:AlternateContent>
+          <mc:AlternateContent xmlns:mc="http://schemas.openxmlformats.org/markup-compatibility/2006">
+            <mc:Choice xmlns:a14="http://schemas.microsoft.com/office/drawing/2010/main" Requires="a14">
+              <p:sp>
+                <p:nvSpPr>
+                  <p:cNvPr id="6" name="Rectangle 5">
+                    <a:extLst>
+                      <a:ext uri="{FF2B5EF4-FFF2-40B4-BE49-F238E27FC236}">
+                        <a16:creationId xmlns:a16="http://schemas.microsoft.com/office/drawing/2014/main" id="{572F0A15-A837-48EC-9F9C-4CB5FD7C0166}"/>
+                      </a:ext>
+                    </a:extLst>
+                  </p:cNvPr>
+                  <p:cNvSpPr/>
+                  <p:nvPr/>
+                </p:nvSpPr>
+                <p:spPr>
+                  <a:xfrm>
+                    <a:off x="5205046" y="168832"/>
+                    <a:ext cx="634219" cy="2293034"/>
+                  </a:xfrm>
+                  <a:prstGeom prst="rect">
+                    <a:avLst/>
+                  </a:prstGeom>
+                  <a:solidFill>
+                    <a:schemeClr val="accent6">
+                      <a:lumMod val="40000"/>
+                      <a:lumOff val="60000"/>
+                    </a:schemeClr>
+                  </a:solidFill>
+                  <a:ln w="19050">
+                    <a:solidFill>
+                      <a:schemeClr val="tx1"/>
+                    </a:solidFill>
+                  </a:ln>
+                </p:spPr>
+                <p:style>
+                  <a:lnRef idx="2">
+                    <a:schemeClr val="accent1">
+                      <a:shade val="50000"/>
+                    </a:schemeClr>
+                  </a:lnRef>
+                  <a:fillRef idx="1">
+                    <a:schemeClr val="accent1"/>
+                  </a:fillRef>
+                  <a:effectRef idx="0">
+                    <a:schemeClr val="accent1"/>
+                  </a:effectRef>
+                  <a:fontRef idx="minor">
+                    <a:schemeClr val="lt1"/>
+                  </a:fontRef>
+                </p:style>
+                <p:txBody>
+                  <a:bodyPr rtlCol="0" anchor="ctr"/>
+                  <a:lstStyle/>
+                  <a:p>
+                    <a:pPr algn="ctr"/>
+                    <a14:m>
+                      <m:oMathPara xmlns:m="http://schemas.openxmlformats.org/officeDocument/2006/math">
+                        <m:oMathParaPr>
+                          <m:jc m:val="centerGroup"/>
+                        </m:oMathParaPr>
+                        <m:oMath xmlns:m="http://schemas.openxmlformats.org/officeDocument/2006/math">
+                          <m:r>
+                            <a:rPr lang="en-US" b="0" i="1" smtClean="0">
+                              <a:solidFill>
+                                <a:schemeClr val="tx1"/>
+                              </a:solidFill>
+                              <a:latin typeface="Cambria Math" panose="02040503050406030204" pitchFamily="18" charset="0"/>
+                            </a:rPr>
+                            <m:t>?</m:t>
+                          </m:r>
+                        </m:oMath>
+                      </m:oMathPara>
+                    </a14:m>
+                    <a:endParaRPr lang="en-US" dirty="0"/>
+                  </a:p>
+                </p:txBody>
+              </p:sp>
+            </mc:Choice>
+            <mc:Fallback>
+              <p:sp>
+                <p:nvSpPr>
+                  <p:cNvPr id="6" name="Rectangle 5">
+                    <a:extLst>
+                      <a:ext uri="{FF2B5EF4-FFF2-40B4-BE49-F238E27FC236}">
+                        <a16:creationId xmlns:a16="http://schemas.microsoft.com/office/drawing/2014/main" id="{572F0A15-A837-48EC-9F9C-4CB5FD7C0166}"/>
+                      </a:ext>
+                    </a:extLst>
+                  </p:cNvPr>
+                  <p:cNvSpPr>
+                    <a:spLocks noRot="1" noChangeAspect="1" noMove="1" noResize="1" noEditPoints="1" noAdjustHandles="1" noChangeArrowheads="1" noChangeShapeType="1" noTextEdit="1"/>
+                  </p:cNvSpPr>
+                  <p:nvPr/>
+                </p:nvSpPr>
+                <p:spPr>
+                  <a:xfrm>
+                    <a:off x="5205046" y="168832"/>
+                    <a:ext cx="634219" cy="2293034"/>
+                  </a:xfrm>
+                  <a:prstGeom prst="rect">
+                    <a:avLst/>
+                  </a:prstGeom>
+                  <a:blipFill>
+                    <a:blip r:embed="rId3"/>
+                    <a:stretch>
+                      <a:fillRect/>
+                    </a:stretch>
+                  </a:blipFill>
+                  <a:ln w="19050">
+                    <a:solidFill>
+                      <a:schemeClr val="tx1"/>
+                    </a:solidFill>
+                  </a:ln>
+                </p:spPr>
+                <p:txBody>
+                  <a:bodyPr/>
+                  <a:lstStyle/>
+                  <a:p>
+                    <a:r>
+                      <a:rPr lang="en-US">
+                        <a:noFill/>
+                      </a:rPr>
+                      <a:t> </a:t>
+                    </a:r>
+                  </a:p>
+                </p:txBody>
+              </p:sp>
+            </mc:Fallback>
+          </mc:AlternateContent>
+          <p:sp>
+            <p:nvSpPr>
+              <p:cNvPr id="7" name="Rectangle 6">
+                <a:extLst>
+                  <a:ext uri="{FF2B5EF4-FFF2-40B4-BE49-F238E27FC236}">
+                    <a16:creationId xmlns:a16="http://schemas.microsoft.com/office/drawing/2014/main" id="{956B3F29-A46E-4491-84CA-9C3BCD9380C8}"/>
+                  </a:ext>
+                </a:extLst>
+              </p:cNvPr>
+              <p:cNvSpPr/>
+              <p:nvPr/>
+            </p:nvSpPr>
+            <p:spPr>
+              <a:xfrm>
+                <a:off x="5839265" y="168832"/>
+                <a:ext cx="634219" cy="2293034"/>
+              </a:xfrm>
+              <a:prstGeom prst="rect">
+                <a:avLst/>
+              </a:prstGeom>
               <a:solidFill>
-                <a:schemeClr val="tx1"/>
+                <a:schemeClr val="bg1"/>
               </a:solidFill>
-            </a:ln>
-          </p:spPr>
-          <p:style>
-            <a:lnRef idx="2">
-              <a:schemeClr val="accent1">
-                <a:shade val="50000"/>
-              </a:schemeClr>
-            </a:lnRef>
-            <a:fillRef idx="1">
-              <a:schemeClr val="accent1"/>
-            </a:fillRef>
-            <a:effectRef idx="0">
-              <a:schemeClr val="accent1"/>
-            </a:effectRef>
-            <a:fontRef idx="minor">
-              <a:schemeClr val="lt1"/>
-            </a:fontRef>
-          </p:style>
-          <p:txBody>
-            <a:bodyPr rtlCol="0" anchor="ctr"/>
-            <a:lstStyle/>
-            <a:p>
-              <a:pPr algn="ctr"/>
-              <a:endParaRPr lang="en-US"/>
-            </a:p>
-          </p:txBody>
-        </p:sp>
-        <mc:AlternateContent xmlns:mc="http://schemas.openxmlformats.org/markup-compatibility/2006">
-          <mc:Choice xmlns:a14="http://schemas.microsoft.com/office/drawing/2010/main" Requires="a14">
-            <p:sp>
-              <p:nvSpPr>
-                <p:cNvPr id="5" name="Rectangle 4">
-                  <a:extLst>
-                    <a:ext uri="{FF2B5EF4-FFF2-40B4-BE49-F238E27FC236}">
-                      <a16:creationId xmlns:a16="http://schemas.microsoft.com/office/drawing/2014/main" id="{36544E4B-80A5-41A0-838E-9A316D978AB2}"/>
-                    </a:ext>
-                  </a:extLst>
-                </p:cNvPr>
-                <p:cNvSpPr/>
-                <p:nvPr/>
-              </p:nvSpPr>
-              <p:spPr>
-                <a:xfrm>
-                  <a:off x="4846321" y="168832"/>
-                  <a:ext cx="358725" cy="2293034"/>
-                </a:xfrm>
-                <a:prstGeom prst="rect">
-                  <a:avLst/>
-                </a:prstGeom>
+              <a:ln w="19050">
                 <a:solidFill>
-                  <a:schemeClr val="accent4">
-                    <a:lumMod val="40000"/>
-                    <a:lumOff val="60000"/>
-                  </a:schemeClr>
+                  <a:schemeClr val="tx1"/>
                 </a:solidFill>
-                <a:ln w="19050">
+              </a:ln>
+            </p:spPr>
+            <p:style>
+              <a:lnRef idx="2">
+                <a:schemeClr val="accent1">
+                  <a:shade val="50000"/>
+                </a:schemeClr>
+              </a:lnRef>
+              <a:fillRef idx="1">
+                <a:schemeClr val="accent1"/>
+              </a:fillRef>
+              <a:effectRef idx="0">
+                <a:schemeClr val="accent1"/>
+              </a:effectRef>
+              <a:fontRef idx="minor">
+                <a:schemeClr val="lt1"/>
+              </a:fontRef>
+            </p:style>
+            <p:txBody>
+              <a:bodyPr rtlCol="0" anchor="ctr"/>
+              <a:lstStyle/>
+              <a:p>
+                <a:pPr algn="ctr"/>
+                <a:r>
+                  <a:rPr lang="en-US" dirty="0">
+                    <a:solidFill>
+                      <a:schemeClr val="tx1"/>
+                    </a:solidFill>
+                  </a:rPr>
+                  <a:t>…</a:t>
+                </a:r>
+              </a:p>
+            </p:txBody>
+          </p:sp>
+          <mc:AlternateContent xmlns:mc="http://schemas.openxmlformats.org/markup-compatibility/2006">
+            <mc:Choice xmlns:a14="http://schemas.microsoft.com/office/drawing/2010/main" Requires="a14">
+              <p:sp>
+                <p:nvSpPr>
+                  <p:cNvPr id="8" name="Rectangle 7">
+                    <a:extLst>
+                      <a:ext uri="{FF2B5EF4-FFF2-40B4-BE49-F238E27FC236}">
+                        <a16:creationId xmlns:a16="http://schemas.microsoft.com/office/drawing/2014/main" id="{1C8FC3D2-1D8C-49F7-87DB-DE9627330E5F}"/>
+                      </a:ext>
+                    </a:extLst>
+                  </p:cNvPr>
+                  <p:cNvSpPr/>
+                  <p:nvPr/>
+                </p:nvSpPr>
+                <p:spPr>
+                  <a:xfrm>
+                    <a:off x="6473484" y="168832"/>
+                    <a:ext cx="634219" cy="2293034"/>
+                  </a:xfrm>
+                  <a:prstGeom prst="rect">
+                    <a:avLst/>
+                  </a:prstGeom>
                   <a:solidFill>
-                    <a:schemeClr val="tx1"/>
+                    <a:schemeClr val="accent2">
+                      <a:lumMod val="40000"/>
+                      <a:lumOff val="60000"/>
+                    </a:schemeClr>
                   </a:solidFill>
-                </a:ln>
-              </p:spPr>
-              <p:style>
-                <a:lnRef idx="2">
-                  <a:schemeClr val="accent1">
-                    <a:shade val="50000"/>
-                  </a:schemeClr>
-                </a:lnRef>
-                <a:fillRef idx="1">
-                  <a:schemeClr val="accent1"/>
-                </a:fillRef>
-                <a:effectRef idx="0">
-                  <a:schemeClr val="accent1"/>
-                </a:effectRef>
-                <a:fontRef idx="minor">
-                  <a:schemeClr val="lt1"/>
-                </a:fontRef>
-              </p:style>
-              <p:txBody>
-                <a:bodyPr rtlCol="0" anchor="ctr"/>
-                <a:lstStyle/>
-                <a:p>
-                  <a:pPr algn="ctr"/>
-                  <a14:m>
-                    <m:oMathPara xmlns:m="http://schemas.openxmlformats.org/officeDocument/2006/math">
-                      <m:oMathParaPr>
-                        <m:jc m:val="centerGroup"/>
-                      </m:oMathParaPr>
-                      <m:oMath xmlns:m="http://schemas.openxmlformats.org/officeDocument/2006/math">
-                        <m:sSub>
-                          <m:sSubPr>
-                            <m:ctrlPr>
-                              <a:rPr lang="en-US" b="0" i="1" smtClean="0">
-                                <a:solidFill>
-                                  <a:schemeClr val="tx1"/>
-                                </a:solidFill>
-                                <a:latin typeface="Cambria Math" panose="02040503050406030204" pitchFamily="18" charset="0"/>
-                              </a:rPr>
-                            </m:ctrlPr>
-                          </m:sSubPr>
-                          <m:e>
-                            <m:r>
-                              <a:rPr lang="en-US" b="0" i="1" smtClean="0">
-                                <a:solidFill>
-                                  <a:schemeClr val="tx1"/>
-                                </a:solidFill>
-                                <a:latin typeface="Cambria Math" panose="02040503050406030204" pitchFamily="18" charset="0"/>
-                              </a:rPr>
-                              <m:t>𝑛</m:t>
-                            </m:r>
-                          </m:e>
-                          <m:sub>
-                            <m:r>
-                              <a:rPr lang="en-US" b="0" i="1" smtClean="0">
-                                <a:solidFill>
-                                  <a:schemeClr val="tx1"/>
-                                </a:solidFill>
-                                <a:latin typeface="Cambria Math" panose="02040503050406030204" pitchFamily="18" charset="0"/>
-                              </a:rPr>
-                              <m:t>1</m:t>
-                            </m:r>
-                          </m:sub>
-                        </m:sSub>
-                      </m:oMath>
-                    </m:oMathPara>
-                  </a14:m>
-                  <a:endParaRPr lang="en-US" dirty="0"/>
-                </a:p>
-              </p:txBody>
-            </p:sp>
-          </mc:Choice>
-          <mc:Fallback>
-            <p:sp>
-              <p:nvSpPr>
-                <p:cNvPr id="5" name="Rectangle 4">
-                  <a:extLst>
-                    <a:ext uri="{FF2B5EF4-FFF2-40B4-BE49-F238E27FC236}">
-                      <a16:creationId xmlns:a16="http://schemas.microsoft.com/office/drawing/2014/main" id="{36544E4B-80A5-41A0-838E-9A316D978AB2}"/>
-                    </a:ext>
-                  </a:extLst>
-                </p:cNvPr>
-                <p:cNvSpPr>
-                  <a:spLocks noRot="1" noChangeAspect="1" noMove="1" noResize="1" noEditPoints="1" noAdjustHandles="1" noChangeArrowheads="1" noChangeShapeType="1" noTextEdit="1"/>
-                </p:cNvSpPr>
-                <p:nvPr/>
-              </p:nvSpPr>
-              <p:spPr>
-                <a:xfrm>
-                  <a:off x="4846321" y="168832"/>
-                  <a:ext cx="358725" cy="2293034"/>
-                </a:xfrm>
-                <a:prstGeom prst="rect">
-                  <a:avLst/>
-                </a:prstGeom>
-                <a:blipFill>
-                  <a:blip r:embed="rId2"/>
-                  <a:stretch>
-                    <a:fillRect l="-6452"/>
-                  </a:stretch>
-                </a:blipFill>
-                <a:ln w="19050">
-                  <a:solidFill>
-                    <a:schemeClr val="tx1"/>
-                  </a:solidFill>
-                </a:ln>
-              </p:spPr>
-              <p:txBody>
-                <a:bodyPr/>
-                <a:lstStyle/>
-                <a:p>
-                  <a:r>
-                    <a:rPr lang="en-US">
-                      <a:noFill/>
-                    </a:rPr>
-                    <a:t> </a:t>
-                  </a:r>
-                </a:p>
-              </p:txBody>
-            </p:sp>
-          </mc:Fallback>
-        </mc:AlternateContent>
-        <mc:AlternateContent xmlns:mc="http://schemas.openxmlformats.org/markup-compatibility/2006">
-          <mc:Choice xmlns:a14="http://schemas.microsoft.com/office/drawing/2010/main" Requires="a14">
-            <p:sp>
-              <p:nvSpPr>
-                <p:cNvPr id="6" name="Rectangle 5">
-                  <a:extLst>
-                    <a:ext uri="{FF2B5EF4-FFF2-40B4-BE49-F238E27FC236}">
-                      <a16:creationId xmlns:a16="http://schemas.microsoft.com/office/drawing/2014/main" id="{572F0A15-A837-48EC-9F9C-4CB5FD7C0166}"/>
-                    </a:ext>
-                  </a:extLst>
-                </p:cNvPr>
-                <p:cNvSpPr/>
-                <p:nvPr/>
-              </p:nvSpPr>
-              <p:spPr>
-                <a:xfrm>
-                  <a:off x="5205046" y="168832"/>
-                  <a:ext cx="634219" cy="2293034"/>
-                </a:xfrm>
-                <a:prstGeom prst="rect">
-                  <a:avLst/>
-                </a:prstGeom>
+                  <a:ln w="19050">
+                    <a:solidFill>
+                      <a:schemeClr val="tx1"/>
+                    </a:solidFill>
+                  </a:ln>
+                </p:spPr>
+                <p:style>
+                  <a:lnRef idx="2">
+                    <a:schemeClr val="accent1">
+                      <a:shade val="50000"/>
+                    </a:schemeClr>
+                  </a:lnRef>
+                  <a:fillRef idx="1">
+                    <a:schemeClr val="accent1"/>
+                  </a:fillRef>
+                  <a:effectRef idx="0">
+                    <a:schemeClr val="accent1"/>
+                  </a:effectRef>
+                  <a:fontRef idx="minor">
+                    <a:schemeClr val="lt1"/>
+                  </a:fontRef>
+                </p:style>
+                <p:txBody>
+                  <a:bodyPr rtlCol="0" anchor="ctr"/>
+                  <a:lstStyle/>
+                  <a:p>
+                    <a:pPr algn="ctr"/>
+                    <a14:m>
+                      <m:oMathPara xmlns:m="http://schemas.openxmlformats.org/officeDocument/2006/math">
+                        <m:oMathParaPr>
+                          <m:jc m:val="centerGroup"/>
+                        </m:oMathParaPr>
+                        <m:oMath xmlns:m="http://schemas.openxmlformats.org/officeDocument/2006/math">
+                          <m:sSub>
+                            <m:sSubPr>
+                              <m:ctrlPr>
+                                <a:rPr lang="en-US" b="0" i="1" dirty="0" smtClean="0">
+                                  <a:solidFill>
+                                    <a:schemeClr val="tx1"/>
+                                  </a:solidFill>
+                                  <a:latin typeface="Cambria Math" panose="02040503050406030204" pitchFamily="18" charset="0"/>
+                                </a:rPr>
+                              </m:ctrlPr>
+                            </m:sSubPr>
+                            <m:e>
+                              <m:r>
+                                <a:rPr lang="en-US" b="0" i="1" dirty="0" smtClean="0">
+                                  <a:solidFill>
+                                    <a:schemeClr val="tx1"/>
+                                  </a:solidFill>
+                                  <a:latin typeface="Cambria Math" panose="02040503050406030204" pitchFamily="18" charset="0"/>
+                                </a:rPr>
+                                <m:t>𝑛</m:t>
+                              </m:r>
+                            </m:e>
+                            <m:sub>
+                              <m:r>
+                                <a:rPr lang="en-US" b="0" i="1" dirty="0" smtClean="0">
+                                  <a:solidFill>
+                                    <a:schemeClr val="tx1"/>
+                                  </a:solidFill>
+                                  <a:latin typeface="Cambria Math" panose="02040503050406030204" pitchFamily="18" charset="0"/>
+                                </a:rPr>
+                                <m:t>𝑁</m:t>
+                              </m:r>
+                            </m:sub>
+                          </m:sSub>
+                        </m:oMath>
+                      </m:oMathPara>
+                    </a14:m>
+                    <a:endParaRPr lang="en-US" dirty="0">
+                      <a:solidFill>
+                        <a:schemeClr val="tx1"/>
+                      </a:solidFill>
+                    </a:endParaRPr>
+                  </a:p>
+                </p:txBody>
+              </p:sp>
+            </mc:Choice>
+            <mc:Fallback>
+              <p:sp>
+                <p:nvSpPr>
+                  <p:cNvPr id="8" name="Rectangle 7">
+                    <a:extLst>
+                      <a:ext uri="{FF2B5EF4-FFF2-40B4-BE49-F238E27FC236}">
+                        <a16:creationId xmlns:a16="http://schemas.microsoft.com/office/drawing/2014/main" id="{1C8FC3D2-1D8C-49F7-87DB-DE9627330E5F}"/>
+                      </a:ext>
+                    </a:extLst>
+                  </p:cNvPr>
+                  <p:cNvSpPr>
+                    <a:spLocks noRot="1" noChangeAspect="1" noMove="1" noResize="1" noEditPoints="1" noAdjustHandles="1" noChangeArrowheads="1" noChangeShapeType="1" noTextEdit="1"/>
+                  </p:cNvSpPr>
+                  <p:nvPr/>
+                </p:nvSpPr>
+                <p:spPr>
+                  <a:xfrm>
+                    <a:off x="6473484" y="168832"/>
+                    <a:ext cx="634219" cy="2293034"/>
+                  </a:xfrm>
+                  <a:prstGeom prst="rect">
+                    <a:avLst/>
+                  </a:prstGeom>
+                  <a:blipFill>
+                    <a:blip r:embed="rId4"/>
+                    <a:stretch>
+                      <a:fillRect/>
+                    </a:stretch>
+                  </a:blipFill>
+                  <a:ln w="19050">
+                    <a:solidFill>
+                      <a:schemeClr val="tx1"/>
+                    </a:solidFill>
+                  </a:ln>
+                </p:spPr>
+                <p:txBody>
+                  <a:bodyPr/>
+                  <a:lstStyle/>
+                  <a:p>
+                    <a:r>
+                      <a:rPr lang="en-US">
+                        <a:noFill/>
+                      </a:rPr>
+                      <a:t> </a:t>
+                    </a:r>
+                  </a:p>
+                </p:txBody>
+              </p:sp>
+            </mc:Fallback>
+          </mc:AlternateContent>
+          <p:sp>
+            <p:nvSpPr>
+              <p:cNvPr id="9" name="Freeform: Shape 8">
+                <a:extLst>
+                  <a:ext uri="{FF2B5EF4-FFF2-40B4-BE49-F238E27FC236}">
+                    <a16:creationId xmlns:a16="http://schemas.microsoft.com/office/drawing/2014/main" id="{7DCBFC50-93D5-403E-9C81-797E6BC92707}"/>
+                  </a:ext>
+                </a:extLst>
+              </p:cNvPr>
+              <p:cNvSpPr/>
+              <p:nvPr/>
+            </p:nvSpPr>
+            <p:spPr>
+              <a:xfrm flipV="1">
+                <a:off x="7330664" y="898841"/>
+                <a:ext cx="1964563" cy="833016"/>
+              </a:xfrm>
+              <a:custGeom>
+                <a:avLst/>
+                <a:gdLst>
+                  <a:gd name="connsiteX0" fmla="*/ 0 w 1937657"/>
+                  <a:gd name="connsiteY0" fmla="*/ 689325 h 1781860"/>
+                  <a:gd name="connsiteX1" fmla="*/ 667657 w 1937657"/>
+                  <a:gd name="connsiteY1" fmla="*/ 790925 h 1781860"/>
+                  <a:gd name="connsiteX2" fmla="*/ 936171 w 1937657"/>
+                  <a:gd name="connsiteY2" fmla="*/ 21668 h 1781860"/>
+                  <a:gd name="connsiteX3" fmla="*/ 1095828 w 1937657"/>
+                  <a:gd name="connsiteY3" fmla="*/ 1777897 h 1781860"/>
+                  <a:gd name="connsiteX4" fmla="*/ 1284514 w 1937657"/>
+                  <a:gd name="connsiteY4" fmla="*/ 507897 h 1781860"/>
+                  <a:gd name="connsiteX5" fmla="*/ 1487714 w 1937657"/>
+                  <a:gd name="connsiteY5" fmla="*/ 790925 h 1781860"/>
+                  <a:gd name="connsiteX6" fmla="*/ 1937657 w 1937657"/>
+                  <a:gd name="connsiteY6" fmla="*/ 653040 h 1781860"/>
+                  <a:gd name="connsiteX0" fmla="*/ 0 w 1928132"/>
+                  <a:gd name="connsiteY0" fmla="*/ 794496 h 1782256"/>
+                  <a:gd name="connsiteX1" fmla="*/ 658132 w 1928132"/>
+                  <a:gd name="connsiteY1" fmla="*/ 791321 h 1782256"/>
+                  <a:gd name="connsiteX2" fmla="*/ 926646 w 1928132"/>
+                  <a:gd name="connsiteY2" fmla="*/ 22064 h 1782256"/>
+                  <a:gd name="connsiteX3" fmla="*/ 1086303 w 1928132"/>
+                  <a:gd name="connsiteY3" fmla="*/ 1778293 h 1782256"/>
+                  <a:gd name="connsiteX4" fmla="*/ 1274989 w 1928132"/>
+                  <a:gd name="connsiteY4" fmla="*/ 508293 h 1782256"/>
+                  <a:gd name="connsiteX5" fmla="*/ 1478189 w 1928132"/>
+                  <a:gd name="connsiteY5" fmla="*/ 791321 h 1782256"/>
+                  <a:gd name="connsiteX6" fmla="*/ 1928132 w 1928132"/>
+                  <a:gd name="connsiteY6" fmla="*/ 653436 h 1782256"/>
+                  <a:gd name="connsiteX0" fmla="*/ 0 w 1928132"/>
+                  <a:gd name="connsiteY0" fmla="*/ 794496 h 1782256"/>
+                  <a:gd name="connsiteX1" fmla="*/ 658132 w 1928132"/>
+                  <a:gd name="connsiteY1" fmla="*/ 791321 h 1782256"/>
+                  <a:gd name="connsiteX2" fmla="*/ 926646 w 1928132"/>
+                  <a:gd name="connsiteY2" fmla="*/ 22064 h 1782256"/>
+                  <a:gd name="connsiteX3" fmla="*/ 1086303 w 1928132"/>
+                  <a:gd name="connsiteY3" fmla="*/ 1778293 h 1782256"/>
+                  <a:gd name="connsiteX4" fmla="*/ 1274989 w 1928132"/>
+                  <a:gd name="connsiteY4" fmla="*/ 508293 h 1782256"/>
+                  <a:gd name="connsiteX5" fmla="*/ 1478189 w 1928132"/>
+                  <a:gd name="connsiteY5" fmla="*/ 791321 h 1782256"/>
+                  <a:gd name="connsiteX6" fmla="*/ 1928132 w 1928132"/>
+                  <a:gd name="connsiteY6" fmla="*/ 653436 h 1782256"/>
+                  <a:gd name="connsiteX0" fmla="*/ 0 w 1928132"/>
+                  <a:gd name="connsiteY0" fmla="*/ 794496 h 1782256"/>
+                  <a:gd name="connsiteX1" fmla="*/ 658132 w 1928132"/>
+                  <a:gd name="connsiteY1" fmla="*/ 791321 h 1782256"/>
+                  <a:gd name="connsiteX2" fmla="*/ 926646 w 1928132"/>
+                  <a:gd name="connsiteY2" fmla="*/ 22064 h 1782256"/>
+                  <a:gd name="connsiteX3" fmla="*/ 1086303 w 1928132"/>
+                  <a:gd name="connsiteY3" fmla="*/ 1778293 h 1782256"/>
+                  <a:gd name="connsiteX4" fmla="*/ 1274989 w 1928132"/>
+                  <a:gd name="connsiteY4" fmla="*/ 508293 h 1782256"/>
+                  <a:gd name="connsiteX5" fmla="*/ 1478189 w 1928132"/>
+                  <a:gd name="connsiteY5" fmla="*/ 791321 h 1782256"/>
+                  <a:gd name="connsiteX6" fmla="*/ 1928132 w 1928132"/>
+                  <a:gd name="connsiteY6" fmla="*/ 653436 h 1782256"/>
+                  <a:gd name="connsiteX0" fmla="*/ 0 w 1928132"/>
+                  <a:gd name="connsiteY0" fmla="*/ 793349 h 1781109"/>
+                  <a:gd name="connsiteX1" fmla="*/ 658132 w 1928132"/>
+                  <a:gd name="connsiteY1" fmla="*/ 790174 h 1781109"/>
+                  <a:gd name="connsiteX2" fmla="*/ 926646 w 1928132"/>
+                  <a:gd name="connsiteY2" fmla="*/ 20917 h 1781109"/>
+                  <a:gd name="connsiteX3" fmla="*/ 1086303 w 1928132"/>
+                  <a:gd name="connsiteY3" fmla="*/ 1777146 h 1781109"/>
+                  <a:gd name="connsiteX4" fmla="*/ 1274989 w 1928132"/>
+                  <a:gd name="connsiteY4" fmla="*/ 507146 h 1781109"/>
+                  <a:gd name="connsiteX5" fmla="*/ 1478189 w 1928132"/>
+                  <a:gd name="connsiteY5" fmla="*/ 790174 h 1781109"/>
+                  <a:gd name="connsiteX6" fmla="*/ 1928132 w 1928132"/>
+                  <a:gd name="connsiteY6" fmla="*/ 652289 h 1781109"/>
+                  <a:gd name="connsiteX0" fmla="*/ 0 w 1966232"/>
+                  <a:gd name="connsiteY0" fmla="*/ 793349 h 1781109"/>
+                  <a:gd name="connsiteX1" fmla="*/ 658132 w 1966232"/>
+                  <a:gd name="connsiteY1" fmla="*/ 790174 h 1781109"/>
+                  <a:gd name="connsiteX2" fmla="*/ 926646 w 1966232"/>
+                  <a:gd name="connsiteY2" fmla="*/ 20917 h 1781109"/>
+                  <a:gd name="connsiteX3" fmla="*/ 1086303 w 1966232"/>
+                  <a:gd name="connsiteY3" fmla="*/ 1777146 h 1781109"/>
+                  <a:gd name="connsiteX4" fmla="*/ 1274989 w 1966232"/>
+                  <a:gd name="connsiteY4" fmla="*/ 507146 h 1781109"/>
+                  <a:gd name="connsiteX5" fmla="*/ 1478189 w 1966232"/>
+                  <a:gd name="connsiteY5" fmla="*/ 790174 h 1781109"/>
+                  <a:gd name="connsiteX6" fmla="*/ 1966232 w 1966232"/>
+                  <a:gd name="connsiteY6" fmla="*/ 823739 h 1781109"/>
+                </a:gdLst>
+                <a:ahLst/>
+                <a:cxnLst>
+                  <a:cxn ang="0">
+                    <a:pos x="connsiteX0" y="connsiteY0"/>
+                  </a:cxn>
+                  <a:cxn ang="0">
+                    <a:pos x="connsiteX1" y="connsiteY1"/>
+                  </a:cxn>
+                  <a:cxn ang="0">
+                    <a:pos x="connsiteX2" y="connsiteY2"/>
+                  </a:cxn>
+                  <a:cxn ang="0">
+                    <a:pos x="connsiteX3" y="connsiteY3"/>
+                  </a:cxn>
+                  <a:cxn ang="0">
+                    <a:pos x="connsiteX4" y="connsiteY4"/>
+                  </a:cxn>
+                  <a:cxn ang="0">
+                    <a:pos x="connsiteX5" y="connsiteY5"/>
+                  </a:cxn>
+                  <a:cxn ang="0">
+                    <a:pos x="connsiteX6" y="connsiteY6"/>
+                  </a:cxn>
+                </a:cxnLst>
+                <a:rect l="l" t="t" r="r" b="b"/>
+                <a:pathLst>
+                  <a:path w="1966232" h="1781109">
+                    <a:moveTo>
+                      <a:pt x="0" y="793349"/>
+                    </a:moveTo>
+                    <a:cubicBezTo>
+                      <a:pt x="260576" y="795012"/>
+                      <a:pt x="489404" y="866526"/>
+                      <a:pt x="658132" y="790174"/>
+                    </a:cubicBezTo>
+                    <a:cubicBezTo>
+                      <a:pt x="826860" y="713822"/>
+                      <a:pt x="855284" y="-143578"/>
+                      <a:pt x="926646" y="20917"/>
+                    </a:cubicBezTo>
+                    <a:cubicBezTo>
+                      <a:pt x="998008" y="185412"/>
+                      <a:pt x="1028246" y="1696108"/>
+                      <a:pt x="1086303" y="1777146"/>
+                    </a:cubicBezTo>
+                    <a:cubicBezTo>
+                      <a:pt x="1144360" y="1858184"/>
+                      <a:pt x="1209675" y="671641"/>
+                      <a:pt x="1274989" y="507146"/>
+                    </a:cubicBezTo>
+                    <a:cubicBezTo>
+                      <a:pt x="1340303" y="342651"/>
+                      <a:pt x="1362982" y="737409"/>
+                      <a:pt x="1478189" y="790174"/>
+                    </a:cubicBezTo>
+                    <a:cubicBezTo>
+                      <a:pt x="1593396" y="842940"/>
+                      <a:pt x="1875518" y="808015"/>
+                      <a:pt x="1966232" y="823739"/>
+                    </a:cubicBezTo>
+                  </a:path>
+                </a:pathLst>
+              </a:custGeom>
+              <a:noFill/>
+              <a:ln w="38100">
                 <a:solidFill>
-                  <a:schemeClr val="accent6">
-                    <a:lumMod val="40000"/>
-                    <a:lumOff val="60000"/>
-                  </a:schemeClr>
+                  <a:schemeClr val="tx1"/>
                 </a:solidFill>
-                <a:ln w="19050">
-                  <a:solidFill>
-                    <a:schemeClr val="tx1"/>
-                  </a:solidFill>
-                </a:ln>
-              </p:spPr>
-              <p:style>
-                <a:lnRef idx="2">
-                  <a:schemeClr val="accent1">
-                    <a:shade val="50000"/>
-                  </a:schemeClr>
-                </a:lnRef>
-                <a:fillRef idx="1">
-                  <a:schemeClr val="accent1"/>
-                </a:fillRef>
-                <a:effectRef idx="0">
-                  <a:schemeClr val="accent1"/>
-                </a:effectRef>
-                <a:fontRef idx="minor">
-                  <a:schemeClr val="lt1"/>
-                </a:fontRef>
-              </p:style>
-              <p:txBody>
-                <a:bodyPr rtlCol="0" anchor="ctr"/>
-                <a:lstStyle/>
-                <a:p>
-                  <a:pPr algn="ctr"/>
-                  <a14:m>
-                    <m:oMathPara xmlns:m="http://schemas.openxmlformats.org/officeDocument/2006/math">
-                      <m:oMathParaPr>
-                        <m:jc m:val="centerGroup"/>
-                      </m:oMathParaPr>
-                      <m:oMath xmlns:m="http://schemas.openxmlformats.org/officeDocument/2006/math">
-                        <m:r>
-                          <a:rPr lang="en-US" b="0" i="1" smtClean="0">
-                            <a:solidFill>
-                              <a:schemeClr val="tx1"/>
-                            </a:solidFill>
-                            <a:latin typeface="Cambria Math" panose="02040503050406030204" pitchFamily="18" charset="0"/>
-                          </a:rPr>
-                          <m:t>?</m:t>
-                        </m:r>
-                      </m:oMath>
-                    </m:oMathPara>
-                  </a14:m>
-                  <a:endParaRPr lang="en-US" dirty="0"/>
-                </a:p>
-              </p:txBody>
-            </p:sp>
-          </mc:Choice>
-          <mc:Fallback>
-            <p:sp>
-              <p:nvSpPr>
-                <p:cNvPr id="6" name="Rectangle 5">
-                  <a:extLst>
-                    <a:ext uri="{FF2B5EF4-FFF2-40B4-BE49-F238E27FC236}">
-                      <a16:creationId xmlns:a16="http://schemas.microsoft.com/office/drawing/2014/main" id="{572F0A15-A837-48EC-9F9C-4CB5FD7C0166}"/>
-                    </a:ext>
-                  </a:extLst>
-                </p:cNvPr>
-                <p:cNvSpPr>
-                  <a:spLocks noRot="1" noChangeAspect="1" noMove="1" noResize="1" noEditPoints="1" noAdjustHandles="1" noChangeArrowheads="1" noChangeShapeType="1" noTextEdit="1"/>
-                </p:cNvSpPr>
-                <p:nvPr/>
-              </p:nvSpPr>
-              <p:spPr>
-                <a:xfrm>
-                  <a:off x="5205046" y="168832"/>
-                  <a:ext cx="634219" cy="2293034"/>
-                </a:xfrm>
-                <a:prstGeom prst="rect">
-                  <a:avLst/>
-                </a:prstGeom>
-                <a:blipFill>
-                  <a:blip r:embed="rId3"/>
-                  <a:stretch>
-                    <a:fillRect/>
-                  </a:stretch>
-                </a:blipFill>
-                <a:ln w="19050">
-                  <a:solidFill>
-                    <a:schemeClr val="tx1"/>
-                  </a:solidFill>
-                </a:ln>
-              </p:spPr>
-              <p:txBody>
-                <a:bodyPr/>
-                <a:lstStyle/>
-                <a:p>
-                  <a:r>
-                    <a:rPr lang="en-US">
-                      <a:noFill/>
-                    </a:rPr>
-                    <a:t> </a:t>
-                  </a:r>
-                </a:p>
-              </p:txBody>
-            </p:sp>
-          </mc:Fallback>
-        </mc:AlternateContent>
-        <p:sp>
-          <p:nvSpPr>
-            <p:cNvPr id="7" name="Rectangle 6">
+              </a:ln>
+            </p:spPr>
+            <p:style>
+              <a:lnRef idx="2">
+                <a:schemeClr val="accent1">
+                  <a:shade val="50000"/>
+                </a:schemeClr>
+              </a:lnRef>
+              <a:fillRef idx="1">
+                <a:schemeClr val="accent1"/>
+              </a:fillRef>
+              <a:effectRef idx="0">
+                <a:schemeClr val="accent1"/>
+              </a:effectRef>
+              <a:fontRef idx="minor">
+                <a:schemeClr val="lt1"/>
+              </a:fontRef>
+            </p:style>
+            <p:txBody>
+              <a:bodyPr rtlCol="0" anchor="ctr"/>
+              <a:lstStyle/>
+              <a:p>
+                <a:pPr algn="ctr"/>
+                <a:endParaRPr lang="en-US"/>
+              </a:p>
+            </p:txBody>
+          </p:sp>
+          <mc:AlternateContent xmlns:mc="http://schemas.openxmlformats.org/markup-compatibility/2006">
+            <mc:Choice xmlns:a14="http://schemas.microsoft.com/office/drawing/2010/main" Requires="a14">
+              <p:sp>
+                <p:nvSpPr>
+                  <p:cNvPr id="10" name="TextBox 9">
+                    <a:extLst>
+                      <a:ext uri="{FF2B5EF4-FFF2-40B4-BE49-F238E27FC236}">
+                        <a16:creationId xmlns:a16="http://schemas.microsoft.com/office/drawing/2014/main" id="{CA94E341-17E6-4D55-B366-B090E56195C3}"/>
+                      </a:ext>
+                    </a:extLst>
+                  </p:cNvPr>
+                  <p:cNvSpPr txBox="1"/>
+                  <p:nvPr/>
+                </p:nvSpPr>
+                <p:spPr>
+                  <a:xfrm>
+                    <a:off x="2225849" y="1181685"/>
+                    <a:ext cx="358725" cy="369332"/>
+                  </a:xfrm>
+                  <a:prstGeom prst="rect">
+                    <a:avLst/>
+                  </a:prstGeom>
+                  <a:noFill/>
+                </p:spPr>
+                <p:txBody>
+                  <a:bodyPr wrap="square" rtlCol="0">
+                    <a:spAutoFit/>
+                  </a:bodyPr>
+                  <a:lstStyle/>
+                  <a:p>
+                    <a:pPr/>
+                    <a14:m>
+                      <m:oMathPara xmlns:m="http://schemas.openxmlformats.org/officeDocument/2006/math">
+                        <m:oMathParaPr>
+                          <m:jc m:val="centerGroup"/>
+                        </m:oMathParaPr>
+                        <m:oMath xmlns:m="http://schemas.openxmlformats.org/officeDocument/2006/math">
+                          <m:sSub>
+                            <m:sSubPr>
+                              <m:ctrlPr>
+                                <a:rPr lang="en-US" b="0" i="1" smtClean="0">
+                                  <a:latin typeface="Cambria Math" panose="02040503050406030204" pitchFamily="18" charset="0"/>
+                                </a:rPr>
+                              </m:ctrlPr>
+                            </m:sSubPr>
+                            <m:e>
+                              <m:r>
+                                <a:rPr lang="en-US" b="0" i="1" smtClean="0">
+                                  <a:latin typeface="Cambria Math" panose="02040503050406030204" pitchFamily="18" charset="0"/>
+                                </a:rPr>
+                                <m:t>𝐸</m:t>
+                              </m:r>
+                            </m:e>
+                            <m:sub>
+                              <m:r>
+                                <a:rPr lang="en-US" b="0" i="1" smtClean="0">
+                                  <a:latin typeface="Cambria Math" panose="02040503050406030204" pitchFamily="18" charset="0"/>
+                                </a:rPr>
+                                <m:t>𝑖</m:t>
+                              </m:r>
+                            </m:sub>
+                          </m:sSub>
+                        </m:oMath>
+                      </m:oMathPara>
+                    </a14:m>
+                    <a:endParaRPr lang="en-US" dirty="0"/>
+                  </a:p>
+                </p:txBody>
+              </p:sp>
+            </mc:Choice>
+            <mc:Fallback>
+              <p:sp>
+                <p:nvSpPr>
+                  <p:cNvPr id="10" name="TextBox 9">
+                    <a:extLst>
+                      <a:ext uri="{FF2B5EF4-FFF2-40B4-BE49-F238E27FC236}">
+                        <a16:creationId xmlns:a16="http://schemas.microsoft.com/office/drawing/2014/main" id="{CA94E341-17E6-4D55-B366-B090E56195C3}"/>
+                      </a:ext>
+                    </a:extLst>
+                  </p:cNvPr>
+                  <p:cNvSpPr txBox="1">
+                    <a:spLocks noRot="1" noChangeAspect="1" noMove="1" noResize="1" noEditPoints="1" noAdjustHandles="1" noChangeArrowheads="1" noChangeShapeType="1" noTextEdit="1"/>
+                  </p:cNvSpPr>
+                  <p:nvPr/>
+                </p:nvSpPr>
+                <p:spPr>
+                  <a:xfrm>
+                    <a:off x="2225849" y="1181685"/>
+                    <a:ext cx="358725" cy="369332"/>
+                  </a:xfrm>
+                  <a:prstGeom prst="rect">
+                    <a:avLst/>
+                  </a:prstGeom>
+                  <a:blipFill>
+                    <a:blip r:embed="rId5"/>
+                    <a:stretch>
+                      <a:fillRect b="-3333"/>
+                    </a:stretch>
+                  </a:blipFill>
+                </p:spPr>
+                <p:txBody>
+                  <a:bodyPr/>
+                  <a:lstStyle/>
+                  <a:p>
+                    <a:r>
+                      <a:rPr lang="en-US">
+                        <a:noFill/>
+                      </a:rPr>
+                      <a:t> </a:t>
+                    </a:r>
+                  </a:p>
+                </p:txBody>
+              </p:sp>
+            </mc:Fallback>
+          </mc:AlternateContent>
+          <mc:AlternateContent xmlns:mc="http://schemas.openxmlformats.org/markup-compatibility/2006">
+            <mc:Choice xmlns:a14="http://schemas.microsoft.com/office/drawing/2010/main" Requires="a14">
+              <p:sp>
+                <p:nvSpPr>
+                  <p:cNvPr id="11" name="TextBox 10">
+                    <a:extLst>
+                      <a:ext uri="{FF2B5EF4-FFF2-40B4-BE49-F238E27FC236}">
+                        <a16:creationId xmlns:a16="http://schemas.microsoft.com/office/drawing/2014/main" id="{E4334701-4B6E-4AB5-A6A7-4BE0DF22B291}"/>
+                      </a:ext>
+                    </a:extLst>
+                  </p:cNvPr>
+                  <p:cNvSpPr txBox="1"/>
+                  <p:nvPr/>
+                </p:nvSpPr>
+                <p:spPr>
+                  <a:xfrm>
+                    <a:off x="9361239" y="1181685"/>
+                    <a:ext cx="424232" cy="369332"/>
+                  </a:xfrm>
+                  <a:prstGeom prst="rect">
+                    <a:avLst/>
+                  </a:prstGeom>
+                  <a:noFill/>
+                </p:spPr>
+                <p:txBody>
+                  <a:bodyPr wrap="square" rtlCol="0">
+                    <a:spAutoFit/>
+                  </a:bodyPr>
+                  <a:lstStyle/>
+                  <a:p>
+                    <a:pPr/>
+                    <a14:m>
+                      <m:oMathPara xmlns:m="http://schemas.openxmlformats.org/officeDocument/2006/math">
+                        <m:oMathParaPr>
+                          <m:jc m:val="centerGroup"/>
+                        </m:oMathParaPr>
+                        <m:oMath xmlns:m="http://schemas.openxmlformats.org/officeDocument/2006/math">
+                          <m:sSub>
+                            <m:sSubPr>
+                              <m:ctrlPr>
+                                <a:rPr lang="en-US" b="0" i="1" smtClean="0">
+                                  <a:latin typeface="Cambria Math" panose="02040503050406030204" pitchFamily="18" charset="0"/>
+                                </a:rPr>
+                              </m:ctrlPr>
+                            </m:sSubPr>
+                            <m:e>
+                              <m:r>
+                                <a:rPr lang="en-US" b="0" i="1" smtClean="0">
+                                  <a:latin typeface="Cambria Math" panose="02040503050406030204" pitchFamily="18" charset="0"/>
+                                </a:rPr>
+                                <m:t>𝐸</m:t>
+                              </m:r>
+                            </m:e>
+                            <m:sub>
+                              <m:r>
+                                <a:rPr lang="en-US" b="0" i="1" smtClean="0">
+                                  <a:latin typeface="Cambria Math" panose="02040503050406030204" pitchFamily="18" charset="0"/>
+                                </a:rPr>
+                                <m:t>𝑠</m:t>
+                              </m:r>
+                            </m:sub>
+                          </m:sSub>
+                        </m:oMath>
+                      </m:oMathPara>
+                    </a14:m>
+                    <a:endParaRPr lang="en-US" dirty="0"/>
+                  </a:p>
+                </p:txBody>
+              </p:sp>
+            </mc:Choice>
+            <mc:Fallback>
+              <p:sp>
+                <p:nvSpPr>
+                  <p:cNvPr id="11" name="TextBox 10">
+                    <a:extLst>
+                      <a:ext uri="{FF2B5EF4-FFF2-40B4-BE49-F238E27FC236}">
+                        <a16:creationId xmlns:a16="http://schemas.microsoft.com/office/drawing/2014/main" id="{E4334701-4B6E-4AB5-A6A7-4BE0DF22B291}"/>
+                      </a:ext>
+                    </a:extLst>
+                  </p:cNvPr>
+                  <p:cNvSpPr txBox="1">
+                    <a:spLocks noRot="1" noChangeAspect="1" noMove="1" noResize="1" noEditPoints="1" noAdjustHandles="1" noChangeArrowheads="1" noChangeShapeType="1" noTextEdit="1"/>
+                  </p:cNvSpPr>
+                  <p:nvPr/>
+                </p:nvSpPr>
+                <p:spPr>
+                  <a:xfrm>
+                    <a:off x="9361239" y="1181685"/>
+                    <a:ext cx="424232" cy="369332"/>
+                  </a:xfrm>
+                  <a:prstGeom prst="rect">
+                    <a:avLst/>
+                  </a:prstGeom>
+                  <a:blipFill>
+                    <a:blip r:embed="rId6"/>
+                    <a:stretch>
+                      <a:fillRect/>
+                    </a:stretch>
+                  </a:blipFill>
+                </p:spPr>
+                <p:txBody>
+                  <a:bodyPr/>
+                  <a:lstStyle/>
+                  <a:p>
+                    <a:r>
+                      <a:rPr lang="en-US">
+                        <a:noFill/>
+                      </a:rPr>
+                      <a:t> </a:t>
+                    </a:r>
+                  </a:p>
+                </p:txBody>
+              </p:sp>
+            </mc:Fallback>
+          </mc:AlternateContent>
+        </p:grpSp>
+        <p:grpSp>
+          <p:nvGrpSpPr>
+            <p:cNvPr id="3" name="Group 2">
               <a:extLst>
                 <a:ext uri="{FF2B5EF4-FFF2-40B4-BE49-F238E27FC236}">
-                  <a16:creationId xmlns:a16="http://schemas.microsoft.com/office/drawing/2014/main" id="{956B3F29-A46E-4491-84CA-9C3BCD9380C8}"/>
+                  <a16:creationId xmlns:a16="http://schemas.microsoft.com/office/drawing/2014/main" id="{9A1A09A4-AF6D-4B73-815D-1D538A5D1EB7}"/>
                 </a:ext>
               </a:extLst>
             </p:cNvPr>
-            <p:cNvSpPr/>
+            <p:cNvGrpSpPr/>
             <p:nvPr/>
-          </p:nvSpPr>
-          <p:spPr>
+          </p:nvGrpSpPr>
+          <p:grpSpPr>
             <a:xfrm>
-              <a:off x="5839265" y="168832"/>
-              <a:ext cx="634219" cy="2293034"/>
+              <a:off x="2348144" y="585340"/>
+              <a:ext cx="7091068" cy="2293034"/>
+              <a:chOff x="2208848" y="2975296"/>
+              <a:chExt cx="7091068" cy="2293034"/>
             </a:xfrm>
-            <a:prstGeom prst="rect">
-              <a:avLst/>
-            </a:prstGeom>
-            <a:solidFill>
-              <a:schemeClr val="bg1"/>
-            </a:solidFill>
-            <a:ln w="19050">
-              <a:solidFill>
-                <a:schemeClr val="tx1"/>
-              </a:solidFill>
-            </a:ln>
-          </p:spPr>
-          <p:style>
-            <a:lnRef idx="2">
-              <a:schemeClr val="accent1">
-                <a:shade val="50000"/>
-              </a:schemeClr>
-            </a:lnRef>
-            <a:fillRef idx="1">
-              <a:schemeClr val="accent1"/>
-            </a:fillRef>
-            <a:effectRef idx="0">
-              <a:schemeClr val="accent1"/>
-            </a:effectRef>
-            <a:fontRef idx="minor">
-              <a:schemeClr val="lt1"/>
-            </a:fontRef>
-          </p:style>
-          <p:txBody>
-            <a:bodyPr rtlCol="0" anchor="ctr"/>
-            <a:lstStyle/>
-            <a:p>
-              <a:pPr algn="ctr"/>
-              <a:r>
-                <a:rPr lang="en-US" dirty="0">
+          </p:grpSpPr>
+          <p:sp>
+            <p:nvSpPr>
+              <p:cNvPr id="12" name="Freeform: Shape 11">
+                <a:extLst>
+                  <a:ext uri="{FF2B5EF4-FFF2-40B4-BE49-F238E27FC236}">
+                    <a16:creationId xmlns:a16="http://schemas.microsoft.com/office/drawing/2014/main" id="{2532A29E-D6CA-40C2-8105-3E5B88A6B868}"/>
+                  </a:ext>
+                </a:extLst>
+              </p:cNvPr>
+              <p:cNvSpPr/>
+              <p:nvPr/>
+            </p:nvSpPr>
+            <p:spPr>
+              <a:xfrm flipV="1">
+                <a:off x="2606263" y="3172236"/>
+                <a:ext cx="1964563" cy="1820736"/>
+              </a:xfrm>
+              <a:custGeom>
+                <a:avLst/>
+                <a:gdLst>
+                  <a:gd name="connsiteX0" fmla="*/ 0 w 1937657"/>
+                  <a:gd name="connsiteY0" fmla="*/ 689325 h 1781860"/>
+                  <a:gd name="connsiteX1" fmla="*/ 667657 w 1937657"/>
+                  <a:gd name="connsiteY1" fmla="*/ 790925 h 1781860"/>
+                  <a:gd name="connsiteX2" fmla="*/ 936171 w 1937657"/>
+                  <a:gd name="connsiteY2" fmla="*/ 21668 h 1781860"/>
+                  <a:gd name="connsiteX3" fmla="*/ 1095828 w 1937657"/>
+                  <a:gd name="connsiteY3" fmla="*/ 1777897 h 1781860"/>
+                  <a:gd name="connsiteX4" fmla="*/ 1284514 w 1937657"/>
+                  <a:gd name="connsiteY4" fmla="*/ 507897 h 1781860"/>
+                  <a:gd name="connsiteX5" fmla="*/ 1487714 w 1937657"/>
+                  <a:gd name="connsiteY5" fmla="*/ 790925 h 1781860"/>
+                  <a:gd name="connsiteX6" fmla="*/ 1937657 w 1937657"/>
+                  <a:gd name="connsiteY6" fmla="*/ 653040 h 1781860"/>
+                  <a:gd name="connsiteX0" fmla="*/ 0 w 1928132"/>
+                  <a:gd name="connsiteY0" fmla="*/ 794496 h 1782256"/>
+                  <a:gd name="connsiteX1" fmla="*/ 658132 w 1928132"/>
+                  <a:gd name="connsiteY1" fmla="*/ 791321 h 1782256"/>
+                  <a:gd name="connsiteX2" fmla="*/ 926646 w 1928132"/>
+                  <a:gd name="connsiteY2" fmla="*/ 22064 h 1782256"/>
+                  <a:gd name="connsiteX3" fmla="*/ 1086303 w 1928132"/>
+                  <a:gd name="connsiteY3" fmla="*/ 1778293 h 1782256"/>
+                  <a:gd name="connsiteX4" fmla="*/ 1274989 w 1928132"/>
+                  <a:gd name="connsiteY4" fmla="*/ 508293 h 1782256"/>
+                  <a:gd name="connsiteX5" fmla="*/ 1478189 w 1928132"/>
+                  <a:gd name="connsiteY5" fmla="*/ 791321 h 1782256"/>
+                  <a:gd name="connsiteX6" fmla="*/ 1928132 w 1928132"/>
+                  <a:gd name="connsiteY6" fmla="*/ 653436 h 1782256"/>
+                  <a:gd name="connsiteX0" fmla="*/ 0 w 1928132"/>
+                  <a:gd name="connsiteY0" fmla="*/ 794496 h 1782256"/>
+                  <a:gd name="connsiteX1" fmla="*/ 658132 w 1928132"/>
+                  <a:gd name="connsiteY1" fmla="*/ 791321 h 1782256"/>
+                  <a:gd name="connsiteX2" fmla="*/ 926646 w 1928132"/>
+                  <a:gd name="connsiteY2" fmla="*/ 22064 h 1782256"/>
+                  <a:gd name="connsiteX3" fmla="*/ 1086303 w 1928132"/>
+                  <a:gd name="connsiteY3" fmla="*/ 1778293 h 1782256"/>
+                  <a:gd name="connsiteX4" fmla="*/ 1274989 w 1928132"/>
+                  <a:gd name="connsiteY4" fmla="*/ 508293 h 1782256"/>
+                  <a:gd name="connsiteX5" fmla="*/ 1478189 w 1928132"/>
+                  <a:gd name="connsiteY5" fmla="*/ 791321 h 1782256"/>
+                  <a:gd name="connsiteX6" fmla="*/ 1928132 w 1928132"/>
+                  <a:gd name="connsiteY6" fmla="*/ 653436 h 1782256"/>
+                  <a:gd name="connsiteX0" fmla="*/ 0 w 1928132"/>
+                  <a:gd name="connsiteY0" fmla="*/ 794496 h 1782256"/>
+                  <a:gd name="connsiteX1" fmla="*/ 658132 w 1928132"/>
+                  <a:gd name="connsiteY1" fmla="*/ 791321 h 1782256"/>
+                  <a:gd name="connsiteX2" fmla="*/ 926646 w 1928132"/>
+                  <a:gd name="connsiteY2" fmla="*/ 22064 h 1782256"/>
+                  <a:gd name="connsiteX3" fmla="*/ 1086303 w 1928132"/>
+                  <a:gd name="connsiteY3" fmla="*/ 1778293 h 1782256"/>
+                  <a:gd name="connsiteX4" fmla="*/ 1274989 w 1928132"/>
+                  <a:gd name="connsiteY4" fmla="*/ 508293 h 1782256"/>
+                  <a:gd name="connsiteX5" fmla="*/ 1478189 w 1928132"/>
+                  <a:gd name="connsiteY5" fmla="*/ 791321 h 1782256"/>
+                  <a:gd name="connsiteX6" fmla="*/ 1928132 w 1928132"/>
+                  <a:gd name="connsiteY6" fmla="*/ 653436 h 1782256"/>
+                  <a:gd name="connsiteX0" fmla="*/ 0 w 1928132"/>
+                  <a:gd name="connsiteY0" fmla="*/ 793349 h 1781109"/>
+                  <a:gd name="connsiteX1" fmla="*/ 658132 w 1928132"/>
+                  <a:gd name="connsiteY1" fmla="*/ 790174 h 1781109"/>
+                  <a:gd name="connsiteX2" fmla="*/ 926646 w 1928132"/>
+                  <a:gd name="connsiteY2" fmla="*/ 20917 h 1781109"/>
+                  <a:gd name="connsiteX3" fmla="*/ 1086303 w 1928132"/>
+                  <a:gd name="connsiteY3" fmla="*/ 1777146 h 1781109"/>
+                  <a:gd name="connsiteX4" fmla="*/ 1274989 w 1928132"/>
+                  <a:gd name="connsiteY4" fmla="*/ 507146 h 1781109"/>
+                  <a:gd name="connsiteX5" fmla="*/ 1478189 w 1928132"/>
+                  <a:gd name="connsiteY5" fmla="*/ 790174 h 1781109"/>
+                  <a:gd name="connsiteX6" fmla="*/ 1928132 w 1928132"/>
+                  <a:gd name="connsiteY6" fmla="*/ 652289 h 1781109"/>
+                  <a:gd name="connsiteX0" fmla="*/ 0 w 1966232"/>
+                  <a:gd name="connsiteY0" fmla="*/ 793349 h 1781109"/>
+                  <a:gd name="connsiteX1" fmla="*/ 658132 w 1966232"/>
+                  <a:gd name="connsiteY1" fmla="*/ 790174 h 1781109"/>
+                  <a:gd name="connsiteX2" fmla="*/ 926646 w 1966232"/>
+                  <a:gd name="connsiteY2" fmla="*/ 20917 h 1781109"/>
+                  <a:gd name="connsiteX3" fmla="*/ 1086303 w 1966232"/>
+                  <a:gd name="connsiteY3" fmla="*/ 1777146 h 1781109"/>
+                  <a:gd name="connsiteX4" fmla="*/ 1274989 w 1966232"/>
+                  <a:gd name="connsiteY4" fmla="*/ 507146 h 1781109"/>
+                  <a:gd name="connsiteX5" fmla="*/ 1478189 w 1966232"/>
+                  <a:gd name="connsiteY5" fmla="*/ 790174 h 1781109"/>
+                  <a:gd name="connsiteX6" fmla="*/ 1966232 w 1966232"/>
+                  <a:gd name="connsiteY6" fmla="*/ 823739 h 1781109"/>
+                </a:gdLst>
+                <a:ahLst/>
+                <a:cxnLst>
+                  <a:cxn ang="0">
+                    <a:pos x="connsiteX0" y="connsiteY0"/>
+                  </a:cxn>
+                  <a:cxn ang="0">
+                    <a:pos x="connsiteX1" y="connsiteY1"/>
+                  </a:cxn>
+                  <a:cxn ang="0">
+                    <a:pos x="connsiteX2" y="connsiteY2"/>
+                  </a:cxn>
+                  <a:cxn ang="0">
+                    <a:pos x="connsiteX3" y="connsiteY3"/>
+                  </a:cxn>
+                  <a:cxn ang="0">
+                    <a:pos x="connsiteX4" y="connsiteY4"/>
+                  </a:cxn>
+                  <a:cxn ang="0">
+                    <a:pos x="connsiteX5" y="connsiteY5"/>
+                  </a:cxn>
+                  <a:cxn ang="0">
+                    <a:pos x="connsiteX6" y="connsiteY6"/>
+                  </a:cxn>
+                </a:cxnLst>
+                <a:rect l="l" t="t" r="r" b="b"/>
+                <a:pathLst>
+                  <a:path w="1966232" h="1781109">
+                    <a:moveTo>
+                      <a:pt x="0" y="793349"/>
+                    </a:moveTo>
+                    <a:cubicBezTo>
+                      <a:pt x="260576" y="795012"/>
+                      <a:pt x="489404" y="866526"/>
+                      <a:pt x="658132" y="790174"/>
+                    </a:cubicBezTo>
+                    <a:cubicBezTo>
+                      <a:pt x="826860" y="713822"/>
+                      <a:pt x="855284" y="-143578"/>
+                      <a:pt x="926646" y="20917"/>
+                    </a:cubicBezTo>
+                    <a:cubicBezTo>
+                      <a:pt x="998008" y="185412"/>
+                      <a:pt x="1028246" y="1696108"/>
+                      <a:pt x="1086303" y="1777146"/>
+                    </a:cubicBezTo>
+                    <a:cubicBezTo>
+                      <a:pt x="1144360" y="1858184"/>
+                      <a:pt x="1209675" y="671641"/>
+                      <a:pt x="1274989" y="507146"/>
+                    </a:cubicBezTo>
+                    <a:cubicBezTo>
+                      <a:pt x="1340303" y="342651"/>
+                      <a:pt x="1362982" y="737409"/>
+                      <a:pt x="1478189" y="790174"/>
+                    </a:cubicBezTo>
+                    <a:cubicBezTo>
+                      <a:pt x="1593396" y="842940"/>
+                      <a:pt x="1875518" y="808015"/>
+                      <a:pt x="1966232" y="823739"/>
+                    </a:cubicBezTo>
+                  </a:path>
+                </a:pathLst>
+              </a:custGeom>
+              <a:noFill/>
+              <a:ln w="38100">
+                <a:solidFill>
+                  <a:schemeClr val="tx1"/>
+                </a:solidFill>
+              </a:ln>
+            </p:spPr>
+            <p:style>
+              <a:lnRef idx="2">
+                <a:schemeClr val="accent1">
+                  <a:shade val="50000"/>
+                </a:schemeClr>
+              </a:lnRef>
+              <a:fillRef idx="1">
+                <a:schemeClr val="accent1"/>
+              </a:fillRef>
+              <a:effectRef idx="0">
+                <a:schemeClr val="accent1"/>
+              </a:effectRef>
+              <a:fontRef idx="minor">
+                <a:schemeClr val="lt1"/>
+              </a:fontRef>
+            </p:style>
+            <p:txBody>
+              <a:bodyPr rtlCol="0" anchor="ctr"/>
+              <a:lstStyle/>
+              <a:p>
+                <a:pPr algn="ctr"/>
+                <a:endParaRPr lang="en-US"/>
+              </a:p>
+            </p:txBody>
+          </p:sp>
+          <mc:AlternateContent xmlns:mc="http://schemas.openxmlformats.org/markup-compatibility/2006">
+            <mc:Choice xmlns:a14="http://schemas.microsoft.com/office/drawing/2010/main" Requires="a14">
+              <p:sp>
+                <p:nvSpPr>
+                  <p:cNvPr id="13" name="Rectangle 12">
+                    <a:extLst>
+                      <a:ext uri="{FF2B5EF4-FFF2-40B4-BE49-F238E27FC236}">
+                        <a16:creationId xmlns:a16="http://schemas.microsoft.com/office/drawing/2014/main" id="{B1B0BABC-E345-4387-9244-1430818B7C5E}"/>
+                      </a:ext>
+                    </a:extLst>
+                  </p:cNvPr>
+                  <p:cNvSpPr/>
+                  <p:nvPr/>
+                </p:nvSpPr>
+                <p:spPr>
+                  <a:xfrm>
+                    <a:off x="4827315" y="2975296"/>
+                    <a:ext cx="358725" cy="2293034"/>
+                  </a:xfrm>
+                  <a:prstGeom prst="rect">
+                    <a:avLst/>
+                  </a:prstGeom>
                   <a:solidFill>
-                    <a:schemeClr val="tx1"/>
+                    <a:schemeClr val="accent4">
+                      <a:lumMod val="40000"/>
+                      <a:lumOff val="60000"/>
+                    </a:schemeClr>
                   </a:solidFill>
-                </a:rPr>
-                <a:t>…</a:t>
-              </a:r>
-            </a:p>
-          </p:txBody>
-        </p:sp>
-        <mc:AlternateContent xmlns:mc="http://schemas.openxmlformats.org/markup-compatibility/2006">
-          <mc:Choice xmlns:a14="http://schemas.microsoft.com/office/drawing/2010/main" Requires="a14">
-            <p:sp>
-              <p:nvSpPr>
-                <p:cNvPr id="8" name="Rectangle 7">
-                  <a:extLst>
-                    <a:ext uri="{FF2B5EF4-FFF2-40B4-BE49-F238E27FC236}">
-                      <a16:creationId xmlns:a16="http://schemas.microsoft.com/office/drawing/2014/main" id="{1C8FC3D2-1D8C-49F7-87DB-DE9627330E5F}"/>
-                    </a:ext>
-                  </a:extLst>
-                </p:cNvPr>
-                <p:cNvSpPr/>
-                <p:nvPr/>
-              </p:nvSpPr>
-              <p:spPr>
-                <a:xfrm>
-                  <a:off x="6473484" y="168832"/>
-                  <a:ext cx="634219" cy="2293034"/>
-                </a:xfrm>
-                <a:prstGeom prst="rect">
-                  <a:avLst/>
-                </a:prstGeom>
-                <a:solidFill>
-                  <a:schemeClr val="accent2">
-                    <a:lumMod val="40000"/>
-                    <a:lumOff val="60000"/>
-                  </a:schemeClr>
-                </a:solidFill>
-                <a:ln w="19050">
-                  <a:solidFill>
-                    <a:schemeClr val="tx1"/>
-                  </a:solidFill>
-                </a:ln>
-              </p:spPr>
-              <p:style>
-                <a:lnRef idx="2">
-                  <a:schemeClr val="accent1">
-                    <a:shade val="50000"/>
-                  </a:schemeClr>
-                </a:lnRef>
-                <a:fillRef idx="1">
-                  <a:schemeClr val="accent1"/>
-                </a:fillRef>
-                <a:effectRef idx="0">
-                  <a:schemeClr val="accent1"/>
-                </a:effectRef>
-                <a:fontRef idx="minor">
-                  <a:schemeClr val="lt1"/>
-                </a:fontRef>
-              </p:style>
-              <p:txBody>
-                <a:bodyPr rtlCol="0" anchor="ctr"/>
-                <a:lstStyle/>
-                <a:p>
-                  <a:pPr algn="ctr"/>
-                  <a14:m>
-                    <m:oMathPara xmlns:m="http://schemas.openxmlformats.org/officeDocument/2006/math">
-                      <m:oMathParaPr>
-                        <m:jc m:val="centerGroup"/>
-                      </m:oMathParaPr>
-                      <m:oMath xmlns:m="http://schemas.openxmlformats.org/officeDocument/2006/math">
-                        <m:sSub>
-                          <m:sSubPr>
-                            <m:ctrlPr>
-                              <a:rPr lang="en-US" b="0" i="1" dirty="0" smtClean="0">
-                                <a:solidFill>
-                                  <a:schemeClr val="tx1"/>
-                                </a:solidFill>
-                                <a:latin typeface="Cambria Math" panose="02040503050406030204" pitchFamily="18" charset="0"/>
-                              </a:rPr>
-                            </m:ctrlPr>
-                          </m:sSubPr>
-                          <m:e>
-                            <m:r>
-                              <a:rPr lang="en-US" b="0" i="1" dirty="0" smtClean="0">
-                                <a:solidFill>
-                                  <a:schemeClr val="tx1"/>
-                                </a:solidFill>
-                                <a:latin typeface="Cambria Math" panose="02040503050406030204" pitchFamily="18" charset="0"/>
-                              </a:rPr>
-                              <m:t>𝑛</m:t>
-                            </m:r>
-                          </m:e>
-                          <m:sub>
-                            <m:r>
-                              <a:rPr lang="en-US" b="0" i="1" dirty="0" smtClean="0">
-                                <a:solidFill>
-                                  <a:schemeClr val="tx1"/>
-                                </a:solidFill>
-                                <a:latin typeface="Cambria Math" panose="02040503050406030204" pitchFamily="18" charset="0"/>
-                              </a:rPr>
-                              <m:t>𝑁</m:t>
-                            </m:r>
-                          </m:sub>
-                        </m:sSub>
-                      </m:oMath>
-                    </m:oMathPara>
-                  </a14:m>
-                  <a:endParaRPr lang="en-US" dirty="0">
+                  <a:ln w="19050">
                     <a:solidFill>
                       <a:schemeClr val="tx1"/>
                     </a:solidFill>
-                  </a:endParaRPr>
-                </a:p>
-              </p:txBody>
-            </p:sp>
-          </mc:Choice>
-          <mc:Fallback>
-            <p:sp>
-              <p:nvSpPr>
-                <p:cNvPr id="8" name="Rectangle 7">
-                  <a:extLst>
-                    <a:ext uri="{FF2B5EF4-FFF2-40B4-BE49-F238E27FC236}">
-                      <a16:creationId xmlns:a16="http://schemas.microsoft.com/office/drawing/2014/main" id="{1C8FC3D2-1D8C-49F7-87DB-DE9627330E5F}"/>
-                    </a:ext>
-                  </a:extLst>
-                </p:cNvPr>
-                <p:cNvSpPr>
-                  <a:spLocks noRot="1" noChangeAspect="1" noMove="1" noResize="1" noEditPoints="1" noAdjustHandles="1" noChangeArrowheads="1" noChangeShapeType="1" noTextEdit="1"/>
-                </p:cNvSpPr>
-                <p:nvPr/>
-              </p:nvSpPr>
-              <p:spPr>
-                <a:xfrm>
-                  <a:off x="6473484" y="168832"/>
-                  <a:ext cx="634219" cy="2293034"/>
-                </a:xfrm>
-                <a:prstGeom prst="rect">
-                  <a:avLst/>
-                </a:prstGeom>
-                <a:blipFill>
-                  <a:blip r:embed="rId4"/>
-                  <a:stretch>
-                    <a:fillRect/>
-                  </a:stretch>
-                </a:blipFill>
-                <a:ln w="19050">
-                  <a:solidFill>
-                    <a:schemeClr val="tx1"/>
-                  </a:solidFill>
-                </a:ln>
-              </p:spPr>
-              <p:txBody>
-                <a:bodyPr/>
-                <a:lstStyle/>
-                <a:p>
-                  <a:r>
-                    <a:rPr lang="en-US">
-                      <a:noFill/>
-                    </a:rPr>
-                    <a:t> </a:t>
-                  </a:r>
-                </a:p>
-              </p:txBody>
-            </p:sp>
-          </mc:Fallback>
-        </mc:AlternateContent>
-        <p:sp>
-          <p:nvSpPr>
-            <p:cNvPr id="9" name="Freeform: Shape 8">
-              <a:extLst>
-                <a:ext uri="{FF2B5EF4-FFF2-40B4-BE49-F238E27FC236}">
-                  <a16:creationId xmlns:a16="http://schemas.microsoft.com/office/drawing/2014/main" id="{7DCBFC50-93D5-403E-9C81-797E6BC92707}"/>
-                </a:ext>
-              </a:extLst>
-            </p:cNvPr>
-            <p:cNvSpPr/>
-            <p:nvPr/>
-          </p:nvSpPr>
-          <p:spPr>
-            <a:xfrm flipV="1">
-              <a:off x="7330664" y="898841"/>
-              <a:ext cx="1964563" cy="833016"/>
-            </a:xfrm>
-            <a:custGeom>
-              <a:avLst/>
-              <a:gdLst>
-                <a:gd name="connsiteX0" fmla="*/ 0 w 1937657"/>
-                <a:gd name="connsiteY0" fmla="*/ 689325 h 1781860"/>
-                <a:gd name="connsiteX1" fmla="*/ 667657 w 1937657"/>
-                <a:gd name="connsiteY1" fmla="*/ 790925 h 1781860"/>
-                <a:gd name="connsiteX2" fmla="*/ 936171 w 1937657"/>
-                <a:gd name="connsiteY2" fmla="*/ 21668 h 1781860"/>
-                <a:gd name="connsiteX3" fmla="*/ 1095828 w 1937657"/>
-                <a:gd name="connsiteY3" fmla="*/ 1777897 h 1781860"/>
-                <a:gd name="connsiteX4" fmla="*/ 1284514 w 1937657"/>
-                <a:gd name="connsiteY4" fmla="*/ 507897 h 1781860"/>
-                <a:gd name="connsiteX5" fmla="*/ 1487714 w 1937657"/>
-                <a:gd name="connsiteY5" fmla="*/ 790925 h 1781860"/>
-                <a:gd name="connsiteX6" fmla="*/ 1937657 w 1937657"/>
-                <a:gd name="connsiteY6" fmla="*/ 653040 h 1781860"/>
-                <a:gd name="connsiteX0" fmla="*/ 0 w 1928132"/>
-                <a:gd name="connsiteY0" fmla="*/ 794496 h 1782256"/>
-                <a:gd name="connsiteX1" fmla="*/ 658132 w 1928132"/>
-                <a:gd name="connsiteY1" fmla="*/ 791321 h 1782256"/>
-                <a:gd name="connsiteX2" fmla="*/ 926646 w 1928132"/>
-                <a:gd name="connsiteY2" fmla="*/ 22064 h 1782256"/>
-                <a:gd name="connsiteX3" fmla="*/ 1086303 w 1928132"/>
-                <a:gd name="connsiteY3" fmla="*/ 1778293 h 1782256"/>
-                <a:gd name="connsiteX4" fmla="*/ 1274989 w 1928132"/>
-                <a:gd name="connsiteY4" fmla="*/ 508293 h 1782256"/>
-                <a:gd name="connsiteX5" fmla="*/ 1478189 w 1928132"/>
-                <a:gd name="connsiteY5" fmla="*/ 791321 h 1782256"/>
-                <a:gd name="connsiteX6" fmla="*/ 1928132 w 1928132"/>
-                <a:gd name="connsiteY6" fmla="*/ 653436 h 1782256"/>
-                <a:gd name="connsiteX0" fmla="*/ 0 w 1928132"/>
-                <a:gd name="connsiteY0" fmla="*/ 794496 h 1782256"/>
-                <a:gd name="connsiteX1" fmla="*/ 658132 w 1928132"/>
-                <a:gd name="connsiteY1" fmla="*/ 791321 h 1782256"/>
-                <a:gd name="connsiteX2" fmla="*/ 926646 w 1928132"/>
-                <a:gd name="connsiteY2" fmla="*/ 22064 h 1782256"/>
-                <a:gd name="connsiteX3" fmla="*/ 1086303 w 1928132"/>
-                <a:gd name="connsiteY3" fmla="*/ 1778293 h 1782256"/>
-                <a:gd name="connsiteX4" fmla="*/ 1274989 w 1928132"/>
-                <a:gd name="connsiteY4" fmla="*/ 508293 h 1782256"/>
-                <a:gd name="connsiteX5" fmla="*/ 1478189 w 1928132"/>
-                <a:gd name="connsiteY5" fmla="*/ 791321 h 1782256"/>
-                <a:gd name="connsiteX6" fmla="*/ 1928132 w 1928132"/>
-                <a:gd name="connsiteY6" fmla="*/ 653436 h 1782256"/>
-                <a:gd name="connsiteX0" fmla="*/ 0 w 1928132"/>
-                <a:gd name="connsiteY0" fmla="*/ 794496 h 1782256"/>
-                <a:gd name="connsiteX1" fmla="*/ 658132 w 1928132"/>
-                <a:gd name="connsiteY1" fmla="*/ 791321 h 1782256"/>
-                <a:gd name="connsiteX2" fmla="*/ 926646 w 1928132"/>
-                <a:gd name="connsiteY2" fmla="*/ 22064 h 1782256"/>
-                <a:gd name="connsiteX3" fmla="*/ 1086303 w 1928132"/>
-                <a:gd name="connsiteY3" fmla="*/ 1778293 h 1782256"/>
-                <a:gd name="connsiteX4" fmla="*/ 1274989 w 1928132"/>
-                <a:gd name="connsiteY4" fmla="*/ 508293 h 1782256"/>
-                <a:gd name="connsiteX5" fmla="*/ 1478189 w 1928132"/>
-                <a:gd name="connsiteY5" fmla="*/ 791321 h 1782256"/>
-                <a:gd name="connsiteX6" fmla="*/ 1928132 w 1928132"/>
-                <a:gd name="connsiteY6" fmla="*/ 653436 h 1782256"/>
-                <a:gd name="connsiteX0" fmla="*/ 0 w 1928132"/>
-                <a:gd name="connsiteY0" fmla="*/ 793349 h 1781109"/>
-                <a:gd name="connsiteX1" fmla="*/ 658132 w 1928132"/>
-                <a:gd name="connsiteY1" fmla="*/ 790174 h 1781109"/>
-                <a:gd name="connsiteX2" fmla="*/ 926646 w 1928132"/>
-                <a:gd name="connsiteY2" fmla="*/ 20917 h 1781109"/>
-                <a:gd name="connsiteX3" fmla="*/ 1086303 w 1928132"/>
-                <a:gd name="connsiteY3" fmla="*/ 1777146 h 1781109"/>
-                <a:gd name="connsiteX4" fmla="*/ 1274989 w 1928132"/>
-                <a:gd name="connsiteY4" fmla="*/ 507146 h 1781109"/>
-                <a:gd name="connsiteX5" fmla="*/ 1478189 w 1928132"/>
-                <a:gd name="connsiteY5" fmla="*/ 790174 h 1781109"/>
-                <a:gd name="connsiteX6" fmla="*/ 1928132 w 1928132"/>
-                <a:gd name="connsiteY6" fmla="*/ 652289 h 1781109"/>
-                <a:gd name="connsiteX0" fmla="*/ 0 w 1966232"/>
-                <a:gd name="connsiteY0" fmla="*/ 793349 h 1781109"/>
-                <a:gd name="connsiteX1" fmla="*/ 658132 w 1966232"/>
-                <a:gd name="connsiteY1" fmla="*/ 790174 h 1781109"/>
-                <a:gd name="connsiteX2" fmla="*/ 926646 w 1966232"/>
-                <a:gd name="connsiteY2" fmla="*/ 20917 h 1781109"/>
-                <a:gd name="connsiteX3" fmla="*/ 1086303 w 1966232"/>
-                <a:gd name="connsiteY3" fmla="*/ 1777146 h 1781109"/>
-                <a:gd name="connsiteX4" fmla="*/ 1274989 w 1966232"/>
-                <a:gd name="connsiteY4" fmla="*/ 507146 h 1781109"/>
-                <a:gd name="connsiteX5" fmla="*/ 1478189 w 1966232"/>
-                <a:gd name="connsiteY5" fmla="*/ 790174 h 1781109"/>
-                <a:gd name="connsiteX6" fmla="*/ 1966232 w 1966232"/>
-                <a:gd name="connsiteY6" fmla="*/ 823739 h 1781109"/>
-              </a:gdLst>
-              <a:ahLst/>
-              <a:cxnLst>
-                <a:cxn ang="0">
-                  <a:pos x="connsiteX0" y="connsiteY0"/>
-                </a:cxn>
-                <a:cxn ang="0">
-                  <a:pos x="connsiteX1" y="connsiteY1"/>
-                </a:cxn>
-                <a:cxn ang="0">
-                  <a:pos x="connsiteX2" y="connsiteY2"/>
-                </a:cxn>
-                <a:cxn ang="0">
-                  <a:pos x="connsiteX3" y="connsiteY3"/>
-                </a:cxn>
-                <a:cxn ang="0">
-                  <a:pos x="connsiteX4" y="connsiteY4"/>
-                </a:cxn>
-                <a:cxn ang="0">
-                  <a:pos x="connsiteX5" y="connsiteY5"/>
-                </a:cxn>
-                <a:cxn ang="0">
-                  <a:pos x="connsiteX6" y="connsiteY6"/>
-                </a:cxn>
-              </a:cxnLst>
-              <a:rect l="l" t="t" r="r" b="b"/>
-              <a:pathLst>
-                <a:path w="1966232" h="1781109">
-                  <a:moveTo>
-                    <a:pt x="0" y="793349"/>
-                  </a:moveTo>
-                  <a:cubicBezTo>
-                    <a:pt x="260576" y="795012"/>
-                    <a:pt x="489404" y="866526"/>
-                    <a:pt x="658132" y="790174"/>
-                  </a:cubicBezTo>
-                  <a:cubicBezTo>
-                    <a:pt x="826860" y="713822"/>
-                    <a:pt x="855284" y="-143578"/>
-                    <a:pt x="926646" y="20917"/>
-                  </a:cubicBezTo>
-                  <a:cubicBezTo>
-                    <a:pt x="998008" y="185412"/>
-                    <a:pt x="1028246" y="1696108"/>
-                    <a:pt x="1086303" y="1777146"/>
-                  </a:cubicBezTo>
-                  <a:cubicBezTo>
-                    <a:pt x="1144360" y="1858184"/>
-                    <a:pt x="1209675" y="671641"/>
-                    <a:pt x="1274989" y="507146"/>
-                  </a:cubicBezTo>
-                  <a:cubicBezTo>
-                    <a:pt x="1340303" y="342651"/>
-                    <a:pt x="1362982" y="737409"/>
-                    <a:pt x="1478189" y="790174"/>
-                  </a:cubicBezTo>
-                  <a:cubicBezTo>
-                    <a:pt x="1593396" y="842940"/>
-                    <a:pt x="1875518" y="808015"/>
-                    <a:pt x="1966232" y="823739"/>
-                  </a:cubicBezTo>
-                </a:path>
-              </a:pathLst>
-            </a:custGeom>
-            <a:noFill/>
-            <a:ln w="38100">
-              <a:solidFill>
-                <a:schemeClr val="tx1"/>
-              </a:solidFill>
-            </a:ln>
-          </p:spPr>
-          <p:style>
-            <a:lnRef idx="2">
-              <a:schemeClr val="accent1">
-                <a:shade val="50000"/>
-              </a:schemeClr>
-            </a:lnRef>
-            <a:fillRef idx="1">
-              <a:schemeClr val="accent1"/>
-            </a:fillRef>
-            <a:effectRef idx="0">
-              <a:schemeClr val="accent1"/>
-            </a:effectRef>
-            <a:fontRef idx="minor">
-              <a:schemeClr val="lt1"/>
-            </a:fontRef>
-          </p:style>
-          <p:txBody>
-            <a:bodyPr rtlCol="0" anchor="ctr"/>
-            <a:lstStyle/>
-            <a:p>
-              <a:pPr algn="ctr"/>
-              <a:endParaRPr lang="en-US"/>
-            </a:p>
-          </p:txBody>
-        </p:sp>
-        <mc:AlternateContent xmlns:mc="http://schemas.openxmlformats.org/markup-compatibility/2006">
-          <mc:Choice xmlns:a14="http://schemas.microsoft.com/office/drawing/2010/main" Requires="a14">
-            <p:sp>
-              <p:nvSpPr>
-                <p:cNvPr id="10" name="TextBox 9">
-                  <a:extLst>
-                    <a:ext uri="{FF2B5EF4-FFF2-40B4-BE49-F238E27FC236}">
-                      <a16:creationId xmlns:a16="http://schemas.microsoft.com/office/drawing/2014/main" id="{CA94E341-17E6-4D55-B366-B090E56195C3}"/>
-                    </a:ext>
-                  </a:extLst>
-                </p:cNvPr>
-                <p:cNvSpPr txBox="1"/>
-                <p:nvPr/>
-              </p:nvSpPr>
-              <p:spPr>
-                <a:xfrm>
-                  <a:off x="2225849" y="1181685"/>
-                  <a:ext cx="358725" cy="369332"/>
-                </a:xfrm>
-                <a:prstGeom prst="rect">
-                  <a:avLst/>
-                </a:prstGeom>
-                <a:noFill/>
-              </p:spPr>
-              <p:txBody>
-                <a:bodyPr wrap="square" rtlCol="0">
-                  <a:spAutoFit/>
-                </a:bodyPr>
-                <a:lstStyle/>
-                <a:p>
-                  <a14:m>
-                    <m:oMathPara xmlns:m="http://schemas.openxmlformats.org/officeDocument/2006/math">
-                      <m:oMathParaPr>
-                        <m:jc m:val="centerGroup"/>
-                      </m:oMathParaPr>
-                      <m:oMath xmlns:m="http://schemas.openxmlformats.org/officeDocument/2006/math">
-                        <m:sSub>
-                          <m:sSubPr>
-                            <m:ctrlPr>
-                              <a:rPr lang="en-US" b="0" i="1" smtClean="0">
-                                <a:latin typeface="Cambria Math" panose="02040503050406030204" pitchFamily="18" charset="0"/>
-                              </a:rPr>
-                            </m:ctrlPr>
-                          </m:sSubPr>
-                          <m:e>
-                            <m:r>
-                              <a:rPr lang="en-US" b="0" i="1" smtClean="0">
-                                <a:latin typeface="Cambria Math" panose="02040503050406030204" pitchFamily="18" charset="0"/>
-                              </a:rPr>
-                              <m:t>𝐸</m:t>
-                            </m:r>
-                          </m:e>
-                          <m:sub>
-                            <m:r>
-                              <a:rPr lang="en-US" b="0" i="1" smtClean="0">
-                                <a:latin typeface="Cambria Math" panose="02040503050406030204" pitchFamily="18" charset="0"/>
-                              </a:rPr>
-                              <m:t>𝑖</m:t>
-                            </m:r>
-                          </m:sub>
-                        </m:sSub>
-                      </m:oMath>
-                    </m:oMathPara>
-                  </a14:m>
-                  <a:endParaRPr lang="en-US" dirty="0"/>
-                </a:p>
-              </p:txBody>
-            </p:sp>
-          </mc:Choice>
-          <mc:Fallback>
-            <p:sp>
-              <p:nvSpPr>
-                <p:cNvPr id="10" name="TextBox 9">
-                  <a:extLst>
-                    <a:ext uri="{FF2B5EF4-FFF2-40B4-BE49-F238E27FC236}">
-                      <a16:creationId xmlns:a16="http://schemas.microsoft.com/office/drawing/2014/main" id="{CA94E341-17E6-4D55-B366-B090E56195C3}"/>
-                    </a:ext>
-                  </a:extLst>
-                </p:cNvPr>
-                <p:cNvSpPr txBox="1">
-                  <a:spLocks noRot="1" noChangeAspect="1" noMove="1" noResize="1" noEditPoints="1" noAdjustHandles="1" noChangeArrowheads="1" noChangeShapeType="1" noTextEdit="1"/>
-                </p:cNvSpPr>
-                <p:nvPr/>
-              </p:nvSpPr>
-              <p:spPr>
-                <a:xfrm>
-                  <a:off x="2225849" y="1181685"/>
-                  <a:ext cx="358725" cy="369332"/>
-                </a:xfrm>
-                <a:prstGeom prst="rect">
-                  <a:avLst/>
-                </a:prstGeom>
-                <a:blipFill>
-                  <a:blip r:embed="rId5"/>
-                  <a:stretch>
-                    <a:fillRect b="-3333"/>
-                  </a:stretch>
-                </a:blipFill>
-              </p:spPr>
-              <p:txBody>
-                <a:bodyPr/>
-                <a:lstStyle/>
-                <a:p>
-                  <a:r>
-                    <a:rPr lang="en-US">
-                      <a:noFill/>
-                    </a:rPr>
-                    <a:t> </a:t>
-                  </a:r>
-                </a:p>
-              </p:txBody>
-            </p:sp>
-          </mc:Fallback>
-        </mc:AlternateContent>
-        <mc:AlternateContent xmlns:mc="http://schemas.openxmlformats.org/markup-compatibility/2006">
-          <mc:Choice xmlns:a14="http://schemas.microsoft.com/office/drawing/2010/main" Requires="a14">
-            <p:sp>
-              <p:nvSpPr>
-                <p:cNvPr id="11" name="TextBox 10">
-                  <a:extLst>
-                    <a:ext uri="{FF2B5EF4-FFF2-40B4-BE49-F238E27FC236}">
-                      <a16:creationId xmlns:a16="http://schemas.microsoft.com/office/drawing/2014/main" id="{E4334701-4B6E-4AB5-A6A7-4BE0DF22B291}"/>
-                    </a:ext>
-                  </a:extLst>
-                </p:cNvPr>
-                <p:cNvSpPr txBox="1"/>
-                <p:nvPr/>
-              </p:nvSpPr>
-              <p:spPr>
-                <a:xfrm>
-                  <a:off x="9361239" y="1181685"/>
-                  <a:ext cx="424232" cy="369332"/>
-                </a:xfrm>
-                <a:prstGeom prst="rect">
-                  <a:avLst/>
-                </a:prstGeom>
-                <a:noFill/>
-              </p:spPr>
-              <p:txBody>
-                <a:bodyPr wrap="square" rtlCol="0">
-                  <a:spAutoFit/>
-                </a:bodyPr>
-                <a:lstStyle/>
-                <a:p>
-                  <a14:m>
-                    <m:oMathPara xmlns:m="http://schemas.openxmlformats.org/officeDocument/2006/math">
-                      <m:oMathParaPr>
-                        <m:jc m:val="centerGroup"/>
-                      </m:oMathParaPr>
-                      <m:oMath xmlns:m="http://schemas.openxmlformats.org/officeDocument/2006/math">
-                        <m:sSub>
-                          <m:sSubPr>
-                            <m:ctrlPr>
-                              <a:rPr lang="en-US" b="0" i="1" smtClean="0">
-                                <a:latin typeface="Cambria Math" panose="02040503050406030204" pitchFamily="18" charset="0"/>
-                              </a:rPr>
-                            </m:ctrlPr>
-                          </m:sSubPr>
-                          <m:e>
-                            <m:r>
-                              <a:rPr lang="en-US" b="0" i="1" smtClean="0">
-                                <a:latin typeface="Cambria Math" panose="02040503050406030204" pitchFamily="18" charset="0"/>
-                              </a:rPr>
-                              <m:t>𝐸</m:t>
-                            </m:r>
-                          </m:e>
-                          <m:sub>
-                            <m:r>
-                              <a:rPr lang="en-US" b="0" i="1" smtClean="0">
-                                <a:latin typeface="Cambria Math" panose="02040503050406030204" pitchFamily="18" charset="0"/>
-                              </a:rPr>
-                              <m:t>𝑠</m:t>
-                            </m:r>
-                          </m:sub>
-                        </m:sSub>
-                      </m:oMath>
-                    </m:oMathPara>
-                  </a14:m>
-                  <a:endParaRPr lang="en-US" dirty="0"/>
-                </a:p>
-              </p:txBody>
-            </p:sp>
-          </mc:Choice>
-          <mc:Fallback>
-            <p:sp>
-              <p:nvSpPr>
-                <p:cNvPr id="11" name="TextBox 10">
-                  <a:extLst>
-                    <a:ext uri="{FF2B5EF4-FFF2-40B4-BE49-F238E27FC236}">
-                      <a16:creationId xmlns:a16="http://schemas.microsoft.com/office/drawing/2014/main" id="{E4334701-4B6E-4AB5-A6A7-4BE0DF22B291}"/>
-                    </a:ext>
-                  </a:extLst>
-                </p:cNvPr>
-                <p:cNvSpPr txBox="1">
-                  <a:spLocks noRot="1" noChangeAspect="1" noMove="1" noResize="1" noEditPoints="1" noAdjustHandles="1" noChangeArrowheads="1" noChangeShapeType="1" noTextEdit="1"/>
-                </p:cNvSpPr>
-                <p:nvPr/>
-              </p:nvSpPr>
-              <p:spPr>
-                <a:xfrm>
-                  <a:off x="9361239" y="1181685"/>
-                  <a:ext cx="424232" cy="369332"/>
-                </a:xfrm>
-                <a:prstGeom prst="rect">
-                  <a:avLst/>
-                </a:prstGeom>
-                <a:blipFill>
-                  <a:blip r:embed="rId6"/>
-                  <a:stretch>
-                    <a:fillRect/>
-                  </a:stretch>
-                </a:blipFill>
-              </p:spPr>
-              <p:txBody>
-                <a:bodyPr/>
-                <a:lstStyle/>
-                <a:p>
-                  <a:r>
-                    <a:rPr lang="en-US">
-                      <a:noFill/>
-                    </a:rPr>
-                    <a:t> </a:t>
-                  </a:r>
-                </a:p>
-              </p:txBody>
-            </p:sp>
-          </mc:Fallback>
-        </mc:AlternateContent>
-        <p:sp>
-          <p:nvSpPr>
-            <p:cNvPr id="12" name="Freeform: Shape 11">
-              <a:extLst>
-                <a:ext uri="{FF2B5EF4-FFF2-40B4-BE49-F238E27FC236}">
-                  <a16:creationId xmlns:a16="http://schemas.microsoft.com/office/drawing/2014/main" id="{2532A29E-D6CA-40C2-8105-3E5B88A6B868}"/>
-                </a:ext>
-              </a:extLst>
-            </p:cNvPr>
-            <p:cNvSpPr/>
-            <p:nvPr/>
-          </p:nvSpPr>
-          <p:spPr>
-            <a:xfrm flipV="1">
-              <a:off x="2606263" y="3172236"/>
-              <a:ext cx="1964563" cy="1820736"/>
-            </a:xfrm>
-            <a:custGeom>
-              <a:avLst/>
-              <a:gdLst>
-                <a:gd name="connsiteX0" fmla="*/ 0 w 1937657"/>
-                <a:gd name="connsiteY0" fmla="*/ 689325 h 1781860"/>
-                <a:gd name="connsiteX1" fmla="*/ 667657 w 1937657"/>
-                <a:gd name="connsiteY1" fmla="*/ 790925 h 1781860"/>
-                <a:gd name="connsiteX2" fmla="*/ 936171 w 1937657"/>
-                <a:gd name="connsiteY2" fmla="*/ 21668 h 1781860"/>
-                <a:gd name="connsiteX3" fmla="*/ 1095828 w 1937657"/>
-                <a:gd name="connsiteY3" fmla="*/ 1777897 h 1781860"/>
-                <a:gd name="connsiteX4" fmla="*/ 1284514 w 1937657"/>
-                <a:gd name="connsiteY4" fmla="*/ 507897 h 1781860"/>
-                <a:gd name="connsiteX5" fmla="*/ 1487714 w 1937657"/>
-                <a:gd name="connsiteY5" fmla="*/ 790925 h 1781860"/>
-                <a:gd name="connsiteX6" fmla="*/ 1937657 w 1937657"/>
-                <a:gd name="connsiteY6" fmla="*/ 653040 h 1781860"/>
-                <a:gd name="connsiteX0" fmla="*/ 0 w 1928132"/>
-                <a:gd name="connsiteY0" fmla="*/ 794496 h 1782256"/>
-                <a:gd name="connsiteX1" fmla="*/ 658132 w 1928132"/>
-                <a:gd name="connsiteY1" fmla="*/ 791321 h 1782256"/>
-                <a:gd name="connsiteX2" fmla="*/ 926646 w 1928132"/>
-                <a:gd name="connsiteY2" fmla="*/ 22064 h 1782256"/>
-                <a:gd name="connsiteX3" fmla="*/ 1086303 w 1928132"/>
-                <a:gd name="connsiteY3" fmla="*/ 1778293 h 1782256"/>
-                <a:gd name="connsiteX4" fmla="*/ 1274989 w 1928132"/>
-                <a:gd name="connsiteY4" fmla="*/ 508293 h 1782256"/>
-                <a:gd name="connsiteX5" fmla="*/ 1478189 w 1928132"/>
-                <a:gd name="connsiteY5" fmla="*/ 791321 h 1782256"/>
-                <a:gd name="connsiteX6" fmla="*/ 1928132 w 1928132"/>
-                <a:gd name="connsiteY6" fmla="*/ 653436 h 1782256"/>
-                <a:gd name="connsiteX0" fmla="*/ 0 w 1928132"/>
-                <a:gd name="connsiteY0" fmla="*/ 794496 h 1782256"/>
-                <a:gd name="connsiteX1" fmla="*/ 658132 w 1928132"/>
-                <a:gd name="connsiteY1" fmla="*/ 791321 h 1782256"/>
-                <a:gd name="connsiteX2" fmla="*/ 926646 w 1928132"/>
-                <a:gd name="connsiteY2" fmla="*/ 22064 h 1782256"/>
-                <a:gd name="connsiteX3" fmla="*/ 1086303 w 1928132"/>
-                <a:gd name="connsiteY3" fmla="*/ 1778293 h 1782256"/>
-                <a:gd name="connsiteX4" fmla="*/ 1274989 w 1928132"/>
-                <a:gd name="connsiteY4" fmla="*/ 508293 h 1782256"/>
-                <a:gd name="connsiteX5" fmla="*/ 1478189 w 1928132"/>
-                <a:gd name="connsiteY5" fmla="*/ 791321 h 1782256"/>
-                <a:gd name="connsiteX6" fmla="*/ 1928132 w 1928132"/>
-                <a:gd name="connsiteY6" fmla="*/ 653436 h 1782256"/>
-                <a:gd name="connsiteX0" fmla="*/ 0 w 1928132"/>
-                <a:gd name="connsiteY0" fmla="*/ 794496 h 1782256"/>
-                <a:gd name="connsiteX1" fmla="*/ 658132 w 1928132"/>
-                <a:gd name="connsiteY1" fmla="*/ 791321 h 1782256"/>
-                <a:gd name="connsiteX2" fmla="*/ 926646 w 1928132"/>
-                <a:gd name="connsiteY2" fmla="*/ 22064 h 1782256"/>
-                <a:gd name="connsiteX3" fmla="*/ 1086303 w 1928132"/>
-                <a:gd name="connsiteY3" fmla="*/ 1778293 h 1782256"/>
-                <a:gd name="connsiteX4" fmla="*/ 1274989 w 1928132"/>
-                <a:gd name="connsiteY4" fmla="*/ 508293 h 1782256"/>
-                <a:gd name="connsiteX5" fmla="*/ 1478189 w 1928132"/>
-                <a:gd name="connsiteY5" fmla="*/ 791321 h 1782256"/>
-                <a:gd name="connsiteX6" fmla="*/ 1928132 w 1928132"/>
-                <a:gd name="connsiteY6" fmla="*/ 653436 h 1782256"/>
-                <a:gd name="connsiteX0" fmla="*/ 0 w 1928132"/>
-                <a:gd name="connsiteY0" fmla="*/ 793349 h 1781109"/>
-                <a:gd name="connsiteX1" fmla="*/ 658132 w 1928132"/>
-                <a:gd name="connsiteY1" fmla="*/ 790174 h 1781109"/>
-                <a:gd name="connsiteX2" fmla="*/ 926646 w 1928132"/>
-                <a:gd name="connsiteY2" fmla="*/ 20917 h 1781109"/>
-                <a:gd name="connsiteX3" fmla="*/ 1086303 w 1928132"/>
-                <a:gd name="connsiteY3" fmla="*/ 1777146 h 1781109"/>
-                <a:gd name="connsiteX4" fmla="*/ 1274989 w 1928132"/>
-                <a:gd name="connsiteY4" fmla="*/ 507146 h 1781109"/>
-                <a:gd name="connsiteX5" fmla="*/ 1478189 w 1928132"/>
-                <a:gd name="connsiteY5" fmla="*/ 790174 h 1781109"/>
-                <a:gd name="connsiteX6" fmla="*/ 1928132 w 1928132"/>
-                <a:gd name="connsiteY6" fmla="*/ 652289 h 1781109"/>
-                <a:gd name="connsiteX0" fmla="*/ 0 w 1966232"/>
-                <a:gd name="connsiteY0" fmla="*/ 793349 h 1781109"/>
-                <a:gd name="connsiteX1" fmla="*/ 658132 w 1966232"/>
-                <a:gd name="connsiteY1" fmla="*/ 790174 h 1781109"/>
-                <a:gd name="connsiteX2" fmla="*/ 926646 w 1966232"/>
-                <a:gd name="connsiteY2" fmla="*/ 20917 h 1781109"/>
-                <a:gd name="connsiteX3" fmla="*/ 1086303 w 1966232"/>
-                <a:gd name="connsiteY3" fmla="*/ 1777146 h 1781109"/>
-                <a:gd name="connsiteX4" fmla="*/ 1274989 w 1966232"/>
-                <a:gd name="connsiteY4" fmla="*/ 507146 h 1781109"/>
-                <a:gd name="connsiteX5" fmla="*/ 1478189 w 1966232"/>
-                <a:gd name="connsiteY5" fmla="*/ 790174 h 1781109"/>
-                <a:gd name="connsiteX6" fmla="*/ 1966232 w 1966232"/>
-                <a:gd name="connsiteY6" fmla="*/ 823739 h 1781109"/>
-              </a:gdLst>
-              <a:ahLst/>
-              <a:cxnLst>
-                <a:cxn ang="0">
-                  <a:pos x="connsiteX0" y="connsiteY0"/>
-                </a:cxn>
-                <a:cxn ang="0">
-                  <a:pos x="connsiteX1" y="connsiteY1"/>
-                </a:cxn>
-                <a:cxn ang="0">
-                  <a:pos x="connsiteX2" y="connsiteY2"/>
-                </a:cxn>
-                <a:cxn ang="0">
-                  <a:pos x="connsiteX3" y="connsiteY3"/>
-                </a:cxn>
-                <a:cxn ang="0">
-                  <a:pos x="connsiteX4" y="connsiteY4"/>
-                </a:cxn>
-                <a:cxn ang="0">
-                  <a:pos x="connsiteX5" y="connsiteY5"/>
-                </a:cxn>
-                <a:cxn ang="0">
-                  <a:pos x="connsiteX6" y="connsiteY6"/>
-                </a:cxn>
-              </a:cxnLst>
-              <a:rect l="l" t="t" r="r" b="b"/>
-              <a:pathLst>
-                <a:path w="1966232" h="1781109">
-                  <a:moveTo>
-                    <a:pt x="0" y="793349"/>
-                  </a:moveTo>
-                  <a:cubicBezTo>
-                    <a:pt x="260576" y="795012"/>
-                    <a:pt x="489404" y="866526"/>
-                    <a:pt x="658132" y="790174"/>
-                  </a:cubicBezTo>
-                  <a:cubicBezTo>
-                    <a:pt x="826860" y="713822"/>
-                    <a:pt x="855284" y="-143578"/>
-                    <a:pt x="926646" y="20917"/>
-                  </a:cubicBezTo>
-                  <a:cubicBezTo>
-                    <a:pt x="998008" y="185412"/>
-                    <a:pt x="1028246" y="1696108"/>
-                    <a:pt x="1086303" y="1777146"/>
-                  </a:cubicBezTo>
-                  <a:cubicBezTo>
-                    <a:pt x="1144360" y="1858184"/>
-                    <a:pt x="1209675" y="671641"/>
-                    <a:pt x="1274989" y="507146"/>
-                  </a:cubicBezTo>
-                  <a:cubicBezTo>
-                    <a:pt x="1340303" y="342651"/>
-                    <a:pt x="1362982" y="737409"/>
-                    <a:pt x="1478189" y="790174"/>
-                  </a:cubicBezTo>
-                  <a:cubicBezTo>
-                    <a:pt x="1593396" y="842940"/>
-                    <a:pt x="1875518" y="808015"/>
-                    <a:pt x="1966232" y="823739"/>
-                  </a:cubicBezTo>
-                </a:path>
-              </a:pathLst>
-            </a:custGeom>
-            <a:noFill/>
-            <a:ln w="38100">
-              <a:solidFill>
-                <a:schemeClr val="tx1"/>
-              </a:solidFill>
-            </a:ln>
-          </p:spPr>
-          <p:style>
-            <a:lnRef idx="2">
-              <a:schemeClr val="accent1">
-                <a:shade val="50000"/>
-              </a:schemeClr>
-            </a:lnRef>
-            <a:fillRef idx="1">
-              <a:schemeClr val="accent1"/>
-            </a:fillRef>
-            <a:effectRef idx="0">
-              <a:schemeClr val="accent1"/>
-            </a:effectRef>
-            <a:fontRef idx="minor">
-              <a:schemeClr val="lt1"/>
-            </a:fontRef>
-          </p:style>
-          <p:txBody>
-            <a:bodyPr rtlCol="0" anchor="ctr"/>
-            <a:lstStyle/>
-            <a:p>
-              <a:pPr algn="ctr"/>
-              <a:endParaRPr lang="en-US"/>
-            </a:p>
-          </p:txBody>
-        </p:sp>
-        <mc:AlternateContent xmlns:mc="http://schemas.openxmlformats.org/markup-compatibility/2006">
-          <mc:Choice xmlns:a14="http://schemas.microsoft.com/office/drawing/2010/main" Requires="a14">
-            <p:sp>
-              <p:nvSpPr>
-                <p:cNvPr id="13" name="Rectangle 12">
-                  <a:extLst>
-                    <a:ext uri="{FF2B5EF4-FFF2-40B4-BE49-F238E27FC236}">
-                      <a16:creationId xmlns:a16="http://schemas.microsoft.com/office/drawing/2014/main" id="{B1B0BABC-E345-4387-9244-1430818B7C5E}"/>
-                    </a:ext>
-                  </a:extLst>
-                </p:cNvPr>
-                <p:cNvSpPr/>
-                <p:nvPr/>
-              </p:nvSpPr>
-              <p:spPr>
-                <a:xfrm>
-                  <a:off x="4827315" y="2975296"/>
-                  <a:ext cx="358725" cy="2293034"/>
-                </a:xfrm>
-                <a:prstGeom prst="rect">
-                  <a:avLst/>
-                </a:prstGeom>
-                <a:solidFill>
-                  <a:schemeClr val="accent4">
-                    <a:lumMod val="40000"/>
-                    <a:lumOff val="60000"/>
-                  </a:schemeClr>
-                </a:solidFill>
-                <a:ln w="19050">
-                  <a:solidFill>
-                    <a:schemeClr val="tx1"/>
-                  </a:solidFill>
-                </a:ln>
-              </p:spPr>
-              <p:style>
-                <a:lnRef idx="2">
-                  <a:schemeClr val="accent1">
-                    <a:shade val="50000"/>
-                  </a:schemeClr>
-                </a:lnRef>
-                <a:fillRef idx="1">
-                  <a:schemeClr val="accent1"/>
-                </a:fillRef>
-                <a:effectRef idx="0">
-                  <a:schemeClr val="accent1"/>
-                </a:effectRef>
-                <a:fontRef idx="minor">
-                  <a:schemeClr val="lt1"/>
-                </a:fontRef>
-              </p:style>
-              <p:txBody>
-                <a:bodyPr rtlCol="0" anchor="ctr"/>
-                <a:lstStyle/>
-                <a:p>
-                  <a:pPr algn="ctr"/>
-                  <a14:m>
-                    <m:oMathPara xmlns:m="http://schemas.openxmlformats.org/officeDocument/2006/math">
-                      <m:oMathParaPr>
-                        <m:jc m:val="centerGroup"/>
-                      </m:oMathParaPr>
-                      <m:oMath xmlns:m="http://schemas.openxmlformats.org/officeDocument/2006/math">
-                        <m:sSub>
-                          <m:sSubPr>
-                            <m:ctrlPr>
-                              <a:rPr lang="en-US" b="0" i="1" smtClean="0">
-                                <a:solidFill>
-                                  <a:schemeClr val="tx1"/>
-                                </a:solidFill>
-                                <a:latin typeface="Cambria Math" panose="02040503050406030204" pitchFamily="18" charset="0"/>
-                              </a:rPr>
-                            </m:ctrlPr>
-                          </m:sSubPr>
-                          <m:e>
-                            <m:r>
-                              <a:rPr lang="en-US" b="0" i="1" smtClean="0">
-                                <a:solidFill>
-                                  <a:schemeClr val="tx1"/>
-                                </a:solidFill>
-                                <a:latin typeface="Cambria Math" panose="02040503050406030204" pitchFamily="18" charset="0"/>
-                              </a:rPr>
-                              <m:t>𝑛</m:t>
-                            </m:r>
-                          </m:e>
-                          <m:sub>
-                            <m:r>
-                              <a:rPr lang="en-US" b="0" i="1" smtClean="0">
-                                <a:solidFill>
-                                  <a:schemeClr val="tx1"/>
-                                </a:solidFill>
-                                <a:latin typeface="Cambria Math" panose="02040503050406030204" pitchFamily="18" charset="0"/>
-                              </a:rPr>
-                              <m:t>1</m:t>
-                            </m:r>
-                          </m:sub>
-                        </m:sSub>
-                      </m:oMath>
-                    </m:oMathPara>
-                  </a14:m>
-                  <a:endParaRPr lang="en-US" dirty="0"/>
-                </a:p>
-              </p:txBody>
-            </p:sp>
-          </mc:Choice>
-          <mc:Fallback>
-            <p:sp>
-              <p:nvSpPr>
-                <p:cNvPr id="13" name="Rectangle 12">
-                  <a:extLst>
-                    <a:ext uri="{FF2B5EF4-FFF2-40B4-BE49-F238E27FC236}">
-                      <a16:creationId xmlns:a16="http://schemas.microsoft.com/office/drawing/2014/main" id="{B1B0BABC-E345-4387-9244-1430818B7C5E}"/>
-                    </a:ext>
-                  </a:extLst>
-                </p:cNvPr>
-                <p:cNvSpPr>
-                  <a:spLocks noRot="1" noChangeAspect="1" noMove="1" noResize="1" noEditPoints="1" noAdjustHandles="1" noChangeArrowheads="1" noChangeShapeType="1" noTextEdit="1"/>
-                </p:cNvSpPr>
-                <p:nvPr/>
-              </p:nvSpPr>
-              <p:spPr>
-                <a:xfrm>
-                  <a:off x="4827315" y="2975296"/>
-                  <a:ext cx="358725" cy="2293034"/>
-                </a:xfrm>
-                <a:prstGeom prst="rect">
-                  <a:avLst/>
-                </a:prstGeom>
-                <a:blipFill>
-                  <a:blip r:embed="rId7"/>
-                  <a:stretch>
-                    <a:fillRect l="-6452"/>
-                  </a:stretch>
-                </a:blipFill>
-                <a:ln w="19050">
-                  <a:solidFill>
-                    <a:schemeClr val="tx1"/>
-                  </a:solidFill>
-                </a:ln>
-              </p:spPr>
-              <p:txBody>
-                <a:bodyPr/>
-                <a:lstStyle/>
-                <a:p>
-                  <a:r>
-                    <a:rPr lang="en-US">
-                      <a:noFill/>
-                    </a:rPr>
-                    <a:t> </a:t>
-                  </a:r>
-                </a:p>
-              </p:txBody>
-            </p:sp>
-          </mc:Fallback>
-        </mc:AlternateContent>
-        <p:sp>
-          <p:nvSpPr>
-            <p:cNvPr id="15" name="Rectangle 14">
-              <a:extLst>
-                <a:ext uri="{FF2B5EF4-FFF2-40B4-BE49-F238E27FC236}">
-                  <a16:creationId xmlns:a16="http://schemas.microsoft.com/office/drawing/2014/main" id="{8E701008-4152-4FB2-B30B-CF2A2A0423C0}"/>
-                </a:ext>
-              </a:extLst>
-            </p:cNvPr>
-            <p:cNvSpPr/>
-            <p:nvPr/>
-          </p:nvSpPr>
-          <p:spPr>
-            <a:xfrm>
-              <a:off x="5188045" y="2975296"/>
-              <a:ext cx="634219" cy="2293034"/>
-            </a:xfrm>
-            <a:prstGeom prst="rect">
-              <a:avLst/>
-            </a:prstGeom>
-            <a:solidFill>
-              <a:schemeClr val="bg1"/>
-            </a:solidFill>
-            <a:ln w="19050">
-              <a:solidFill>
-                <a:schemeClr val="tx1"/>
-              </a:solidFill>
-            </a:ln>
-          </p:spPr>
-          <p:style>
-            <a:lnRef idx="2">
-              <a:schemeClr val="accent1">
-                <a:shade val="50000"/>
-              </a:schemeClr>
-            </a:lnRef>
-            <a:fillRef idx="1">
-              <a:schemeClr val="accent1"/>
-            </a:fillRef>
-            <a:effectRef idx="0">
-              <a:schemeClr val="accent1"/>
-            </a:effectRef>
-            <a:fontRef idx="minor">
-              <a:schemeClr val="lt1"/>
-            </a:fontRef>
-          </p:style>
-          <p:txBody>
-            <a:bodyPr rtlCol="0" anchor="ctr"/>
-            <a:lstStyle/>
-            <a:p>
-              <a:pPr algn="ctr"/>
-              <a:r>
-                <a:rPr lang="en-US" dirty="0">
-                  <a:solidFill>
-                    <a:schemeClr val="tx1"/>
-                  </a:solidFill>
-                </a:rPr>
-                <a:t>…</a:t>
-              </a:r>
-            </a:p>
-          </p:txBody>
-        </p:sp>
-        <mc:AlternateContent xmlns:mc="http://schemas.openxmlformats.org/markup-compatibility/2006">
-          <mc:Choice xmlns:a14="http://schemas.microsoft.com/office/drawing/2010/main" Requires="a14">
-            <p:sp>
-              <p:nvSpPr>
-                <p:cNvPr id="16" name="Rectangle 15">
-                  <a:extLst>
-                    <a:ext uri="{FF2B5EF4-FFF2-40B4-BE49-F238E27FC236}">
-                      <a16:creationId xmlns:a16="http://schemas.microsoft.com/office/drawing/2014/main" id="{D0B86ABE-845B-496F-B5D7-84F41B640A03}"/>
-                    </a:ext>
-                  </a:extLst>
-                </p:cNvPr>
-                <p:cNvSpPr/>
-                <p:nvPr/>
-              </p:nvSpPr>
-              <p:spPr>
-                <a:xfrm>
-                  <a:off x="5803259" y="2975296"/>
-                  <a:ext cx="634219" cy="2293034"/>
-                </a:xfrm>
-                <a:prstGeom prst="rect">
-                  <a:avLst/>
-                </a:prstGeom>
-                <a:solidFill>
-                  <a:schemeClr val="accent2">
-                    <a:lumMod val="40000"/>
-                    <a:lumOff val="60000"/>
-                  </a:schemeClr>
-                </a:solidFill>
-                <a:ln w="19050">
-                  <a:solidFill>
-                    <a:schemeClr val="tx1"/>
-                  </a:solidFill>
-                </a:ln>
-              </p:spPr>
-              <p:style>
-                <a:lnRef idx="2">
-                  <a:schemeClr val="accent1">
-                    <a:shade val="50000"/>
-                  </a:schemeClr>
-                </a:lnRef>
-                <a:fillRef idx="1">
-                  <a:schemeClr val="accent1"/>
-                </a:fillRef>
-                <a:effectRef idx="0">
-                  <a:schemeClr val="accent1"/>
-                </a:effectRef>
-                <a:fontRef idx="minor">
-                  <a:schemeClr val="lt1"/>
-                </a:fontRef>
-              </p:style>
-              <p:txBody>
-                <a:bodyPr rtlCol="0" anchor="ctr"/>
-                <a:lstStyle/>
-                <a:p>
-                  <a:pPr algn="ctr"/>
-                  <a14:m>
-                    <m:oMathPara xmlns:m="http://schemas.openxmlformats.org/officeDocument/2006/math">
-                      <m:oMathParaPr>
-                        <m:jc m:val="centerGroup"/>
-                      </m:oMathParaPr>
-                      <m:oMath xmlns:m="http://schemas.openxmlformats.org/officeDocument/2006/math">
-                        <m:sSub>
-                          <m:sSubPr>
-                            <m:ctrlPr>
-                              <a:rPr lang="en-US" b="0" i="1" dirty="0" smtClean="0">
-                                <a:solidFill>
-                                  <a:schemeClr val="tx1"/>
-                                </a:solidFill>
-                                <a:latin typeface="Cambria Math" panose="02040503050406030204" pitchFamily="18" charset="0"/>
-                              </a:rPr>
-                            </m:ctrlPr>
-                          </m:sSubPr>
-                          <m:e>
-                            <m:r>
-                              <a:rPr lang="en-US" b="0" i="1" dirty="0" smtClean="0">
-                                <a:solidFill>
-                                  <a:schemeClr val="tx1"/>
-                                </a:solidFill>
-                                <a:latin typeface="Cambria Math" panose="02040503050406030204" pitchFamily="18" charset="0"/>
-                              </a:rPr>
-                              <m:t>𝑛</m:t>
-                            </m:r>
-                          </m:e>
-                          <m:sub>
-                            <m:r>
-                              <a:rPr lang="en-US" b="0" i="1" dirty="0" smtClean="0">
-                                <a:solidFill>
-                                  <a:schemeClr val="tx1"/>
-                                </a:solidFill>
-                                <a:latin typeface="Cambria Math" panose="02040503050406030204" pitchFamily="18" charset="0"/>
-                              </a:rPr>
-                              <m:t>𝑁</m:t>
-                            </m:r>
-                          </m:sub>
-                        </m:sSub>
-                      </m:oMath>
-                    </m:oMathPara>
-                  </a14:m>
-                  <a:endParaRPr lang="en-US" dirty="0">
+                  </a:ln>
+                </p:spPr>
+                <p:style>
+                  <a:lnRef idx="2">
+                    <a:schemeClr val="accent1">
+                      <a:shade val="50000"/>
+                    </a:schemeClr>
+                  </a:lnRef>
+                  <a:fillRef idx="1">
+                    <a:schemeClr val="accent1"/>
+                  </a:fillRef>
+                  <a:effectRef idx="0">
+                    <a:schemeClr val="accent1"/>
+                  </a:effectRef>
+                  <a:fontRef idx="minor">
+                    <a:schemeClr val="lt1"/>
+                  </a:fontRef>
+                </p:style>
+                <p:txBody>
+                  <a:bodyPr rtlCol="0" anchor="ctr"/>
+                  <a:lstStyle/>
+                  <a:p>
+                    <a:pPr algn="ctr"/>
+                    <a14:m>
+                      <m:oMathPara xmlns:m="http://schemas.openxmlformats.org/officeDocument/2006/math">
+                        <m:oMathParaPr>
+                          <m:jc m:val="centerGroup"/>
+                        </m:oMathParaPr>
+                        <m:oMath xmlns:m="http://schemas.openxmlformats.org/officeDocument/2006/math">
+                          <m:sSub>
+                            <m:sSubPr>
+                              <m:ctrlPr>
+                                <a:rPr lang="en-US" b="0" i="1" smtClean="0">
+                                  <a:solidFill>
+                                    <a:schemeClr val="tx1"/>
+                                  </a:solidFill>
+                                  <a:latin typeface="Cambria Math" panose="02040503050406030204" pitchFamily="18" charset="0"/>
+                                </a:rPr>
+                              </m:ctrlPr>
+                            </m:sSubPr>
+                            <m:e>
+                              <m:r>
+                                <a:rPr lang="en-US" b="0" i="1" smtClean="0">
+                                  <a:solidFill>
+                                    <a:schemeClr val="tx1"/>
+                                  </a:solidFill>
+                                  <a:latin typeface="Cambria Math" panose="02040503050406030204" pitchFamily="18" charset="0"/>
+                                </a:rPr>
+                                <m:t>𝑛</m:t>
+                              </m:r>
+                            </m:e>
+                            <m:sub>
+                              <m:r>
+                                <a:rPr lang="en-US" b="0" i="1" smtClean="0">
+                                  <a:solidFill>
+                                    <a:schemeClr val="tx1"/>
+                                  </a:solidFill>
+                                  <a:latin typeface="Cambria Math" panose="02040503050406030204" pitchFamily="18" charset="0"/>
+                                </a:rPr>
+                                <m:t>1</m:t>
+                              </m:r>
+                            </m:sub>
+                          </m:sSub>
+                        </m:oMath>
+                      </m:oMathPara>
+                    </a14:m>
+                    <a:endParaRPr lang="en-US" dirty="0"/>
+                  </a:p>
+                </p:txBody>
+              </p:sp>
+            </mc:Choice>
+            <mc:Fallback>
+              <p:sp>
+                <p:nvSpPr>
+                  <p:cNvPr id="13" name="Rectangle 12">
+                    <a:extLst>
+                      <a:ext uri="{FF2B5EF4-FFF2-40B4-BE49-F238E27FC236}">
+                        <a16:creationId xmlns:a16="http://schemas.microsoft.com/office/drawing/2014/main" id="{B1B0BABC-E345-4387-9244-1430818B7C5E}"/>
+                      </a:ext>
+                    </a:extLst>
+                  </p:cNvPr>
+                  <p:cNvSpPr>
+                    <a:spLocks noRot="1" noChangeAspect="1" noMove="1" noResize="1" noEditPoints="1" noAdjustHandles="1" noChangeArrowheads="1" noChangeShapeType="1" noTextEdit="1"/>
+                  </p:cNvSpPr>
+                  <p:nvPr/>
+                </p:nvSpPr>
+                <p:spPr>
+                  <a:xfrm>
+                    <a:off x="4827315" y="2975296"/>
+                    <a:ext cx="358725" cy="2293034"/>
+                  </a:xfrm>
+                  <a:prstGeom prst="rect">
+                    <a:avLst/>
+                  </a:prstGeom>
+                  <a:blipFill>
+                    <a:blip r:embed="rId7"/>
+                    <a:stretch>
+                      <a:fillRect l="-6452"/>
+                    </a:stretch>
+                  </a:blipFill>
+                  <a:ln w="19050">
                     <a:solidFill>
                       <a:schemeClr val="tx1"/>
                     </a:solidFill>
-                  </a:endParaRPr>
-                </a:p>
-              </p:txBody>
-            </p:sp>
-          </mc:Choice>
-          <mc:Fallback>
-            <p:sp>
-              <p:nvSpPr>
-                <p:cNvPr id="16" name="Rectangle 15">
-                  <a:extLst>
-                    <a:ext uri="{FF2B5EF4-FFF2-40B4-BE49-F238E27FC236}">
-                      <a16:creationId xmlns:a16="http://schemas.microsoft.com/office/drawing/2014/main" id="{D0B86ABE-845B-496F-B5D7-84F41B640A03}"/>
-                    </a:ext>
-                  </a:extLst>
-                </p:cNvPr>
-                <p:cNvSpPr>
-                  <a:spLocks noRot="1" noChangeAspect="1" noMove="1" noResize="1" noEditPoints="1" noAdjustHandles="1" noChangeArrowheads="1" noChangeShapeType="1" noTextEdit="1"/>
-                </p:cNvSpPr>
-                <p:nvPr/>
-              </p:nvSpPr>
-              <p:spPr>
-                <a:xfrm>
-                  <a:off x="5803259" y="2975296"/>
-                  <a:ext cx="634219" cy="2293034"/>
-                </a:xfrm>
-                <a:prstGeom prst="rect">
-                  <a:avLst/>
-                </a:prstGeom>
-                <a:blipFill>
-                  <a:blip r:embed="rId8"/>
-                  <a:stretch>
-                    <a:fillRect/>
-                  </a:stretch>
-                </a:blipFill>
-                <a:ln w="19050">
+                  </a:ln>
+                </p:spPr>
+                <p:txBody>
+                  <a:bodyPr/>
+                  <a:lstStyle/>
+                  <a:p>
+                    <a:r>
+                      <a:rPr lang="en-US">
+                        <a:noFill/>
+                      </a:rPr>
+                      <a:t> </a:t>
+                    </a:r>
+                  </a:p>
+                </p:txBody>
+              </p:sp>
+            </mc:Fallback>
+          </mc:AlternateContent>
+          <p:sp>
+            <p:nvSpPr>
+              <p:cNvPr id="15" name="Rectangle 14">
+                <a:extLst>
+                  <a:ext uri="{FF2B5EF4-FFF2-40B4-BE49-F238E27FC236}">
+                    <a16:creationId xmlns:a16="http://schemas.microsoft.com/office/drawing/2014/main" id="{8E701008-4152-4FB2-B30B-CF2A2A0423C0}"/>
+                  </a:ext>
+                </a:extLst>
+              </p:cNvPr>
+              <p:cNvSpPr/>
+              <p:nvPr/>
+            </p:nvSpPr>
+            <p:spPr>
+              <a:xfrm>
+                <a:off x="5188045" y="2975296"/>
+                <a:ext cx="634219" cy="2293034"/>
+              </a:xfrm>
+              <a:prstGeom prst="rect">
+                <a:avLst/>
+              </a:prstGeom>
+              <a:solidFill>
+                <a:schemeClr val="bg1"/>
+              </a:solidFill>
+              <a:ln w="19050">
+                <a:solidFill>
+                  <a:schemeClr val="tx1"/>
+                </a:solidFill>
+              </a:ln>
+            </p:spPr>
+            <p:style>
+              <a:lnRef idx="2">
+                <a:schemeClr val="accent1">
+                  <a:shade val="50000"/>
+                </a:schemeClr>
+              </a:lnRef>
+              <a:fillRef idx="1">
+                <a:schemeClr val="accent1"/>
+              </a:fillRef>
+              <a:effectRef idx="0">
+                <a:schemeClr val="accent1"/>
+              </a:effectRef>
+              <a:fontRef idx="minor">
+                <a:schemeClr val="lt1"/>
+              </a:fontRef>
+            </p:style>
+            <p:txBody>
+              <a:bodyPr rtlCol="0" anchor="ctr"/>
+              <a:lstStyle/>
+              <a:p>
+                <a:pPr algn="ctr"/>
+                <a:r>
+                  <a:rPr lang="en-US" dirty="0">
+                    <a:solidFill>
+                      <a:schemeClr val="tx1"/>
+                    </a:solidFill>
+                  </a:rPr>
+                  <a:t>…</a:t>
+                </a:r>
+              </a:p>
+            </p:txBody>
+          </p:sp>
+          <mc:AlternateContent xmlns:mc="http://schemas.openxmlformats.org/markup-compatibility/2006">
+            <mc:Choice xmlns:a14="http://schemas.microsoft.com/office/drawing/2010/main" Requires="a14">
+              <p:sp>
+                <p:nvSpPr>
+                  <p:cNvPr id="16" name="Rectangle 15">
+                    <a:extLst>
+                      <a:ext uri="{FF2B5EF4-FFF2-40B4-BE49-F238E27FC236}">
+                        <a16:creationId xmlns:a16="http://schemas.microsoft.com/office/drawing/2014/main" id="{D0B86ABE-845B-496F-B5D7-84F41B640A03}"/>
+                      </a:ext>
+                    </a:extLst>
+                  </p:cNvPr>
+                  <p:cNvSpPr/>
+                  <p:nvPr/>
+                </p:nvSpPr>
+                <p:spPr>
+                  <a:xfrm>
+                    <a:off x="5803259" y="2975296"/>
+                    <a:ext cx="634219" cy="2293034"/>
+                  </a:xfrm>
+                  <a:prstGeom prst="rect">
+                    <a:avLst/>
+                  </a:prstGeom>
                   <a:solidFill>
-                    <a:schemeClr val="tx1"/>
+                    <a:schemeClr val="accent2">
+                      <a:lumMod val="40000"/>
+                      <a:lumOff val="60000"/>
+                    </a:schemeClr>
                   </a:solidFill>
-                </a:ln>
-              </p:spPr>
-              <p:txBody>
-                <a:bodyPr/>
-                <a:lstStyle/>
-                <a:p>
-                  <a:r>
-                    <a:rPr lang="en-US">
-                      <a:noFill/>
-                    </a:rPr>
-                    <a:t> </a:t>
-                  </a:r>
-                </a:p>
-              </p:txBody>
-            </p:sp>
-          </mc:Fallback>
-        </mc:AlternateContent>
-        <p:sp>
-          <p:nvSpPr>
-            <p:cNvPr id="17" name="Freeform: Shape 16">
-              <a:extLst>
-                <a:ext uri="{FF2B5EF4-FFF2-40B4-BE49-F238E27FC236}">
-                  <a16:creationId xmlns:a16="http://schemas.microsoft.com/office/drawing/2014/main" id="{FBD0523F-8CC4-4205-9068-3A1C66128002}"/>
-                </a:ext>
-              </a:extLst>
-            </p:cNvPr>
-            <p:cNvSpPr/>
-            <p:nvPr/>
-          </p:nvSpPr>
-          <p:spPr>
-            <a:xfrm flipV="1">
-              <a:off x="6745456" y="3536375"/>
-              <a:ext cx="1964563" cy="1156807"/>
-            </a:xfrm>
-            <a:custGeom>
-              <a:avLst/>
-              <a:gdLst>
-                <a:gd name="connsiteX0" fmla="*/ 0 w 1937657"/>
-                <a:gd name="connsiteY0" fmla="*/ 689325 h 1781860"/>
-                <a:gd name="connsiteX1" fmla="*/ 667657 w 1937657"/>
-                <a:gd name="connsiteY1" fmla="*/ 790925 h 1781860"/>
-                <a:gd name="connsiteX2" fmla="*/ 936171 w 1937657"/>
-                <a:gd name="connsiteY2" fmla="*/ 21668 h 1781860"/>
-                <a:gd name="connsiteX3" fmla="*/ 1095828 w 1937657"/>
-                <a:gd name="connsiteY3" fmla="*/ 1777897 h 1781860"/>
-                <a:gd name="connsiteX4" fmla="*/ 1284514 w 1937657"/>
-                <a:gd name="connsiteY4" fmla="*/ 507897 h 1781860"/>
-                <a:gd name="connsiteX5" fmla="*/ 1487714 w 1937657"/>
-                <a:gd name="connsiteY5" fmla="*/ 790925 h 1781860"/>
-                <a:gd name="connsiteX6" fmla="*/ 1937657 w 1937657"/>
-                <a:gd name="connsiteY6" fmla="*/ 653040 h 1781860"/>
-                <a:gd name="connsiteX0" fmla="*/ 0 w 1928132"/>
-                <a:gd name="connsiteY0" fmla="*/ 794496 h 1782256"/>
-                <a:gd name="connsiteX1" fmla="*/ 658132 w 1928132"/>
-                <a:gd name="connsiteY1" fmla="*/ 791321 h 1782256"/>
-                <a:gd name="connsiteX2" fmla="*/ 926646 w 1928132"/>
-                <a:gd name="connsiteY2" fmla="*/ 22064 h 1782256"/>
-                <a:gd name="connsiteX3" fmla="*/ 1086303 w 1928132"/>
-                <a:gd name="connsiteY3" fmla="*/ 1778293 h 1782256"/>
-                <a:gd name="connsiteX4" fmla="*/ 1274989 w 1928132"/>
-                <a:gd name="connsiteY4" fmla="*/ 508293 h 1782256"/>
-                <a:gd name="connsiteX5" fmla="*/ 1478189 w 1928132"/>
-                <a:gd name="connsiteY5" fmla="*/ 791321 h 1782256"/>
-                <a:gd name="connsiteX6" fmla="*/ 1928132 w 1928132"/>
-                <a:gd name="connsiteY6" fmla="*/ 653436 h 1782256"/>
-                <a:gd name="connsiteX0" fmla="*/ 0 w 1928132"/>
-                <a:gd name="connsiteY0" fmla="*/ 794496 h 1782256"/>
-                <a:gd name="connsiteX1" fmla="*/ 658132 w 1928132"/>
-                <a:gd name="connsiteY1" fmla="*/ 791321 h 1782256"/>
-                <a:gd name="connsiteX2" fmla="*/ 926646 w 1928132"/>
-                <a:gd name="connsiteY2" fmla="*/ 22064 h 1782256"/>
-                <a:gd name="connsiteX3" fmla="*/ 1086303 w 1928132"/>
-                <a:gd name="connsiteY3" fmla="*/ 1778293 h 1782256"/>
-                <a:gd name="connsiteX4" fmla="*/ 1274989 w 1928132"/>
-                <a:gd name="connsiteY4" fmla="*/ 508293 h 1782256"/>
-                <a:gd name="connsiteX5" fmla="*/ 1478189 w 1928132"/>
-                <a:gd name="connsiteY5" fmla="*/ 791321 h 1782256"/>
-                <a:gd name="connsiteX6" fmla="*/ 1928132 w 1928132"/>
-                <a:gd name="connsiteY6" fmla="*/ 653436 h 1782256"/>
-                <a:gd name="connsiteX0" fmla="*/ 0 w 1928132"/>
-                <a:gd name="connsiteY0" fmla="*/ 794496 h 1782256"/>
-                <a:gd name="connsiteX1" fmla="*/ 658132 w 1928132"/>
-                <a:gd name="connsiteY1" fmla="*/ 791321 h 1782256"/>
-                <a:gd name="connsiteX2" fmla="*/ 926646 w 1928132"/>
-                <a:gd name="connsiteY2" fmla="*/ 22064 h 1782256"/>
-                <a:gd name="connsiteX3" fmla="*/ 1086303 w 1928132"/>
-                <a:gd name="connsiteY3" fmla="*/ 1778293 h 1782256"/>
-                <a:gd name="connsiteX4" fmla="*/ 1274989 w 1928132"/>
-                <a:gd name="connsiteY4" fmla="*/ 508293 h 1782256"/>
-                <a:gd name="connsiteX5" fmla="*/ 1478189 w 1928132"/>
-                <a:gd name="connsiteY5" fmla="*/ 791321 h 1782256"/>
-                <a:gd name="connsiteX6" fmla="*/ 1928132 w 1928132"/>
-                <a:gd name="connsiteY6" fmla="*/ 653436 h 1782256"/>
-                <a:gd name="connsiteX0" fmla="*/ 0 w 1928132"/>
-                <a:gd name="connsiteY0" fmla="*/ 793349 h 1781109"/>
-                <a:gd name="connsiteX1" fmla="*/ 658132 w 1928132"/>
-                <a:gd name="connsiteY1" fmla="*/ 790174 h 1781109"/>
-                <a:gd name="connsiteX2" fmla="*/ 926646 w 1928132"/>
-                <a:gd name="connsiteY2" fmla="*/ 20917 h 1781109"/>
-                <a:gd name="connsiteX3" fmla="*/ 1086303 w 1928132"/>
-                <a:gd name="connsiteY3" fmla="*/ 1777146 h 1781109"/>
-                <a:gd name="connsiteX4" fmla="*/ 1274989 w 1928132"/>
-                <a:gd name="connsiteY4" fmla="*/ 507146 h 1781109"/>
-                <a:gd name="connsiteX5" fmla="*/ 1478189 w 1928132"/>
-                <a:gd name="connsiteY5" fmla="*/ 790174 h 1781109"/>
-                <a:gd name="connsiteX6" fmla="*/ 1928132 w 1928132"/>
-                <a:gd name="connsiteY6" fmla="*/ 652289 h 1781109"/>
-                <a:gd name="connsiteX0" fmla="*/ 0 w 1966232"/>
-                <a:gd name="connsiteY0" fmla="*/ 793349 h 1781109"/>
-                <a:gd name="connsiteX1" fmla="*/ 658132 w 1966232"/>
-                <a:gd name="connsiteY1" fmla="*/ 790174 h 1781109"/>
-                <a:gd name="connsiteX2" fmla="*/ 926646 w 1966232"/>
-                <a:gd name="connsiteY2" fmla="*/ 20917 h 1781109"/>
-                <a:gd name="connsiteX3" fmla="*/ 1086303 w 1966232"/>
-                <a:gd name="connsiteY3" fmla="*/ 1777146 h 1781109"/>
-                <a:gd name="connsiteX4" fmla="*/ 1274989 w 1966232"/>
-                <a:gd name="connsiteY4" fmla="*/ 507146 h 1781109"/>
-                <a:gd name="connsiteX5" fmla="*/ 1478189 w 1966232"/>
-                <a:gd name="connsiteY5" fmla="*/ 790174 h 1781109"/>
-                <a:gd name="connsiteX6" fmla="*/ 1966232 w 1966232"/>
-                <a:gd name="connsiteY6" fmla="*/ 823739 h 1781109"/>
-              </a:gdLst>
-              <a:ahLst/>
-              <a:cxnLst>
-                <a:cxn ang="0">
-                  <a:pos x="connsiteX0" y="connsiteY0"/>
-                </a:cxn>
-                <a:cxn ang="0">
-                  <a:pos x="connsiteX1" y="connsiteY1"/>
-                </a:cxn>
-                <a:cxn ang="0">
-                  <a:pos x="connsiteX2" y="connsiteY2"/>
-                </a:cxn>
-                <a:cxn ang="0">
-                  <a:pos x="connsiteX3" y="connsiteY3"/>
-                </a:cxn>
-                <a:cxn ang="0">
-                  <a:pos x="connsiteX4" y="connsiteY4"/>
-                </a:cxn>
-                <a:cxn ang="0">
-                  <a:pos x="connsiteX5" y="connsiteY5"/>
-                </a:cxn>
-                <a:cxn ang="0">
-                  <a:pos x="connsiteX6" y="connsiteY6"/>
-                </a:cxn>
-              </a:cxnLst>
-              <a:rect l="l" t="t" r="r" b="b"/>
-              <a:pathLst>
-                <a:path w="1966232" h="1781109">
-                  <a:moveTo>
-                    <a:pt x="0" y="793349"/>
-                  </a:moveTo>
-                  <a:cubicBezTo>
-                    <a:pt x="260576" y="795012"/>
-                    <a:pt x="489404" y="866526"/>
-                    <a:pt x="658132" y="790174"/>
-                  </a:cubicBezTo>
-                  <a:cubicBezTo>
-                    <a:pt x="826860" y="713822"/>
-                    <a:pt x="855284" y="-143578"/>
-                    <a:pt x="926646" y="20917"/>
-                  </a:cubicBezTo>
-                  <a:cubicBezTo>
-                    <a:pt x="998008" y="185412"/>
-                    <a:pt x="1028246" y="1696108"/>
-                    <a:pt x="1086303" y="1777146"/>
-                  </a:cubicBezTo>
-                  <a:cubicBezTo>
-                    <a:pt x="1144360" y="1858184"/>
-                    <a:pt x="1209675" y="671641"/>
-                    <a:pt x="1274989" y="507146"/>
-                  </a:cubicBezTo>
-                  <a:cubicBezTo>
-                    <a:pt x="1340303" y="342651"/>
-                    <a:pt x="1362982" y="737409"/>
-                    <a:pt x="1478189" y="790174"/>
-                  </a:cubicBezTo>
-                  <a:cubicBezTo>
-                    <a:pt x="1593396" y="842940"/>
-                    <a:pt x="1875518" y="808015"/>
-                    <a:pt x="1966232" y="823739"/>
-                  </a:cubicBezTo>
-                </a:path>
-              </a:pathLst>
-            </a:custGeom>
-            <a:noFill/>
-            <a:ln w="38100">
-              <a:solidFill>
-                <a:schemeClr val="tx1"/>
-              </a:solidFill>
-            </a:ln>
-          </p:spPr>
-          <p:style>
-            <a:lnRef idx="2">
-              <a:schemeClr val="accent1">
-                <a:shade val="50000"/>
-              </a:schemeClr>
-            </a:lnRef>
-            <a:fillRef idx="1">
-              <a:schemeClr val="accent1"/>
-            </a:fillRef>
-            <a:effectRef idx="0">
-              <a:schemeClr val="accent1"/>
-            </a:effectRef>
-            <a:fontRef idx="minor">
-              <a:schemeClr val="lt1"/>
-            </a:fontRef>
-          </p:style>
-          <p:txBody>
-            <a:bodyPr rtlCol="0" anchor="ctr"/>
-            <a:lstStyle/>
-            <a:p>
-              <a:pPr algn="ctr"/>
-              <a:endParaRPr lang="en-US"/>
-            </a:p>
-          </p:txBody>
-        </p:sp>
-        <mc:AlternateContent xmlns:mc="http://schemas.openxmlformats.org/markup-compatibility/2006">
-          <mc:Choice xmlns:a14="http://schemas.microsoft.com/office/drawing/2010/main" Requires="a14">
-            <p:sp>
-              <p:nvSpPr>
-                <p:cNvPr id="18" name="TextBox 17">
-                  <a:extLst>
-                    <a:ext uri="{FF2B5EF4-FFF2-40B4-BE49-F238E27FC236}">
-                      <a16:creationId xmlns:a16="http://schemas.microsoft.com/office/drawing/2014/main" id="{451011EC-A35F-4253-B649-DBF2B9EA89D0}"/>
-                    </a:ext>
-                  </a:extLst>
-                </p:cNvPr>
-                <p:cNvSpPr txBox="1"/>
-                <p:nvPr/>
-              </p:nvSpPr>
-              <p:spPr>
-                <a:xfrm>
-                  <a:off x="2208848" y="3988149"/>
-                  <a:ext cx="358725" cy="369332"/>
-                </a:xfrm>
-                <a:prstGeom prst="rect">
-                  <a:avLst/>
-                </a:prstGeom>
-                <a:noFill/>
-              </p:spPr>
-              <p:txBody>
-                <a:bodyPr wrap="square" rtlCol="0">
-                  <a:spAutoFit/>
-                </a:bodyPr>
-                <a:lstStyle/>
-                <a:p>
-                  <a14:m>
-                    <m:oMathPara xmlns:m="http://schemas.openxmlformats.org/officeDocument/2006/math">
-                      <m:oMathParaPr>
-                        <m:jc m:val="centerGroup"/>
-                      </m:oMathParaPr>
-                      <m:oMath xmlns:m="http://schemas.openxmlformats.org/officeDocument/2006/math">
-                        <m:sSub>
-                          <m:sSubPr>
-                            <m:ctrlPr>
-                              <a:rPr lang="en-US" b="0" i="1" smtClean="0">
-                                <a:latin typeface="Cambria Math" panose="02040503050406030204" pitchFamily="18" charset="0"/>
-                              </a:rPr>
-                            </m:ctrlPr>
-                          </m:sSubPr>
-                          <m:e>
-                            <m:r>
-                              <a:rPr lang="en-US" b="0" i="1" smtClean="0">
-                                <a:latin typeface="Cambria Math" panose="02040503050406030204" pitchFamily="18" charset="0"/>
-                              </a:rPr>
-                              <m:t>𝐸</m:t>
-                            </m:r>
-                          </m:e>
-                          <m:sub>
-                            <m:r>
-                              <a:rPr lang="en-US" b="0" i="1" smtClean="0">
-                                <a:latin typeface="Cambria Math" panose="02040503050406030204" pitchFamily="18" charset="0"/>
-                              </a:rPr>
-                              <m:t>𝑖</m:t>
-                            </m:r>
-                          </m:sub>
-                        </m:sSub>
-                      </m:oMath>
-                    </m:oMathPara>
-                  </a14:m>
-                  <a:endParaRPr lang="en-US" dirty="0"/>
-                </a:p>
-              </p:txBody>
-            </p:sp>
-          </mc:Choice>
-          <mc:Fallback>
-            <p:sp>
-              <p:nvSpPr>
-                <p:cNvPr id="18" name="TextBox 17">
-                  <a:extLst>
-                    <a:ext uri="{FF2B5EF4-FFF2-40B4-BE49-F238E27FC236}">
-                      <a16:creationId xmlns:a16="http://schemas.microsoft.com/office/drawing/2014/main" id="{451011EC-A35F-4253-B649-DBF2B9EA89D0}"/>
-                    </a:ext>
-                  </a:extLst>
-                </p:cNvPr>
-                <p:cNvSpPr txBox="1">
-                  <a:spLocks noRot="1" noChangeAspect="1" noMove="1" noResize="1" noEditPoints="1" noAdjustHandles="1" noChangeArrowheads="1" noChangeShapeType="1" noTextEdit="1"/>
-                </p:cNvSpPr>
-                <p:nvPr/>
-              </p:nvSpPr>
-              <p:spPr>
-                <a:xfrm>
-                  <a:off x="2208848" y="3988149"/>
-                  <a:ext cx="358725" cy="369332"/>
-                </a:xfrm>
-                <a:prstGeom prst="rect">
-                  <a:avLst/>
-                </a:prstGeom>
-                <a:blipFill>
-                  <a:blip r:embed="rId9"/>
-                  <a:stretch>
-                    <a:fillRect b="-1639"/>
-                  </a:stretch>
-                </a:blipFill>
-              </p:spPr>
-              <p:txBody>
-                <a:bodyPr/>
-                <a:lstStyle/>
-                <a:p>
-                  <a:r>
-                    <a:rPr lang="en-US">
-                      <a:noFill/>
-                    </a:rPr>
-                    <a:t> </a:t>
-                  </a:r>
-                </a:p>
-              </p:txBody>
-            </p:sp>
-          </mc:Fallback>
-        </mc:AlternateContent>
-        <mc:AlternateContent xmlns:mc="http://schemas.openxmlformats.org/markup-compatibility/2006">
-          <mc:Choice xmlns:a14="http://schemas.microsoft.com/office/drawing/2010/main" Requires="a14">
-            <p:sp>
-              <p:nvSpPr>
-                <p:cNvPr id="19" name="TextBox 18">
-                  <a:extLst>
-                    <a:ext uri="{FF2B5EF4-FFF2-40B4-BE49-F238E27FC236}">
-                      <a16:creationId xmlns:a16="http://schemas.microsoft.com/office/drawing/2014/main" id="{4DEF8E66-BDD8-4BC3-8F1C-D4C45251D8F0}"/>
-                    </a:ext>
-                  </a:extLst>
-                </p:cNvPr>
-                <p:cNvSpPr txBox="1"/>
-                <p:nvPr/>
-              </p:nvSpPr>
-              <p:spPr>
-                <a:xfrm>
-                  <a:off x="8875684" y="3988149"/>
-                  <a:ext cx="424232" cy="369332"/>
-                </a:xfrm>
-                <a:prstGeom prst="rect">
-                  <a:avLst/>
-                </a:prstGeom>
-                <a:noFill/>
-              </p:spPr>
-              <p:txBody>
-                <a:bodyPr wrap="square" rtlCol="0">
-                  <a:spAutoFit/>
-                </a:bodyPr>
-                <a:lstStyle/>
-                <a:p>
-                  <a14:m>
-                    <m:oMathPara xmlns:m="http://schemas.openxmlformats.org/officeDocument/2006/math">
-                      <m:oMathParaPr>
-                        <m:jc m:val="centerGroup"/>
-                      </m:oMathParaPr>
-                      <m:oMath xmlns:m="http://schemas.openxmlformats.org/officeDocument/2006/math">
-                        <m:sSub>
-                          <m:sSubPr>
-                            <m:ctrlPr>
-                              <a:rPr lang="en-US" b="0" i="1" smtClean="0">
-                                <a:latin typeface="Cambria Math" panose="02040503050406030204" pitchFamily="18" charset="0"/>
-                              </a:rPr>
-                            </m:ctrlPr>
-                          </m:sSubPr>
-                          <m:e>
-                            <m:r>
-                              <a:rPr lang="en-US" b="0" i="1" smtClean="0">
-                                <a:latin typeface="Cambria Math" panose="02040503050406030204" pitchFamily="18" charset="0"/>
-                              </a:rPr>
-                              <m:t>𝐸</m:t>
-                            </m:r>
-                          </m:e>
-                          <m:sub>
-                            <m:r>
-                              <a:rPr lang="en-US" b="0" i="1" smtClean="0">
-                                <a:latin typeface="Cambria Math" panose="02040503050406030204" pitchFamily="18" charset="0"/>
-                              </a:rPr>
-                              <m:t>𝑟</m:t>
-                            </m:r>
-                          </m:sub>
-                        </m:sSub>
-                      </m:oMath>
-                    </m:oMathPara>
-                  </a14:m>
-                  <a:endParaRPr lang="en-US" dirty="0"/>
-                </a:p>
-              </p:txBody>
-            </p:sp>
-          </mc:Choice>
-          <mc:Fallback>
-            <p:sp>
-              <p:nvSpPr>
-                <p:cNvPr id="19" name="TextBox 18">
-                  <a:extLst>
-                    <a:ext uri="{FF2B5EF4-FFF2-40B4-BE49-F238E27FC236}">
-                      <a16:creationId xmlns:a16="http://schemas.microsoft.com/office/drawing/2014/main" id="{4DEF8E66-BDD8-4BC3-8F1C-D4C45251D8F0}"/>
-                    </a:ext>
-                  </a:extLst>
-                </p:cNvPr>
-                <p:cNvSpPr txBox="1">
-                  <a:spLocks noRot="1" noChangeAspect="1" noMove="1" noResize="1" noEditPoints="1" noAdjustHandles="1" noChangeArrowheads="1" noChangeShapeType="1" noTextEdit="1"/>
-                </p:cNvSpPr>
-                <p:nvPr/>
-              </p:nvSpPr>
-              <p:spPr>
-                <a:xfrm>
-                  <a:off x="8875684" y="3988149"/>
-                  <a:ext cx="424232" cy="369332"/>
-                </a:xfrm>
-                <a:prstGeom prst="rect">
-                  <a:avLst/>
-                </a:prstGeom>
-                <a:blipFill>
-                  <a:blip r:embed="rId10"/>
-                  <a:stretch>
-                    <a:fillRect/>
-                  </a:stretch>
-                </a:blipFill>
-              </p:spPr>
-              <p:txBody>
-                <a:bodyPr/>
-                <a:lstStyle/>
-                <a:p>
-                  <a:r>
-                    <a:rPr lang="en-US">
-                      <a:noFill/>
-                    </a:rPr>
-                    <a:t> </a:t>
-                  </a:r>
-                </a:p>
-              </p:txBody>
-            </p:sp>
-          </mc:Fallback>
-        </mc:AlternateContent>
+                  <a:ln w="19050">
+                    <a:solidFill>
+                      <a:schemeClr val="tx1"/>
+                    </a:solidFill>
+                  </a:ln>
+                </p:spPr>
+                <p:style>
+                  <a:lnRef idx="2">
+                    <a:schemeClr val="accent1">
+                      <a:shade val="50000"/>
+                    </a:schemeClr>
+                  </a:lnRef>
+                  <a:fillRef idx="1">
+                    <a:schemeClr val="accent1"/>
+                  </a:fillRef>
+                  <a:effectRef idx="0">
+                    <a:schemeClr val="accent1"/>
+                  </a:effectRef>
+                  <a:fontRef idx="minor">
+                    <a:schemeClr val="lt1"/>
+                  </a:fontRef>
+                </p:style>
+                <p:txBody>
+                  <a:bodyPr rtlCol="0" anchor="ctr"/>
+                  <a:lstStyle/>
+                  <a:p>
+                    <a:pPr algn="ctr"/>
+                    <a14:m>
+                      <m:oMathPara xmlns:m="http://schemas.openxmlformats.org/officeDocument/2006/math">
+                        <m:oMathParaPr>
+                          <m:jc m:val="centerGroup"/>
+                        </m:oMathParaPr>
+                        <m:oMath xmlns:m="http://schemas.openxmlformats.org/officeDocument/2006/math">
+                          <m:sSub>
+                            <m:sSubPr>
+                              <m:ctrlPr>
+                                <a:rPr lang="en-US" b="0" i="1" dirty="0" smtClean="0">
+                                  <a:solidFill>
+                                    <a:schemeClr val="tx1"/>
+                                  </a:solidFill>
+                                  <a:latin typeface="Cambria Math" panose="02040503050406030204" pitchFamily="18" charset="0"/>
+                                </a:rPr>
+                              </m:ctrlPr>
+                            </m:sSubPr>
+                            <m:e>
+                              <m:r>
+                                <a:rPr lang="en-US" b="0" i="1" dirty="0" smtClean="0">
+                                  <a:solidFill>
+                                    <a:schemeClr val="tx1"/>
+                                  </a:solidFill>
+                                  <a:latin typeface="Cambria Math" panose="02040503050406030204" pitchFamily="18" charset="0"/>
+                                </a:rPr>
+                                <m:t>𝑛</m:t>
+                              </m:r>
+                            </m:e>
+                            <m:sub>
+                              <m:r>
+                                <a:rPr lang="en-US" b="0" i="1" dirty="0" smtClean="0">
+                                  <a:solidFill>
+                                    <a:schemeClr val="tx1"/>
+                                  </a:solidFill>
+                                  <a:latin typeface="Cambria Math" panose="02040503050406030204" pitchFamily="18" charset="0"/>
+                                </a:rPr>
+                                <m:t>𝑁</m:t>
+                              </m:r>
+                            </m:sub>
+                          </m:sSub>
+                        </m:oMath>
+                      </m:oMathPara>
+                    </a14:m>
+                    <a:endParaRPr lang="en-US" dirty="0">
+                      <a:solidFill>
+                        <a:schemeClr val="tx1"/>
+                      </a:solidFill>
+                    </a:endParaRPr>
+                  </a:p>
+                </p:txBody>
+              </p:sp>
+            </mc:Choice>
+            <mc:Fallback>
+              <p:sp>
+                <p:nvSpPr>
+                  <p:cNvPr id="16" name="Rectangle 15">
+                    <a:extLst>
+                      <a:ext uri="{FF2B5EF4-FFF2-40B4-BE49-F238E27FC236}">
+                        <a16:creationId xmlns:a16="http://schemas.microsoft.com/office/drawing/2014/main" id="{D0B86ABE-845B-496F-B5D7-84F41B640A03}"/>
+                      </a:ext>
+                    </a:extLst>
+                  </p:cNvPr>
+                  <p:cNvSpPr>
+                    <a:spLocks noRot="1" noChangeAspect="1" noMove="1" noResize="1" noEditPoints="1" noAdjustHandles="1" noChangeArrowheads="1" noChangeShapeType="1" noTextEdit="1"/>
+                  </p:cNvSpPr>
+                  <p:nvPr/>
+                </p:nvSpPr>
+                <p:spPr>
+                  <a:xfrm>
+                    <a:off x="5803259" y="2975296"/>
+                    <a:ext cx="634219" cy="2293034"/>
+                  </a:xfrm>
+                  <a:prstGeom prst="rect">
+                    <a:avLst/>
+                  </a:prstGeom>
+                  <a:blipFill>
+                    <a:blip r:embed="rId8"/>
+                    <a:stretch>
+                      <a:fillRect/>
+                    </a:stretch>
+                  </a:blipFill>
+                  <a:ln w="19050">
+                    <a:solidFill>
+                      <a:schemeClr val="tx1"/>
+                    </a:solidFill>
+                  </a:ln>
+                </p:spPr>
+                <p:txBody>
+                  <a:bodyPr/>
+                  <a:lstStyle/>
+                  <a:p>
+                    <a:r>
+                      <a:rPr lang="en-US">
+                        <a:noFill/>
+                      </a:rPr>
+                      <a:t> </a:t>
+                    </a:r>
+                  </a:p>
+                </p:txBody>
+              </p:sp>
+            </mc:Fallback>
+          </mc:AlternateContent>
+          <p:sp>
+            <p:nvSpPr>
+              <p:cNvPr id="17" name="Freeform: Shape 16">
+                <a:extLst>
+                  <a:ext uri="{FF2B5EF4-FFF2-40B4-BE49-F238E27FC236}">
+                    <a16:creationId xmlns:a16="http://schemas.microsoft.com/office/drawing/2014/main" id="{FBD0523F-8CC4-4205-9068-3A1C66128002}"/>
+                  </a:ext>
+                </a:extLst>
+              </p:cNvPr>
+              <p:cNvSpPr/>
+              <p:nvPr/>
+            </p:nvSpPr>
+            <p:spPr>
+              <a:xfrm flipV="1">
+                <a:off x="6745456" y="3536375"/>
+                <a:ext cx="1964563" cy="1156807"/>
+              </a:xfrm>
+              <a:custGeom>
+                <a:avLst/>
+                <a:gdLst>
+                  <a:gd name="connsiteX0" fmla="*/ 0 w 1937657"/>
+                  <a:gd name="connsiteY0" fmla="*/ 689325 h 1781860"/>
+                  <a:gd name="connsiteX1" fmla="*/ 667657 w 1937657"/>
+                  <a:gd name="connsiteY1" fmla="*/ 790925 h 1781860"/>
+                  <a:gd name="connsiteX2" fmla="*/ 936171 w 1937657"/>
+                  <a:gd name="connsiteY2" fmla="*/ 21668 h 1781860"/>
+                  <a:gd name="connsiteX3" fmla="*/ 1095828 w 1937657"/>
+                  <a:gd name="connsiteY3" fmla="*/ 1777897 h 1781860"/>
+                  <a:gd name="connsiteX4" fmla="*/ 1284514 w 1937657"/>
+                  <a:gd name="connsiteY4" fmla="*/ 507897 h 1781860"/>
+                  <a:gd name="connsiteX5" fmla="*/ 1487714 w 1937657"/>
+                  <a:gd name="connsiteY5" fmla="*/ 790925 h 1781860"/>
+                  <a:gd name="connsiteX6" fmla="*/ 1937657 w 1937657"/>
+                  <a:gd name="connsiteY6" fmla="*/ 653040 h 1781860"/>
+                  <a:gd name="connsiteX0" fmla="*/ 0 w 1928132"/>
+                  <a:gd name="connsiteY0" fmla="*/ 794496 h 1782256"/>
+                  <a:gd name="connsiteX1" fmla="*/ 658132 w 1928132"/>
+                  <a:gd name="connsiteY1" fmla="*/ 791321 h 1782256"/>
+                  <a:gd name="connsiteX2" fmla="*/ 926646 w 1928132"/>
+                  <a:gd name="connsiteY2" fmla="*/ 22064 h 1782256"/>
+                  <a:gd name="connsiteX3" fmla="*/ 1086303 w 1928132"/>
+                  <a:gd name="connsiteY3" fmla="*/ 1778293 h 1782256"/>
+                  <a:gd name="connsiteX4" fmla="*/ 1274989 w 1928132"/>
+                  <a:gd name="connsiteY4" fmla="*/ 508293 h 1782256"/>
+                  <a:gd name="connsiteX5" fmla="*/ 1478189 w 1928132"/>
+                  <a:gd name="connsiteY5" fmla="*/ 791321 h 1782256"/>
+                  <a:gd name="connsiteX6" fmla="*/ 1928132 w 1928132"/>
+                  <a:gd name="connsiteY6" fmla="*/ 653436 h 1782256"/>
+                  <a:gd name="connsiteX0" fmla="*/ 0 w 1928132"/>
+                  <a:gd name="connsiteY0" fmla="*/ 794496 h 1782256"/>
+                  <a:gd name="connsiteX1" fmla="*/ 658132 w 1928132"/>
+                  <a:gd name="connsiteY1" fmla="*/ 791321 h 1782256"/>
+                  <a:gd name="connsiteX2" fmla="*/ 926646 w 1928132"/>
+                  <a:gd name="connsiteY2" fmla="*/ 22064 h 1782256"/>
+                  <a:gd name="connsiteX3" fmla="*/ 1086303 w 1928132"/>
+                  <a:gd name="connsiteY3" fmla="*/ 1778293 h 1782256"/>
+                  <a:gd name="connsiteX4" fmla="*/ 1274989 w 1928132"/>
+                  <a:gd name="connsiteY4" fmla="*/ 508293 h 1782256"/>
+                  <a:gd name="connsiteX5" fmla="*/ 1478189 w 1928132"/>
+                  <a:gd name="connsiteY5" fmla="*/ 791321 h 1782256"/>
+                  <a:gd name="connsiteX6" fmla="*/ 1928132 w 1928132"/>
+                  <a:gd name="connsiteY6" fmla="*/ 653436 h 1782256"/>
+                  <a:gd name="connsiteX0" fmla="*/ 0 w 1928132"/>
+                  <a:gd name="connsiteY0" fmla="*/ 794496 h 1782256"/>
+                  <a:gd name="connsiteX1" fmla="*/ 658132 w 1928132"/>
+                  <a:gd name="connsiteY1" fmla="*/ 791321 h 1782256"/>
+                  <a:gd name="connsiteX2" fmla="*/ 926646 w 1928132"/>
+                  <a:gd name="connsiteY2" fmla="*/ 22064 h 1782256"/>
+                  <a:gd name="connsiteX3" fmla="*/ 1086303 w 1928132"/>
+                  <a:gd name="connsiteY3" fmla="*/ 1778293 h 1782256"/>
+                  <a:gd name="connsiteX4" fmla="*/ 1274989 w 1928132"/>
+                  <a:gd name="connsiteY4" fmla="*/ 508293 h 1782256"/>
+                  <a:gd name="connsiteX5" fmla="*/ 1478189 w 1928132"/>
+                  <a:gd name="connsiteY5" fmla="*/ 791321 h 1782256"/>
+                  <a:gd name="connsiteX6" fmla="*/ 1928132 w 1928132"/>
+                  <a:gd name="connsiteY6" fmla="*/ 653436 h 1782256"/>
+                  <a:gd name="connsiteX0" fmla="*/ 0 w 1928132"/>
+                  <a:gd name="connsiteY0" fmla="*/ 793349 h 1781109"/>
+                  <a:gd name="connsiteX1" fmla="*/ 658132 w 1928132"/>
+                  <a:gd name="connsiteY1" fmla="*/ 790174 h 1781109"/>
+                  <a:gd name="connsiteX2" fmla="*/ 926646 w 1928132"/>
+                  <a:gd name="connsiteY2" fmla="*/ 20917 h 1781109"/>
+                  <a:gd name="connsiteX3" fmla="*/ 1086303 w 1928132"/>
+                  <a:gd name="connsiteY3" fmla="*/ 1777146 h 1781109"/>
+                  <a:gd name="connsiteX4" fmla="*/ 1274989 w 1928132"/>
+                  <a:gd name="connsiteY4" fmla="*/ 507146 h 1781109"/>
+                  <a:gd name="connsiteX5" fmla="*/ 1478189 w 1928132"/>
+                  <a:gd name="connsiteY5" fmla="*/ 790174 h 1781109"/>
+                  <a:gd name="connsiteX6" fmla="*/ 1928132 w 1928132"/>
+                  <a:gd name="connsiteY6" fmla="*/ 652289 h 1781109"/>
+                  <a:gd name="connsiteX0" fmla="*/ 0 w 1966232"/>
+                  <a:gd name="connsiteY0" fmla="*/ 793349 h 1781109"/>
+                  <a:gd name="connsiteX1" fmla="*/ 658132 w 1966232"/>
+                  <a:gd name="connsiteY1" fmla="*/ 790174 h 1781109"/>
+                  <a:gd name="connsiteX2" fmla="*/ 926646 w 1966232"/>
+                  <a:gd name="connsiteY2" fmla="*/ 20917 h 1781109"/>
+                  <a:gd name="connsiteX3" fmla="*/ 1086303 w 1966232"/>
+                  <a:gd name="connsiteY3" fmla="*/ 1777146 h 1781109"/>
+                  <a:gd name="connsiteX4" fmla="*/ 1274989 w 1966232"/>
+                  <a:gd name="connsiteY4" fmla="*/ 507146 h 1781109"/>
+                  <a:gd name="connsiteX5" fmla="*/ 1478189 w 1966232"/>
+                  <a:gd name="connsiteY5" fmla="*/ 790174 h 1781109"/>
+                  <a:gd name="connsiteX6" fmla="*/ 1966232 w 1966232"/>
+                  <a:gd name="connsiteY6" fmla="*/ 823739 h 1781109"/>
+                </a:gdLst>
+                <a:ahLst/>
+                <a:cxnLst>
+                  <a:cxn ang="0">
+                    <a:pos x="connsiteX0" y="connsiteY0"/>
+                  </a:cxn>
+                  <a:cxn ang="0">
+                    <a:pos x="connsiteX1" y="connsiteY1"/>
+                  </a:cxn>
+                  <a:cxn ang="0">
+                    <a:pos x="connsiteX2" y="connsiteY2"/>
+                  </a:cxn>
+                  <a:cxn ang="0">
+                    <a:pos x="connsiteX3" y="connsiteY3"/>
+                  </a:cxn>
+                  <a:cxn ang="0">
+                    <a:pos x="connsiteX4" y="connsiteY4"/>
+                  </a:cxn>
+                  <a:cxn ang="0">
+                    <a:pos x="connsiteX5" y="connsiteY5"/>
+                  </a:cxn>
+                  <a:cxn ang="0">
+                    <a:pos x="connsiteX6" y="connsiteY6"/>
+                  </a:cxn>
+                </a:cxnLst>
+                <a:rect l="l" t="t" r="r" b="b"/>
+                <a:pathLst>
+                  <a:path w="1966232" h="1781109">
+                    <a:moveTo>
+                      <a:pt x="0" y="793349"/>
+                    </a:moveTo>
+                    <a:cubicBezTo>
+                      <a:pt x="260576" y="795012"/>
+                      <a:pt x="489404" y="866526"/>
+                      <a:pt x="658132" y="790174"/>
+                    </a:cubicBezTo>
+                    <a:cubicBezTo>
+                      <a:pt x="826860" y="713822"/>
+                      <a:pt x="855284" y="-143578"/>
+                      <a:pt x="926646" y="20917"/>
+                    </a:cubicBezTo>
+                    <a:cubicBezTo>
+                      <a:pt x="998008" y="185412"/>
+                      <a:pt x="1028246" y="1696108"/>
+                      <a:pt x="1086303" y="1777146"/>
+                    </a:cubicBezTo>
+                    <a:cubicBezTo>
+                      <a:pt x="1144360" y="1858184"/>
+                      <a:pt x="1209675" y="671641"/>
+                      <a:pt x="1274989" y="507146"/>
+                    </a:cubicBezTo>
+                    <a:cubicBezTo>
+                      <a:pt x="1340303" y="342651"/>
+                      <a:pt x="1362982" y="737409"/>
+                      <a:pt x="1478189" y="790174"/>
+                    </a:cubicBezTo>
+                    <a:cubicBezTo>
+                      <a:pt x="1593396" y="842940"/>
+                      <a:pt x="1875518" y="808015"/>
+                      <a:pt x="1966232" y="823739"/>
+                    </a:cubicBezTo>
+                  </a:path>
+                </a:pathLst>
+              </a:custGeom>
+              <a:noFill/>
+              <a:ln w="38100">
+                <a:solidFill>
+                  <a:schemeClr val="tx1"/>
+                </a:solidFill>
+              </a:ln>
+            </p:spPr>
+            <p:style>
+              <a:lnRef idx="2">
+                <a:schemeClr val="accent1">
+                  <a:shade val="50000"/>
+                </a:schemeClr>
+              </a:lnRef>
+              <a:fillRef idx="1">
+                <a:schemeClr val="accent1"/>
+              </a:fillRef>
+              <a:effectRef idx="0">
+                <a:schemeClr val="accent1"/>
+              </a:effectRef>
+              <a:fontRef idx="minor">
+                <a:schemeClr val="lt1"/>
+              </a:fontRef>
+            </p:style>
+            <p:txBody>
+              <a:bodyPr rtlCol="0" anchor="ctr"/>
+              <a:lstStyle/>
+              <a:p>
+                <a:pPr algn="ctr"/>
+                <a:endParaRPr lang="en-US"/>
+              </a:p>
+            </p:txBody>
+          </p:sp>
+          <mc:AlternateContent xmlns:mc="http://schemas.openxmlformats.org/markup-compatibility/2006">
+            <mc:Choice xmlns:a14="http://schemas.microsoft.com/office/drawing/2010/main" Requires="a14">
+              <p:sp>
+                <p:nvSpPr>
+                  <p:cNvPr id="18" name="TextBox 17">
+                    <a:extLst>
+                      <a:ext uri="{FF2B5EF4-FFF2-40B4-BE49-F238E27FC236}">
+                        <a16:creationId xmlns:a16="http://schemas.microsoft.com/office/drawing/2014/main" id="{451011EC-A35F-4253-B649-DBF2B9EA89D0}"/>
+                      </a:ext>
+                    </a:extLst>
+                  </p:cNvPr>
+                  <p:cNvSpPr txBox="1"/>
+                  <p:nvPr/>
+                </p:nvSpPr>
+                <p:spPr>
+                  <a:xfrm>
+                    <a:off x="2208848" y="3988149"/>
+                    <a:ext cx="358725" cy="369332"/>
+                  </a:xfrm>
+                  <a:prstGeom prst="rect">
+                    <a:avLst/>
+                  </a:prstGeom>
+                  <a:noFill/>
+                </p:spPr>
+                <p:txBody>
+                  <a:bodyPr wrap="square" rtlCol="0">
+                    <a:spAutoFit/>
+                  </a:bodyPr>
+                  <a:lstStyle/>
+                  <a:p>
+                    <a:pPr/>
+                    <a14:m>
+                      <m:oMathPara xmlns:m="http://schemas.openxmlformats.org/officeDocument/2006/math">
+                        <m:oMathParaPr>
+                          <m:jc m:val="centerGroup"/>
+                        </m:oMathParaPr>
+                        <m:oMath xmlns:m="http://schemas.openxmlformats.org/officeDocument/2006/math">
+                          <m:sSub>
+                            <m:sSubPr>
+                              <m:ctrlPr>
+                                <a:rPr lang="en-US" b="0" i="1" smtClean="0">
+                                  <a:latin typeface="Cambria Math" panose="02040503050406030204" pitchFamily="18" charset="0"/>
+                                </a:rPr>
+                              </m:ctrlPr>
+                            </m:sSubPr>
+                            <m:e>
+                              <m:r>
+                                <a:rPr lang="en-US" b="0" i="1" smtClean="0">
+                                  <a:latin typeface="Cambria Math" panose="02040503050406030204" pitchFamily="18" charset="0"/>
+                                </a:rPr>
+                                <m:t>𝐸</m:t>
+                              </m:r>
+                            </m:e>
+                            <m:sub>
+                              <m:r>
+                                <a:rPr lang="en-US" b="0" i="1" smtClean="0">
+                                  <a:latin typeface="Cambria Math" panose="02040503050406030204" pitchFamily="18" charset="0"/>
+                                </a:rPr>
+                                <m:t>𝑖</m:t>
+                              </m:r>
+                            </m:sub>
+                          </m:sSub>
+                        </m:oMath>
+                      </m:oMathPara>
+                    </a14:m>
+                    <a:endParaRPr lang="en-US" dirty="0"/>
+                  </a:p>
+                </p:txBody>
+              </p:sp>
+            </mc:Choice>
+            <mc:Fallback>
+              <p:sp>
+                <p:nvSpPr>
+                  <p:cNvPr id="18" name="TextBox 17">
+                    <a:extLst>
+                      <a:ext uri="{FF2B5EF4-FFF2-40B4-BE49-F238E27FC236}">
+                        <a16:creationId xmlns:a16="http://schemas.microsoft.com/office/drawing/2014/main" id="{451011EC-A35F-4253-B649-DBF2B9EA89D0}"/>
+                      </a:ext>
+                    </a:extLst>
+                  </p:cNvPr>
+                  <p:cNvSpPr txBox="1">
+                    <a:spLocks noRot="1" noChangeAspect="1" noMove="1" noResize="1" noEditPoints="1" noAdjustHandles="1" noChangeArrowheads="1" noChangeShapeType="1" noTextEdit="1"/>
+                  </p:cNvSpPr>
+                  <p:nvPr/>
+                </p:nvSpPr>
+                <p:spPr>
+                  <a:xfrm>
+                    <a:off x="2208848" y="3988149"/>
+                    <a:ext cx="358725" cy="369332"/>
+                  </a:xfrm>
+                  <a:prstGeom prst="rect">
+                    <a:avLst/>
+                  </a:prstGeom>
+                  <a:blipFill>
+                    <a:blip r:embed="rId9"/>
+                    <a:stretch>
+                      <a:fillRect b="-1639"/>
+                    </a:stretch>
+                  </a:blipFill>
+                </p:spPr>
+                <p:txBody>
+                  <a:bodyPr/>
+                  <a:lstStyle/>
+                  <a:p>
+                    <a:r>
+                      <a:rPr lang="en-US">
+                        <a:noFill/>
+                      </a:rPr>
+                      <a:t> </a:t>
+                    </a:r>
+                  </a:p>
+                </p:txBody>
+              </p:sp>
+            </mc:Fallback>
+          </mc:AlternateContent>
+          <mc:AlternateContent xmlns:mc="http://schemas.openxmlformats.org/markup-compatibility/2006">
+            <mc:Choice xmlns:a14="http://schemas.microsoft.com/office/drawing/2010/main" Requires="a14">
+              <p:sp>
+                <p:nvSpPr>
+                  <p:cNvPr id="19" name="TextBox 18">
+                    <a:extLst>
+                      <a:ext uri="{FF2B5EF4-FFF2-40B4-BE49-F238E27FC236}">
+                        <a16:creationId xmlns:a16="http://schemas.microsoft.com/office/drawing/2014/main" id="{4DEF8E66-BDD8-4BC3-8F1C-D4C45251D8F0}"/>
+                      </a:ext>
+                    </a:extLst>
+                  </p:cNvPr>
+                  <p:cNvSpPr txBox="1"/>
+                  <p:nvPr/>
+                </p:nvSpPr>
+                <p:spPr>
+                  <a:xfrm>
+                    <a:off x="8875684" y="3988149"/>
+                    <a:ext cx="424232" cy="369332"/>
+                  </a:xfrm>
+                  <a:prstGeom prst="rect">
+                    <a:avLst/>
+                  </a:prstGeom>
+                  <a:noFill/>
+                </p:spPr>
+                <p:txBody>
+                  <a:bodyPr wrap="square" rtlCol="0">
+                    <a:spAutoFit/>
+                  </a:bodyPr>
+                  <a:lstStyle/>
+                  <a:p>
+                    <a:pPr/>
+                    <a14:m>
+                      <m:oMathPara xmlns:m="http://schemas.openxmlformats.org/officeDocument/2006/math">
+                        <m:oMathParaPr>
+                          <m:jc m:val="centerGroup"/>
+                        </m:oMathParaPr>
+                        <m:oMath xmlns:m="http://schemas.openxmlformats.org/officeDocument/2006/math">
+                          <m:sSub>
+                            <m:sSubPr>
+                              <m:ctrlPr>
+                                <a:rPr lang="en-US" b="0" i="1" smtClean="0">
+                                  <a:latin typeface="Cambria Math" panose="02040503050406030204" pitchFamily="18" charset="0"/>
+                                </a:rPr>
+                              </m:ctrlPr>
+                            </m:sSubPr>
+                            <m:e>
+                              <m:r>
+                                <a:rPr lang="en-US" b="0" i="1" smtClean="0">
+                                  <a:latin typeface="Cambria Math" panose="02040503050406030204" pitchFamily="18" charset="0"/>
+                                </a:rPr>
+                                <m:t>𝐸</m:t>
+                              </m:r>
+                            </m:e>
+                            <m:sub>
+                              <m:r>
+                                <a:rPr lang="en-US" b="0" i="1" smtClean="0">
+                                  <a:latin typeface="Cambria Math" panose="02040503050406030204" pitchFamily="18" charset="0"/>
+                                </a:rPr>
+                                <m:t>𝑟</m:t>
+                              </m:r>
+                            </m:sub>
+                          </m:sSub>
+                        </m:oMath>
+                      </m:oMathPara>
+                    </a14:m>
+                    <a:endParaRPr lang="en-US" dirty="0"/>
+                  </a:p>
+                </p:txBody>
+              </p:sp>
+            </mc:Choice>
+            <mc:Fallback>
+              <p:sp>
+                <p:nvSpPr>
+                  <p:cNvPr id="19" name="TextBox 18">
+                    <a:extLst>
+                      <a:ext uri="{FF2B5EF4-FFF2-40B4-BE49-F238E27FC236}">
+                        <a16:creationId xmlns:a16="http://schemas.microsoft.com/office/drawing/2014/main" id="{4DEF8E66-BDD8-4BC3-8F1C-D4C45251D8F0}"/>
+                      </a:ext>
+                    </a:extLst>
+                  </p:cNvPr>
+                  <p:cNvSpPr txBox="1">
+                    <a:spLocks noRot="1" noChangeAspect="1" noMove="1" noResize="1" noEditPoints="1" noAdjustHandles="1" noChangeArrowheads="1" noChangeShapeType="1" noTextEdit="1"/>
+                  </p:cNvSpPr>
+                  <p:nvPr/>
+                </p:nvSpPr>
+                <p:spPr>
+                  <a:xfrm>
+                    <a:off x="8875684" y="3988149"/>
+                    <a:ext cx="424232" cy="369332"/>
+                  </a:xfrm>
+                  <a:prstGeom prst="rect">
+                    <a:avLst/>
+                  </a:prstGeom>
+                  <a:blipFill>
+                    <a:blip r:embed="rId10"/>
+                    <a:stretch>
+                      <a:fillRect/>
+                    </a:stretch>
+                  </a:blipFill>
+                </p:spPr>
+                <p:txBody>
+                  <a:bodyPr/>
+                  <a:lstStyle/>
+                  <a:p>
+                    <a:r>
+                      <a:rPr lang="en-US">
+                        <a:noFill/>
+                      </a:rPr>
+                      <a:t> </a:t>
+                    </a:r>
+                  </a:p>
+                </p:txBody>
+              </p:sp>
+            </mc:Fallback>
+          </mc:AlternateContent>
+        </p:grpSp>
       </p:grpSp>
     </p:spTree>
     <p:extLst>

</xml_diff>